<commit_message>
agrego cosas a la presentacion (a mi parte)
</commit_message>
<xml_diff>
--- a/Documentacion/Presentación Grado de Avances/Presentación Proyecto - Grado de Avances.pptx
+++ b/Documentacion/Presentación Grado de Avances/Presentación Proyecto - Grado de Avances.pptx
@@ -5,7 +5,7 @@
     <p:sldMasterId id="2147483648" r:id="rId1"/>
   </p:sldMasterIdLst>
   <p:notesMasterIdLst>
-    <p:notesMasterId r:id="rId21"/>
+    <p:notesMasterId r:id="rId22"/>
   </p:notesMasterIdLst>
   <p:sldIdLst>
     <p:sldId id="259" r:id="rId2"/>
@@ -24,9 +24,10 @@
     <p:sldId id="290" r:id="rId15"/>
     <p:sldId id="291" r:id="rId16"/>
     <p:sldId id="292" r:id="rId17"/>
-    <p:sldId id="293" r:id="rId18"/>
-    <p:sldId id="282" r:id="rId19"/>
-    <p:sldId id="274" r:id="rId20"/>
+    <p:sldId id="296" r:id="rId18"/>
+    <p:sldId id="293" r:id="rId19"/>
+    <p:sldId id="282" r:id="rId20"/>
+    <p:sldId id="274" r:id="rId21"/>
   </p:sldIdLst>
   <p:sldSz cx="12192000" cy="6858000"/>
   <p:notesSz cx="6858000" cy="9144000"/>
@@ -5036,8 +5037,8 @@
     <dgm:cxn modelId="{033E09AC-6D4D-414E-862D-B5A442B1AC27}" type="presOf" srcId="{ABDCEAC1-7F67-454D-84AF-2ECB51702D13}" destId="{474233D3-0411-4ECF-9B57-DA9032FAB377}" srcOrd="0" destOrd="0" presId="urn:microsoft.com/office/officeart/2005/8/layout/vList5"/>
     <dgm:cxn modelId="{71EEBC94-C7CD-44E6-B1DC-DAF8B3C40CCA}" srcId="{5B42A3B2-F1A4-4AAD-92E6-CBE520DF75A4}" destId="{D80178D8-855D-4D8C-BAE2-17D72C190F1C}" srcOrd="4" destOrd="0" parTransId="{CE8167CF-87E1-42C1-8B64-351F9D65AEA0}" sibTransId="{42623A96-96F1-43CA-BA62-11C446A70135}"/>
     <dgm:cxn modelId="{4137832A-ED43-4C35-B279-B35137E9B3E9}" srcId="{8587132E-9006-496A-8F9A-F4971DD58E1B}" destId="{6896E919-8BCC-48FF-BCE3-BFE66BFB1A06}" srcOrd="0" destOrd="0" parTransId="{E36E377B-B494-400F-B163-198EA04FA50E}" sibTransId="{7D1BA1F4-2223-4C45-815D-8FB75C8F2E3A}"/>
+    <dgm:cxn modelId="{E08744B4-69D5-4A50-89E1-C260D5ED9AC7}" type="presOf" srcId="{B7551B5D-2840-4B19-AA2B-F2E0633B3A37}" destId="{EA225968-22AD-4266-B086-723503A371EA}" srcOrd="0" destOrd="0" presId="urn:microsoft.com/office/officeart/2005/8/layout/vList5"/>
     <dgm:cxn modelId="{1118EDD1-B889-4A46-BD09-FD906CE2F23D}" type="presOf" srcId="{AA89FF9F-D7AB-46FF-8516-736811A50D78}" destId="{81427C62-5655-4813-AC16-2932A923AE10}" srcOrd="0" destOrd="0" presId="urn:microsoft.com/office/officeart/2005/8/layout/vList5"/>
-    <dgm:cxn modelId="{E08744B4-69D5-4A50-89E1-C260D5ED9AC7}" type="presOf" srcId="{B7551B5D-2840-4B19-AA2B-F2E0633B3A37}" destId="{EA225968-22AD-4266-B086-723503A371EA}" srcOrd="0" destOrd="0" presId="urn:microsoft.com/office/officeart/2005/8/layout/vList5"/>
     <dgm:cxn modelId="{3F3BF574-AAD8-419F-B503-96D047DF15CE}" type="presParOf" srcId="{1AC5862D-3A38-4A56-8BBB-5228D3259E64}" destId="{6FBAC80C-69A4-4EBB-A9DA-D287B5B59A74}" srcOrd="0" destOrd="0" presId="urn:microsoft.com/office/officeart/2005/8/layout/vList5"/>
     <dgm:cxn modelId="{85AE3A7E-A6C9-4A33-B561-3AC2428D6853}" type="presParOf" srcId="{6FBAC80C-69A4-4EBB-A9DA-D287B5B59A74}" destId="{909E8BCD-0B1A-41E7-BFFF-B89785456621}" srcOrd="0" destOrd="0" presId="urn:microsoft.com/office/officeart/2005/8/layout/vList5"/>
     <dgm:cxn modelId="{134167C9-1E13-44A1-A9FB-452A02FA070E}" type="presParOf" srcId="{6FBAC80C-69A4-4EBB-A9DA-D287B5B59A74}" destId="{D79D4B58-D90B-49E8-B5D0-2B484EB6045D}" srcOrd="1" destOrd="0" presId="urn:microsoft.com/office/officeart/2005/8/layout/vList5"/>
@@ -6140,20 +6141,20 @@
     </dgm:pt>
   </dgm:ptLst>
   <dgm:cxnLst>
+    <dgm:cxn modelId="{49EE22DC-5F2C-4520-9ECA-69CA034E3E84}" type="presOf" srcId="{E3E24D61-DC83-4221-A625-3253A8A07D4E}" destId="{889CCFCF-85CF-42EE-B1C3-B84E8EE140C2}" srcOrd="0" destOrd="0" presId="urn:microsoft.com/office/officeart/2008/layout/VerticalCurvedList"/>
+    <dgm:cxn modelId="{A74E0EB2-308F-403E-9F75-A6F630C4E55D}" type="presOf" srcId="{0E8DDFC9-A553-43E8-8ADD-DACAFE998484}" destId="{E7CE5C3F-775D-45A0-8FC7-59E2443FB5BB}" srcOrd="0" destOrd="0" presId="urn:microsoft.com/office/officeart/2008/layout/VerticalCurvedList"/>
+    <dgm:cxn modelId="{009EA7D8-905E-4CF5-AD7F-033F2C5F116E}" type="presOf" srcId="{767EEABE-FA01-434B-BFB1-DABB2B0B3538}" destId="{B1E84231-A085-4FBA-A7F1-0724F2582F6F}" srcOrd="0" destOrd="0" presId="urn:microsoft.com/office/officeart/2008/layout/VerticalCurvedList"/>
+    <dgm:cxn modelId="{E783B8BE-2BD4-4C04-BDDF-BE17ACA9F295}" type="presOf" srcId="{61775FC0-4D76-4DBD-8D6A-B45D8C8F447D}" destId="{2844CD40-437E-4C4F-A2EE-801021F6711B}" srcOrd="0" destOrd="0" presId="urn:microsoft.com/office/officeart/2008/layout/VerticalCurvedList"/>
+    <dgm:cxn modelId="{36190A50-AB37-4DBE-841D-84CE7B3AE27C}" type="presOf" srcId="{EB69C98D-0511-46AE-8510-7CCD8A94F1AD}" destId="{A6715B7B-E69E-49A7-BBDE-A964109AD82E}" srcOrd="0" destOrd="0" presId="urn:microsoft.com/office/officeart/2008/layout/VerticalCurvedList"/>
+    <dgm:cxn modelId="{89D38CD6-64FE-4FD5-BED7-753169C4CACF}" srcId="{380B52FA-39C6-48EA-999F-FF4935E2FF90}" destId="{269BCB6E-2880-4F18-9732-C0DD14CA6895}" srcOrd="1" destOrd="0" parTransId="{5152B2E3-1FA3-4D1F-89EB-C3BF645E7CFB}" sibTransId="{D9B8F87E-83B6-41F9-969F-08D3D7CDBBE0}"/>
+    <dgm:cxn modelId="{DADC3634-6D46-4546-8DF3-F7E7D8CF2AD4}" type="presOf" srcId="{CC4D44A6-7179-4CCE-8B0E-9D963F120C7F}" destId="{969B7A61-92F9-49CC-BB98-4FCC80682E86}" srcOrd="0" destOrd="0" presId="urn:microsoft.com/office/officeart/2008/layout/VerticalCurvedList"/>
+    <dgm:cxn modelId="{DD7C9394-52EF-48F5-8584-BA6AE850F2E4}" type="presOf" srcId="{380B52FA-39C6-48EA-999F-FF4935E2FF90}" destId="{E0294AD7-5684-4880-AFE3-8A287502C171}" srcOrd="0" destOrd="0" presId="urn:microsoft.com/office/officeart/2008/layout/VerticalCurvedList"/>
     <dgm:cxn modelId="{A489847D-2ECA-4424-B17A-DB6FCE7A8A5A}" srcId="{380B52FA-39C6-48EA-999F-FF4935E2FF90}" destId="{61775FC0-4D76-4DBD-8D6A-B45D8C8F447D}" srcOrd="3" destOrd="0" parTransId="{5627AB7B-8D76-4D3F-B033-0452D2740CB8}" sibTransId="{A90BBD6A-B4C6-4C41-B0C1-AFAF3DD96903}"/>
-    <dgm:cxn modelId="{DD7C9394-52EF-48F5-8584-BA6AE850F2E4}" type="presOf" srcId="{380B52FA-39C6-48EA-999F-FF4935E2FF90}" destId="{E0294AD7-5684-4880-AFE3-8A287502C171}" srcOrd="0" destOrd="0" presId="urn:microsoft.com/office/officeart/2008/layout/VerticalCurvedList"/>
-    <dgm:cxn modelId="{E783B8BE-2BD4-4C04-BDDF-BE17ACA9F295}" type="presOf" srcId="{61775FC0-4D76-4DBD-8D6A-B45D8C8F447D}" destId="{2844CD40-437E-4C4F-A2EE-801021F6711B}" srcOrd="0" destOrd="0" presId="urn:microsoft.com/office/officeart/2008/layout/VerticalCurvedList"/>
-    <dgm:cxn modelId="{49EE22DC-5F2C-4520-9ECA-69CA034E3E84}" type="presOf" srcId="{E3E24D61-DC83-4221-A625-3253A8A07D4E}" destId="{889CCFCF-85CF-42EE-B1C3-B84E8EE140C2}" srcOrd="0" destOrd="0" presId="urn:microsoft.com/office/officeart/2008/layout/VerticalCurvedList"/>
+    <dgm:cxn modelId="{FFD5E230-1508-477F-88DA-0B1AAA7F61BA}" srcId="{380B52FA-39C6-48EA-999F-FF4935E2FF90}" destId="{E3E24D61-DC83-4221-A625-3253A8A07D4E}" srcOrd="0" destOrd="0" parTransId="{171B5AE9-D9B6-4240-9D84-221E824F7A31}" sibTransId="{CC4D44A6-7179-4CCE-8B0E-9D963F120C7F}"/>
+    <dgm:cxn modelId="{8F895F7B-4E24-4CBD-875F-FDA24134C40E}" srcId="{380B52FA-39C6-48EA-999F-FF4935E2FF90}" destId="{0E8DDFC9-A553-43E8-8ADD-DACAFE998484}" srcOrd="4" destOrd="0" parTransId="{9A92C10D-6A46-4A28-B36F-8C076C8A2723}" sibTransId="{FA11F3E5-A6EE-4D12-9C43-9DA399E6752D}"/>
     <dgm:cxn modelId="{8EDA5967-C3EE-4BA9-A906-3EBA10582C14}" srcId="{380B52FA-39C6-48EA-999F-FF4935E2FF90}" destId="{EB69C98D-0511-46AE-8510-7CCD8A94F1AD}" srcOrd="5" destOrd="0" parTransId="{D1EF9142-BF1B-46DC-9394-13F37661F665}" sibTransId="{10F45A30-D8F2-4C20-943B-AD10ADAF5F81}"/>
-    <dgm:cxn modelId="{8F895F7B-4E24-4CBD-875F-FDA24134C40E}" srcId="{380B52FA-39C6-48EA-999F-FF4935E2FF90}" destId="{0E8DDFC9-A553-43E8-8ADD-DACAFE998484}" srcOrd="4" destOrd="0" parTransId="{9A92C10D-6A46-4A28-B36F-8C076C8A2723}" sibTransId="{FA11F3E5-A6EE-4D12-9C43-9DA399E6752D}"/>
-    <dgm:cxn modelId="{DADC3634-6D46-4546-8DF3-F7E7D8CF2AD4}" type="presOf" srcId="{CC4D44A6-7179-4CCE-8B0E-9D963F120C7F}" destId="{969B7A61-92F9-49CC-BB98-4FCC80682E86}" srcOrd="0" destOrd="0" presId="urn:microsoft.com/office/officeart/2008/layout/VerticalCurvedList"/>
-    <dgm:cxn modelId="{89D38CD6-64FE-4FD5-BED7-753169C4CACF}" srcId="{380B52FA-39C6-48EA-999F-FF4935E2FF90}" destId="{269BCB6E-2880-4F18-9732-C0DD14CA6895}" srcOrd="1" destOrd="0" parTransId="{5152B2E3-1FA3-4D1F-89EB-C3BF645E7CFB}" sibTransId="{D9B8F87E-83B6-41F9-969F-08D3D7CDBBE0}"/>
-    <dgm:cxn modelId="{A74E0EB2-308F-403E-9F75-A6F630C4E55D}" type="presOf" srcId="{0E8DDFC9-A553-43E8-8ADD-DACAFE998484}" destId="{E7CE5C3F-775D-45A0-8FC7-59E2443FB5BB}" srcOrd="0" destOrd="0" presId="urn:microsoft.com/office/officeart/2008/layout/VerticalCurvedList"/>
-    <dgm:cxn modelId="{36190A50-AB37-4DBE-841D-84CE7B3AE27C}" type="presOf" srcId="{EB69C98D-0511-46AE-8510-7CCD8A94F1AD}" destId="{A6715B7B-E69E-49A7-BBDE-A964109AD82E}" srcOrd="0" destOrd="0" presId="urn:microsoft.com/office/officeart/2008/layout/VerticalCurvedList"/>
     <dgm:cxn modelId="{60CFD0AC-A92A-4E72-A578-D3B8F4590D91}" srcId="{380B52FA-39C6-48EA-999F-FF4935E2FF90}" destId="{767EEABE-FA01-434B-BFB1-DABB2B0B3538}" srcOrd="2" destOrd="0" parTransId="{B7276962-EA13-4004-8FCA-9E43AC3736C6}" sibTransId="{3D676867-16F7-4C1B-968F-0A14807FFE0B}"/>
     <dgm:cxn modelId="{25D2925A-D2DA-429F-B20F-2442D31D4DFD}" type="presOf" srcId="{269BCB6E-2880-4F18-9732-C0DD14CA6895}" destId="{21664CED-339C-476D-85A5-28A63C40B1E3}" srcOrd="0" destOrd="0" presId="urn:microsoft.com/office/officeart/2008/layout/VerticalCurvedList"/>
-    <dgm:cxn modelId="{009EA7D8-905E-4CF5-AD7F-033F2C5F116E}" type="presOf" srcId="{767EEABE-FA01-434B-BFB1-DABB2B0B3538}" destId="{B1E84231-A085-4FBA-A7F1-0724F2582F6F}" srcOrd="0" destOrd="0" presId="urn:microsoft.com/office/officeart/2008/layout/VerticalCurvedList"/>
-    <dgm:cxn modelId="{FFD5E230-1508-477F-88DA-0B1AAA7F61BA}" srcId="{380B52FA-39C6-48EA-999F-FF4935E2FF90}" destId="{E3E24D61-DC83-4221-A625-3253A8A07D4E}" srcOrd="0" destOrd="0" parTransId="{171B5AE9-D9B6-4240-9D84-221E824F7A31}" sibTransId="{CC4D44A6-7179-4CCE-8B0E-9D963F120C7F}"/>
     <dgm:cxn modelId="{C46509FA-7F85-4FA4-8CA6-EECBA266541B}" type="presParOf" srcId="{E0294AD7-5684-4880-AFE3-8A287502C171}" destId="{2E0DEE6A-5A2C-4DBC-BAF6-E16EE66D546C}" srcOrd="0" destOrd="0" presId="urn:microsoft.com/office/officeart/2008/layout/VerticalCurvedList"/>
     <dgm:cxn modelId="{8A2611CE-8BE6-42B4-9D4E-C80EE0450B79}" type="presParOf" srcId="{2E0DEE6A-5A2C-4DBC-BAF6-E16EE66D546C}" destId="{6EF8B487-7303-479A-BD85-C2D10E331B67}" srcOrd="0" destOrd="0" presId="urn:microsoft.com/office/officeart/2008/layout/VerticalCurvedList"/>
     <dgm:cxn modelId="{72A1D9A8-C010-4595-9578-E6A7B2DB590D}" type="presParOf" srcId="{6EF8B487-7303-479A-BD85-C2D10E331B67}" destId="{D36A4E98-F327-423B-891D-6DAB05EE96EE}" srcOrd="0" destOrd="0" presId="urn:microsoft.com/office/officeart/2008/layout/VerticalCurvedList"/>
@@ -6197,6 +6198,691 @@
       <dsp:cNvGrpSpPr/>
     </dsp:nvGrpSpPr>
     <dsp:grpSpPr/>
+    <dsp:sp modelId="{847150E7-A1A9-4A6A-94B1-79AB50249590}">
+      <dsp:nvSpPr>
+        <dsp:cNvPr id="0" name=""/>
+        <dsp:cNvSpPr/>
+      </dsp:nvSpPr>
+      <dsp:spPr>
+        <a:xfrm>
+          <a:off x="-5720250" y="-875576"/>
+          <a:ext cx="6810321" cy="6810321"/>
+        </a:xfrm>
+        <a:prstGeom prst="blockArc">
+          <a:avLst>
+            <a:gd name="adj1" fmla="val 18900000"/>
+            <a:gd name="adj2" fmla="val 2700000"/>
+            <a:gd name="adj3" fmla="val 317"/>
+          </a:avLst>
+        </a:prstGeom>
+        <a:noFill/>
+        <a:ln w="15875" cap="rnd" cmpd="sng" algn="ctr">
+          <a:solidFill>
+            <a:schemeClr val="accent1">
+              <a:shade val="60000"/>
+              <a:hueOff val="0"/>
+              <a:satOff val="0"/>
+              <a:lumOff val="0"/>
+              <a:alphaOff val="0"/>
+            </a:schemeClr>
+          </a:solidFill>
+          <a:prstDash val="solid"/>
+        </a:ln>
+        <a:effectLst/>
+      </dsp:spPr>
+      <dsp:style>
+        <a:lnRef idx="2">
+          <a:scrgbClr r="0" g="0" b="0"/>
+        </a:lnRef>
+        <a:fillRef idx="0">
+          <a:scrgbClr r="0" g="0" b="0"/>
+        </a:fillRef>
+        <a:effectRef idx="0">
+          <a:scrgbClr r="0" g="0" b="0"/>
+        </a:effectRef>
+        <a:fontRef idx="minor"/>
+      </dsp:style>
+    </dsp:sp>
+    <dsp:sp modelId="{E692D962-4A0C-4FDE-8884-EC514208681B}">
+      <dsp:nvSpPr>
+        <dsp:cNvPr id="0" name=""/>
+        <dsp:cNvSpPr/>
+      </dsp:nvSpPr>
+      <dsp:spPr>
+        <a:xfrm>
+          <a:off x="476497" y="316096"/>
+          <a:ext cx="6005076" cy="632598"/>
+        </a:xfrm>
+        <a:prstGeom prst="rect">
+          <a:avLst/>
+        </a:prstGeom>
+        <a:solidFill>
+          <a:schemeClr val="accent1">
+            <a:hueOff val="0"/>
+            <a:satOff val="0"/>
+            <a:lumOff val="0"/>
+            <a:alphaOff val="0"/>
+          </a:schemeClr>
+        </a:solidFill>
+        <a:ln w="15875" cap="rnd" cmpd="sng" algn="ctr">
+          <a:solidFill>
+            <a:schemeClr val="lt1">
+              <a:hueOff val="0"/>
+              <a:satOff val="0"/>
+              <a:lumOff val="0"/>
+              <a:alphaOff val="0"/>
+            </a:schemeClr>
+          </a:solidFill>
+          <a:prstDash val="solid"/>
+        </a:ln>
+        <a:effectLst/>
+      </dsp:spPr>
+      <dsp:style>
+        <a:lnRef idx="2">
+          <a:scrgbClr r="0" g="0" b="0"/>
+        </a:lnRef>
+        <a:fillRef idx="1">
+          <a:scrgbClr r="0" g="0" b="0"/>
+        </a:fillRef>
+        <a:effectRef idx="0">
+          <a:scrgbClr r="0" g="0" b="0"/>
+        </a:effectRef>
+        <a:fontRef idx="minor">
+          <a:schemeClr val="lt1"/>
+        </a:fontRef>
+      </dsp:style>
+      <dsp:txBody>
+        <a:bodyPr spcFirstLastPara="0" vert="horz" wrap="square" lIns="502125" tIns="60960" rIns="60960" bIns="60960" numCol="1" spcCol="1270" anchor="ctr" anchorCtr="0">
+          <a:noAutofit/>
+        </a:bodyPr>
+        <a:lstStyle/>
+        <a:p>
+          <a:pPr lvl="0" algn="l" defTabSz="1066800">
+            <a:lnSpc>
+              <a:spcPct val="90000"/>
+            </a:lnSpc>
+            <a:spcBef>
+              <a:spcPct val="0"/>
+            </a:spcBef>
+            <a:spcAft>
+              <a:spcPct val="35000"/>
+            </a:spcAft>
+          </a:pPr>
+          <a:r>
+            <a:rPr lang="es-AR" sz="2400" b="0" kern="1200" dirty="0" smtClean="0">
+              <a:latin typeface="Calibri" panose="020F0502020204030204" pitchFamily="34" charset="0"/>
+            </a:rPr>
+            <a:t>¿Dónde Estamos?</a:t>
+          </a:r>
+          <a:endParaRPr lang="es-AR" sz="2400" b="0" kern="1200" dirty="0">
+            <a:latin typeface="Calibri" panose="020F0502020204030204" pitchFamily="34" charset="0"/>
+          </a:endParaRPr>
+        </a:p>
+      </dsp:txBody>
+      <dsp:txXfrm>
+        <a:off x="476497" y="316096"/>
+        <a:ext cx="6005076" cy="632598"/>
+      </dsp:txXfrm>
+    </dsp:sp>
+    <dsp:sp modelId="{DAD2847C-C4D4-4029-B52A-864C55881E2F}">
+      <dsp:nvSpPr>
+        <dsp:cNvPr id="0" name=""/>
+        <dsp:cNvSpPr/>
+      </dsp:nvSpPr>
+      <dsp:spPr>
+        <a:xfrm>
+          <a:off x="81123" y="237022"/>
+          <a:ext cx="790747" cy="790747"/>
+        </a:xfrm>
+        <a:prstGeom prst="ellipse">
+          <a:avLst/>
+        </a:prstGeom>
+        <a:solidFill>
+          <a:schemeClr val="lt1">
+            <a:hueOff val="0"/>
+            <a:satOff val="0"/>
+            <a:lumOff val="0"/>
+            <a:alphaOff val="0"/>
+          </a:schemeClr>
+        </a:solidFill>
+        <a:ln w="15875" cap="rnd" cmpd="sng" algn="ctr">
+          <a:solidFill>
+            <a:schemeClr val="accent1">
+              <a:hueOff val="0"/>
+              <a:satOff val="0"/>
+              <a:lumOff val="0"/>
+              <a:alphaOff val="0"/>
+            </a:schemeClr>
+          </a:solidFill>
+          <a:prstDash val="solid"/>
+        </a:ln>
+        <a:effectLst/>
+      </dsp:spPr>
+      <dsp:style>
+        <a:lnRef idx="2">
+          <a:scrgbClr r="0" g="0" b="0"/>
+        </a:lnRef>
+        <a:fillRef idx="1">
+          <a:scrgbClr r="0" g="0" b="0"/>
+        </a:fillRef>
+        <a:effectRef idx="0">
+          <a:scrgbClr r="0" g="0" b="0"/>
+        </a:effectRef>
+        <a:fontRef idx="minor"/>
+      </dsp:style>
+    </dsp:sp>
+    <dsp:sp modelId="{07272EF7-AE1F-4ACE-8BB3-F011A254CD75}">
+      <dsp:nvSpPr>
+        <dsp:cNvPr id="0" name=""/>
+        <dsp:cNvSpPr/>
+      </dsp:nvSpPr>
+      <dsp:spPr>
+        <a:xfrm>
+          <a:off x="929799" y="1264690"/>
+          <a:ext cx="5551774" cy="632598"/>
+        </a:xfrm>
+        <a:prstGeom prst="rect">
+          <a:avLst/>
+        </a:prstGeom>
+        <a:solidFill>
+          <a:schemeClr val="accent1">
+            <a:hueOff val="0"/>
+            <a:satOff val="0"/>
+            <a:lumOff val="0"/>
+            <a:alphaOff val="0"/>
+          </a:schemeClr>
+        </a:solidFill>
+        <a:ln w="15875" cap="rnd" cmpd="sng" algn="ctr">
+          <a:solidFill>
+            <a:schemeClr val="lt1">
+              <a:hueOff val="0"/>
+              <a:satOff val="0"/>
+              <a:lumOff val="0"/>
+              <a:alphaOff val="0"/>
+            </a:schemeClr>
+          </a:solidFill>
+          <a:prstDash val="solid"/>
+        </a:ln>
+        <a:effectLst/>
+      </dsp:spPr>
+      <dsp:style>
+        <a:lnRef idx="2">
+          <a:scrgbClr r="0" g="0" b="0"/>
+        </a:lnRef>
+        <a:fillRef idx="1">
+          <a:scrgbClr r="0" g="0" b="0"/>
+        </a:fillRef>
+        <a:effectRef idx="0">
+          <a:scrgbClr r="0" g="0" b="0"/>
+        </a:effectRef>
+        <a:fontRef idx="minor">
+          <a:schemeClr val="lt1"/>
+        </a:fontRef>
+      </dsp:style>
+      <dsp:txBody>
+        <a:bodyPr spcFirstLastPara="0" vert="horz" wrap="square" lIns="502125" tIns="60960" rIns="60960" bIns="60960" numCol="1" spcCol="1270" anchor="ctr" anchorCtr="0">
+          <a:noAutofit/>
+        </a:bodyPr>
+        <a:lstStyle/>
+        <a:p>
+          <a:pPr lvl="0" algn="l" defTabSz="1066800">
+            <a:lnSpc>
+              <a:spcPct val="90000"/>
+            </a:lnSpc>
+            <a:spcBef>
+              <a:spcPct val="0"/>
+            </a:spcBef>
+            <a:spcAft>
+              <a:spcPct val="35000"/>
+            </a:spcAft>
+          </a:pPr>
+          <a:r>
+            <a:rPr lang="es-AR" sz="2400" b="0" kern="1200" dirty="0" smtClean="0">
+              <a:latin typeface="Calibri" panose="020F0502020204030204" pitchFamily="34" charset="0"/>
+            </a:rPr>
+            <a:t>Herramientas y Cambios</a:t>
+          </a:r>
+          <a:endParaRPr lang="es-AR" sz="2400" b="0" kern="1200" dirty="0">
+            <a:latin typeface="Calibri" panose="020F0502020204030204" pitchFamily="34" charset="0"/>
+          </a:endParaRPr>
+        </a:p>
+      </dsp:txBody>
+      <dsp:txXfrm>
+        <a:off x="929799" y="1264690"/>
+        <a:ext cx="5551774" cy="632598"/>
+      </dsp:txXfrm>
+    </dsp:sp>
+    <dsp:sp modelId="{432F1E89-EA1F-494C-89F5-C81C8636C930}">
+      <dsp:nvSpPr>
+        <dsp:cNvPr id="0" name=""/>
+        <dsp:cNvSpPr/>
+      </dsp:nvSpPr>
+      <dsp:spPr>
+        <a:xfrm>
+          <a:off x="534425" y="1185616"/>
+          <a:ext cx="790747" cy="790747"/>
+        </a:xfrm>
+        <a:prstGeom prst="ellipse">
+          <a:avLst/>
+        </a:prstGeom>
+        <a:solidFill>
+          <a:schemeClr val="lt1">
+            <a:hueOff val="0"/>
+            <a:satOff val="0"/>
+            <a:lumOff val="0"/>
+            <a:alphaOff val="0"/>
+          </a:schemeClr>
+        </a:solidFill>
+        <a:ln w="15875" cap="rnd" cmpd="sng" algn="ctr">
+          <a:solidFill>
+            <a:schemeClr val="accent1">
+              <a:hueOff val="0"/>
+              <a:satOff val="0"/>
+              <a:lumOff val="0"/>
+              <a:alphaOff val="0"/>
+            </a:schemeClr>
+          </a:solidFill>
+          <a:prstDash val="solid"/>
+        </a:ln>
+        <a:effectLst/>
+      </dsp:spPr>
+      <dsp:style>
+        <a:lnRef idx="2">
+          <a:scrgbClr r="0" g="0" b="0"/>
+        </a:lnRef>
+        <a:fillRef idx="1">
+          <a:scrgbClr r="0" g="0" b="0"/>
+        </a:fillRef>
+        <a:effectRef idx="0">
+          <a:scrgbClr r="0" g="0" b="0"/>
+        </a:effectRef>
+        <a:fontRef idx="minor"/>
+      </dsp:style>
+    </dsp:sp>
+    <dsp:sp modelId="{8F2C8565-F182-4327-A321-0AE7CB8A5D0A}">
+      <dsp:nvSpPr>
+        <dsp:cNvPr id="0" name=""/>
+        <dsp:cNvSpPr/>
+      </dsp:nvSpPr>
+      <dsp:spPr>
+        <a:xfrm>
+          <a:off x="1068926" y="2213284"/>
+          <a:ext cx="5412647" cy="632598"/>
+        </a:xfrm>
+        <a:prstGeom prst="rect">
+          <a:avLst/>
+        </a:prstGeom>
+        <a:solidFill>
+          <a:schemeClr val="accent1">
+            <a:hueOff val="0"/>
+            <a:satOff val="0"/>
+            <a:lumOff val="0"/>
+            <a:alphaOff val="0"/>
+          </a:schemeClr>
+        </a:solidFill>
+        <a:ln w="15875" cap="rnd" cmpd="sng" algn="ctr">
+          <a:solidFill>
+            <a:schemeClr val="lt1">
+              <a:hueOff val="0"/>
+              <a:satOff val="0"/>
+              <a:lumOff val="0"/>
+              <a:alphaOff val="0"/>
+            </a:schemeClr>
+          </a:solidFill>
+          <a:prstDash val="solid"/>
+        </a:ln>
+        <a:effectLst/>
+      </dsp:spPr>
+      <dsp:style>
+        <a:lnRef idx="2">
+          <a:scrgbClr r="0" g="0" b="0"/>
+        </a:lnRef>
+        <a:fillRef idx="1">
+          <a:scrgbClr r="0" g="0" b="0"/>
+        </a:fillRef>
+        <a:effectRef idx="0">
+          <a:scrgbClr r="0" g="0" b="0"/>
+        </a:effectRef>
+        <a:fontRef idx="minor">
+          <a:schemeClr val="lt1"/>
+        </a:fontRef>
+      </dsp:style>
+      <dsp:txBody>
+        <a:bodyPr spcFirstLastPara="0" vert="horz" wrap="square" lIns="502125" tIns="60960" rIns="60960" bIns="60960" numCol="1" spcCol="1270" anchor="ctr" anchorCtr="0">
+          <a:noAutofit/>
+        </a:bodyPr>
+        <a:lstStyle/>
+        <a:p>
+          <a:pPr lvl="0" algn="l" defTabSz="1066800">
+            <a:lnSpc>
+              <a:spcPct val="90000"/>
+            </a:lnSpc>
+            <a:spcBef>
+              <a:spcPct val="0"/>
+            </a:spcBef>
+            <a:spcAft>
+              <a:spcPct val="35000"/>
+            </a:spcAft>
+          </a:pPr>
+          <a:r>
+            <a:rPr lang="es-AR" sz="2400" b="0" kern="1200" dirty="0" smtClean="0">
+              <a:latin typeface="Calibri" panose="020F0502020204030204" pitchFamily="34" charset="0"/>
+            </a:rPr>
+            <a:t>Gestión del Proyecto - Métricas</a:t>
+          </a:r>
+          <a:endParaRPr lang="es-AR" sz="2400" b="0" kern="1200" dirty="0">
+            <a:latin typeface="Calibri" panose="020F0502020204030204" pitchFamily="34" charset="0"/>
+          </a:endParaRPr>
+        </a:p>
+      </dsp:txBody>
+      <dsp:txXfrm>
+        <a:off x="1068926" y="2213284"/>
+        <a:ext cx="5412647" cy="632598"/>
+      </dsp:txXfrm>
+    </dsp:sp>
+    <dsp:sp modelId="{5370C170-BC8E-4796-9B1D-0F2A2424D39E}">
+      <dsp:nvSpPr>
+        <dsp:cNvPr id="0" name=""/>
+        <dsp:cNvSpPr/>
+      </dsp:nvSpPr>
+      <dsp:spPr>
+        <a:xfrm>
+          <a:off x="673552" y="2134210"/>
+          <a:ext cx="790747" cy="790747"/>
+        </a:xfrm>
+        <a:prstGeom prst="ellipse">
+          <a:avLst/>
+        </a:prstGeom>
+        <a:solidFill>
+          <a:schemeClr val="lt1">
+            <a:hueOff val="0"/>
+            <a:satOff val="0"/>
+            <a:lumOff val="0"/>
+            <a:alphaOff val="0"/>
+          </a:schemeClr>
+        </a:solidFill>
+        <a:ln w="15875" cap="rnd" cmpd="sng" algn="ctr">
+          <a:solidFill>
+            <a:schemeClr val="accent1">
+              <a:hueOff val="0"/>
+              <a:satOff val="0"/>
+              <a:lumOff val="0"/>
+              <a:alphaOff val="0"/>
+            </a:schemeClr>
+          </a:solidFill>
+          <a:prstDash val="solid"/>
+        </a:ln>
+        <a:effectLst/>
+      </dsp:spPr>
+      <dsp:style>
+        <a:lnRef idx="2">
+          <a:scrgbClr r="0" g="0" b="0"/>
+        </a:lnRef>
+        <a:fillRef idx="1">
+          <a:scrgbClr r="0" g="0" b="0"/>
+        </a:fillRef>
+        <a:effectRef idx="0">
+          <a:scrgbClr r="0" g="0" b="0"/>
+        </a:effectRef>
+        <a:fontRef idx="minor"/>
+      </dsp:style>
+    </dsp:sp>
+    <dsp:sp modelId="{BB4FB179-01BB-41C6-81AD-9D71D847F81B}">
+      <dsp:nvSpPr>
+        <dsp:cNvPr id="0" name=""/>
+        <dsp:cNvSpPr/>
+      </dsp:nvSpPr>
+      <dsp:spPr>
+        <a:xfrm>
+          <a:off x="929799" y="3161878"/>
+          <a:ext cx="5551774" cy="632598"/>
+        </a:xfrm>
+        <a:prstGeom prst="rect">
+          <a:avLst/>
+        </a:prstGeom>
+        <a:solidFill>
+          <a:schemeClr val="accent1">
+            <a:hueOff val="0"/>
+            <a:satOff val="0"/>
+            <a:lumOff val="0"/>
+            <a:alphaOff val="0"/>
+          </a:schemeClr>
+        </a:solidFill>
+        <a:ln w="15875" cap="rnd" cmpd="sng" algn="ctr">
+          <a:solidFill>
+            <a:schemeClr val="lt1">
+              <a:hueOff val="0"/>
+              <a:satOff val="0"/>
+              <a:lumOff val="0"/>
+              <a:alphaOff val="0"/>
+            </a:schemeClr>
+          </a:solidFill>
+          <a:prstDash val="solid"/>
+        </a:ln>
+        <a:effectLst/>
+      </dsp:spPr>
+      <dsp:style>
+        <a:lnRef idx="2">
+          <a:scrgbClr r="0" g="0" b="0"/>
+        </a:lnRef>
+        <a:fillRef idx="1">
+          <a:scrgbClr r="0" g="0" b="0"/>
+        </a:fillRef>
+        <a:effectRef idx="0">
+          <a:scrgbClr r="0" g="0" b="0"/>
+        </a:effectRef>
+        <a:fontRef idx="minor">
+          <a:schemeClr val="lt1"/>
+        </a:fontRef>
+      </dsp:style>
+      <dsp:txBody>
+        <a:bodyPr spcFirstLastPara="0" vert="horz" wrap="square" lIns="502125" tIns="60960" rIns="60960" bIns="60960" numCol="1" spcCol="1270" anchor="ctr" anchorCtr="0">
+          <a:noAutofit/>
+        </a:bodyPr>
+        <a:lstStyle/>
+        <a:p>
+          <a:pPr lvl="0" algn="l" defTabSz="1066800">
+            <a:lnSpc>
+              <a:spcPct val="90000"/>
+            </a:lnSpc>
+            <a:spcBef>
+              <a:spcPct val="0"/>
+            </a:spcBef>
+            <a:spcAft>
+              <a:spcPct val="35000"/>
+            </a:spcAft>
+          </a:pPr>
+          <a:r>
+            <a:rPr lang="es-AR" sz="2400" b="0" kern="1200" dirty="0" smtClean="0">
+              <a:latin typeface="Calibri" panose="020F0502020204030204" pitchFamily="34" charset="0"/>
+            </a:rPr>
+            <a:t>Arquitectura y Modelos</a:t>
+          </a:r>
+          <a:endParaRPr lang="es-AR" sz="2400" b="0" kern="1200" dirty="0">
+            <a:latin typeface="Calibri" panose="020F0502020204030204" pitchFamily="34" charset="0"/>
+          </a:endParaRPr>
+        </a:p>
+      </dsp:txBody>
+      <dsp:txXfrm>
+        <a:off x="929799" y="3161878"/>
+        <a:ext cx="5551774" cy="632598"/>
+      </dsp:txXfrm>
+    </dsp:sp>
+    <dsp:sp modelId="{F298C79F-DD07-4C5F-BDDC-E37D8AE87E2C}">
+      <dsp:nvSpPr>
+        <dsp:cNvPr id="0" name=""/>
+        <dsp:cNvSpPr/>
+      </dsp:nvSpPr>
+      <dsp:spPr>
+        <a:xfrm>
+          <a:off x="534425" y="3082804"/>
+          <a:ext cx="790747" cy="790747"/>
+        </a:xfrm>
+        <a:prstGeom prst="ellipse">
+          <a:avLst/>
+        </a:prstGeom>
+        <a:solidFill>
+          <a:schemeClr val="lt1">
+            <a:hueOff val="0"/>
+            <a:satOff val="0"/>
+            <a:lumOff val="0"/>
+            <a:alphaOff val="0"/>
+          </a:schemeClr>
+        </a:solidFill>
+        <a:ln w="15875" cap="rnd" cmpd="sng" algn="ctr">
+          <a:solidFill>
+            <a:schemeClr val="accent1">
+              <a:hueOff val="0"/>
+              <a:satOff val="0"/>
+              <a:lumOff val="0"/>
+              <a:alphaOff val="0"/>
+            </a:schemeClr>
+          </a:solidFill>
+          <a:prstDash val="solid"/>
+        </a:ln>
+        <a:effectLst/>
+      </dsp:spPr>
+      <dsp:style>
+        <a:lnRef idx="2">
+          <a:scrgbClr r="0" g="0" b="0"/>
+        </a:lnRef>
+        <a:fillRef idx="1">
+          <a:scrgbClr r="0" g="0" b="0"/>
+        </a:fillRef>
+        <a:effectRef idx="0">
+          <a:scrgbClr r="0" g="0" b="0"/>
+        </a:effectRef>
+        <a:fontRef idx="minor"/>
+      </dsp:style>
+    </dsp:sp>
+    <dsp:sp modelId="{72F87903-AB29-4042-9FF7-239E4F8EF834}">
+      <dsp:nvSpPr>
+        <dsp:cNvPr id="0" name=""/>
+        <dsp:cNvSpPr/>
+      </dsp:nvSpPr>
+      <dsp:spPr>
+        <a:xfrm>
+          <a:off x="476497" y="4110472"/>
+          <a:ext cx="6005076" cy="632598"/>
+        </a:xfrm>
+        <a:prstGeom prst="rect">
+          <a:avLst/>
+        </a:prstGeom>
+        <a:solidFill>
+          <a:schemeClr val="accent1">
+            <a:hueOff val="0"/>
+            <a:satOff val="0"/>
+            <a:lumOff val="0"/>
+            <a:alphaOff val="0"/>
+          </a:schemeClr>
+        </a:solidFill>
+        <a:ln w="15875" cap="rnd" cmpd="sng" algn="ctr">
+          <a:solidFill>
+            <a:schemeClr val="lt1">
+              <a:hueOff val="0"/>
+              <a:satOff val="0"/>
+              <a:lumOff val="0"/>
+              <a:alphaOff val="0"/>
+            </a:schemeClr>
+          </a:solidFill>
+          <a:prstDash val="solid"/>
+        </a:ln>
+        <a:effectLst/>
+      </dsp:spPr>
+      <dsp:style>
+        <a:lnRef idx="2">
+          <a:scrgbClr r="0" g="0" b="0"/>
+        </a:lnRef>
+        <a:fillRef idx="1">
+          <a:scrgbClr r="0" g="0" b="0"/>
+        </a:fillRef>
+        <a:effectRef idx="0">
+          <a:scrgbClr r="0" g="0" b="0"/>
+        </a:effectRef>
+        <a:fontRef idx="minor">
+          <a:schemeClr val="lt1"/>
+        </a:fontRef>
+      </dsp:style>
+      <dsp:txBody>
+        <a:bodyPr spcFirstLastPara="0" vert="horz" wrap="square" lIns="502125" tIns="60960" rIns="60960" bIns="60960" numCol="1" spcCol="1270" anchor="ctr" anchorCtr="0">
+          <a:noAutofit/>
+        </a:bodyPr>
+        <a:lstStyle/>
+        <a:p>
+          <a:pPr lvl="0" algn="l" defTabSz="1066800">
+            <a:lnSpc>
+              <a:spcPct val="90000"/>
+            </a:lnSpc>
+            <a:spcBef>
+              <a:spcPct val="0"/>
+            </a:spcBef>
+            <a:spcAft>
+              <a:spcPct val="35000"/>
+            </a:spcAft>
+          </a:pPr>
+          <a:r>
+            <a:rPr lang="es-AR" sz="2400" b="0" kern="1200" dirty="0" smtClean="0">
+              <a:latin typeface="Calibri" panose="020F0502020204030204" pitchFamily="34" charset="0"/>
+            </a:rPr>
+            <a:t>¿Cómo Seguimos?</a:t>
+          </a:r>
+          <a:endParaRPr lang="es-AR" sz="2400" b="0" kern="1200" dirty="0">
+            <a:latin typeface="Calibri" panose="020F0502020204030204" pitchFamily="34" charset="0"/>
+          </a:endParaRPr>
+        </a:p>
+      </dsp:txBody>
+      <dsp:txXfrm>
+        <a:off x="476497" y="4110472"/>
+        <a:ext cx="6005076" cy="632598"/>
+      </dsp:txXfrm>
+    </dsp:sp>
+    <dsp:sp modelId="{1BBBCDAA-629F-4ED9-B89C-AF0815CF7756}">
+      <dsp:nvSpPr>
+        <dsp:cNvPr id="0" name=""/>
+        <dsp:cNvSpPr/>
+      </dsp:nvSpPr>
+      <dsp:spPr>
+        <a:xfrm>
+          <a:off x="81123" y="4031398"/>
+          <a:ext cx="790747" cy="790747"/>
+        </a:xfrm>
+        <a:prstGeom prst="ellipse">
+          <a:avLst/>
+        </a:prstGeom>
+        <a:solidFill>
+          <a:schemeClr val="lt1">
+            <a:hueOff val="0"/>
+            <a:satOff val="0"/>
+            <a:lumOff val="0"/>
+            <a:alphaOff val="0"/>
+          </a:schemeClr>
+        </a:solidFill>
+        <a:ln w="15875" cap="rnd" cmpd="sng" algn="ctr">
+          <a:solidFill>
+            <a:schemeClr val="accent1">
+              <a:hueOff val="0"/>
+              <a:satOff val="0"/>
+              <a:lumOff val="0"/>
+              <a:alphaOff val="0"/>
+            </a:schemeClr>
+          </a:solidFill>
+          <a:prstDash val="solid"/>
+        </a:ln>
+        <a:effectLst/>
+      </dsp:spPr>
+      <dsp:style>
+        <a:lnRef idx="2">
+          <a:scrgbClr r="0" g="0" b="0"/>
+        </a:lnRef>
+        <a:fillRef idx="1">
+          <a:scrgbClr r="0" g="0" b="0"/>
+        </a:fillRef>
+        <a:effectRef idx="0">
+          <a:scrgbClr r="0" g="0" b="0"/>
+        </a:effectRef>
+        <a:fontRef idx="minor"/>
+      </dsp:style>
+    </dsp:sp>
   </dsp:spTree>
 </dsp:drawing>
 </file>
@@ -19258,7 +19944,7 @@
           <a:p>
             <a:fld id="{11DAAD16-308F-41D8-9C6A-2D9DB39F0E79}" type="datetimeFigureOut">
               <a:rPr lang="es-ES" smtClean="0"/>
-              <a:t>11/08/2014</a:t>
+              <a:t>12/08/2014</a:t>
             </a:fld>
             <a:endParaRPr lang="es-ES"/>
           </a:p>
@@ -20855,7 +21541,7 @@
           <a:p>
             <a:fld id="{C1D7BF53-A8BD-41DF-AC66-90ABD219E666}" type="slidenum">
               <a:rPr lang="es-ES" smtClean="0"/>
-              <a:t>18</a:t>
+              <a:t>19</a:t>
             </a:fld>
             <a:endParaRPr lang="es-ES" dirty="0"/>
           </a:p>
@@ -20939,7 +21625,7 @@
           <a:p>
             <a:fld id="{C1D7BF53-A8BD-41DF-AC66-90ABD219E666}" type="slidenum">
               <a:rPr lang="es-ES" smtClean="0"/>
-              <a:t>19</a:t>
+              <a:t>20</a:t>
             </a:fld>
             <a:endParaRPr lang="es-ES"/>
           </a:p>
@@ -22670,7 +23356,7 @@
           <a:effectLst/>
           <a:extLst>
             <a:ext uri="{91240B29-F687-4f45-9708-019B960494DF}">
-              <a14:hiddenLine xmlns:a14="http://schemas.microsoft.com/office/drawing/2010/main" xmlns="" w="9525">
+              <a14:hiddenLine xmlns="" xmlns:a14="http://schemas.microsoft.com/office/drawing/2010/main" w="9525">
                 <a:solidFill>
                   <a:srgbClr val="000000"/>
                 </a:solidFill>
@@ -22863,7 +23549,7 @@
             <a:fld id="{08B9EBBA-996F-894A-B54A-D6246ED52CEA}" type="datetimeFigureOut">
               <a:rPr lang="en-US" dirty="0"/>
               <a:pPr/>
-              <a:t>8/11/2014</a:t>
+              <a:t>8/12/2014</a:t>
             </a:fld>
             <a:endParaRPr lang="en-US" dirty="0"/>
           </a:p>
@@ -23181,7 +23867,7 @@
             <a:fld id="{18C79C5D-2A6F-F04D-97DA-BEF2467B64E4}" type="datetimeFigureOut">
               <a:rPr lang="en-US" dirty="0"/>
               <a:pPr/>
-              <a:t>8/11/2014</a:t>
+              <a:t>8/12/2014</a:t>
             </a:fld>
             <a:endParaRPr lang="en-US" dirty="0"/>
           </a:p>
@@ -23669,7 +24355,7 @@
             <a:fld id="{8DFA1846-DA80-1C48-A609-854EA85C59AD}" type="datetimeFigureOut">
               <a:rPr lang="en-US" dirty="0"/>
               <a:pPr/>
-              <a:t>8/11/2014</a:t>
+              <a:t>8/12/2014</a:t>
             </a:fld>
             <a:endParaRPr lang="en-US" dirty="0"/>
           </a:p>
@@ -24038,7 +24724,7 @@
             <a:fld id="{FBF54567-0DE4-3F47-BF90-CB84690072F9}" type="datetimeFigureOut">
               <a:rPr lang="en-US" dirty="0"/>
               <a:pPr/>
-              <a:t>8/11/2014</a:t>
+              <a:t>8/12/2014</a:t>
             </a:fld>
             <a:endParaRPr lang="en-US" dirty="0"/>
           </a:p>
@@ -24192,7 +24878,7 @@
           <a:ln/>
           <a:extLst>
             <a:ext uri="{91240B29-F687-4f45-9708-019B960494DF}">
-              <a14:hiddenLine xmlns:a14="http://schemas.microsoft.com/office/drawing/2010/main" xmlns="" w="9525">
+              <a14:hiddenLine xmlns="" xmlns:a14="http://schemas.microsoft.com/office/drawing/2010/main" w="9525">
                 <a:solidFill>
                   <a:srgbClr val="000000"/>
                 </a:solidFill>
@@ -24311,7 +24997,7 @@
             <a:fld id="{C6C52C72-DE31-F449-A4ED-4C594FD91407}" type="datetimeFigureOut">
               <a:rPr lang="en-US" dirty="0"/>
               <a:pPr/>
-              <a:t>8/11/2014</a:t>
+              <a:t>8/12/2014</a:t>
             </a:fld>
             <a:endParaRPr lang="en-US" dirty="0"/>
           </a:p>
@@ -24467,7 +25153,7 @@
           <a:ln/>
           <a:extLst>
             <a:ext uri="{91240B29-F687-4f45-9708-019B960494DF}">
-              <a14:hiddenLine xmlns:a14="http://schemas.microsoft.com/office/drawing/2010/main" xmlns="" w="9525">
+              <a14:hiddenLine xmlns="" xmlns:a14="http://schemas.microsoft.com/office/drawing/2010/main" w="9525">
                 <a:solidFill>
                   <a:srgbClr val="000000"/>
                 </a:solidFill>
@@ -24596,7 +25282,7 @@
             <a:fld id="{ED62726E-379B-B349-9EED-81ED093FA806}" type="datetimeFigureOut">
               <a:rPr lang="en-US" dirty="0"/>
               <a:pPr/>
-              <a:t>8/11/2014</a:t>
+              <a:t>8/12/2014</a:t>
             </a:fld>
             <a:endParaRPr lang="en-US" dirty="0"/>
           </a:p>
@@ -24750,7 +25436,7 @@
           <a:ln/>
           <a:extLst>
             <a:ext uri="{91240B29-F687-4f45-9708-019B960494DF}">
-              <a14:hiddenLine xmlns:a14="http://schemas.microsoft.com/office/drawing/2010/main" xmlns="" w="9525">
+              <a14:hiddenLine xmlns="" xmlns:a14="http://schemas.microsoft.com/office/drawing/2010/main" w="9525">
                 <a:solidFill>
                   <a:srgbClr val="000000"/>
                 </a:solidFill>
@@ -24879,7 +25565,7 @@
             <a:fld id="{9B3A1323-8D79-1946-B0D7-40001CF92E9D}" type="datetimeFigureOut">
               <a:rPr lang="en-US" dirty="0"/>
               <a:pPr/>
-              <a:t>8/11/2014</a:t>
+              <a:t>8/12/2014</a:t>
             </a:fld>
             <a:endParaRPr lang="en-US" dirty="0"/>
           </a:p>
@@ -25229,7 +25915,7 @@
             <a:fld id="{8DFA1846-DA80-1C48-A609-854EA85C59AD}" type="datetimeFigureOut">
               <a:rPr lang="en-US" dirty="0"/>
               <a:pPr/>
-              <a:t>8/11/2014</a:t>
+              <a:t>8/12/2014</a:t>
             </a:fld>
             <a:endParaRPr lang="en-US" dirty="0"/>
           </a:p>
@@ -25383,7 +26069,7 @@
           <a:ln/>
           <a:extLst>
             <a:ext uri="{91240B29-F687-4f45-9708-019B960494DF}">
-              <a14:hiddenLine xmlns:a14="http://schemas.microsoft.com/office/drawing/2010/main" xmlns="" w="9525">
+              <a14:hiddenLine xmlns="" xmlns:a14="http://schemas.microsoft.com/office/drawing/2010/main" w="9525">
                 <a:solidFill>
                   <a:srgbClr val="000000"/>
                 </a:solidFill>
@@ -25568,7 +26254,7 @@
             <a:fld id="{57302355-E14B-8545-A8F8-0FE83CC9D524}" type="datetimeFigureOut">
               <a:rPr lang="en-US" dirty="0"/>
               <a:pPr/>
-              <a:t>8/11/2014</a:t>
+              <a:t>8/12/2014</a:t>
             </a:fld>
             <a:endParaRPr lang="en-US" dirty="0"/>
           </a:p>
@@ -25722,7 +26408,7 @@
           <a:ln/>
           <a:extLst>
             <a:ext uri="{91240B29-F687-4f45-9708-019B960494DF}">
-              <a14:hiddenLine xmlns:a14="http://schemas.microsoft.com/office/drawing/2010/main" xmlns="" w="9525">
+              <a14:hiddenLine xmlns="" xmlns:a14="http://schemas.microsoft.com/office/drawing/2010/main" w="9525">
                 <a:solidFill>
                   <a:srgbClr val="000000"/>
                 </a:solidFill>
@@ -26045,7 +26731,7 @@
             <a:fld id="{02640F58-564D-2B4F-AE67-E407BA4FCF45}" type="datetimeFigureOut">
               <a:rPr lang="en-US" dirty="0"/>
               <a:pPr/>
-              <a:t>8/11/2014</a:t>
+              <a:t>8/12/2014</a:t>
             </a:fld>
             <a:endParaRPr lang="en-US" dirty="0"/>
           </a:p>
@@ -26199,7 +26885,7 @@
           <a:ln/>
           <a:extLst>
             <a:ext uri="{91240B29-F687-4f45-9708-019B960494DF}">
-              <a14:hiddenLine xmlns:a14="http://schemas.microsoft.com/office/drawing/2010/main" xmlns="" w="9525">
+              <a14:hiddenLine xmlns="" xmlns:a14="http://schemas.microsoft.com/office/drawing/2010/main" w="9525">
                 <a:solidFill>
                   <a:srgbClr val="000000"/>
                 </a:solidFill>
@@ -26266,7 +26952,7 @@
             <a:fld id="{F13A34C8-038E-2045-AF43-DF7DBB8E0E9E}" type="datetimeFigureOut">
               <a:rPr lang="en-US" dirty="0"/>
               <a:pPr/>
-              <a:t>8/11/2014</a:t>
+              <a:t>8/12/2014</a:t>
             </a:fld>
             <a:endParaRPr lang="en-US" dirty="0"/>
           </a:p>
@@ -26361,7 +27047,7 @@
             <a:fld id="{8818C68F-D26B-8F47-958C-23B49CF8A634}" type="datetimeFigureOut">
               <a:rPr lang="en-US" dirty="0"/>
               <a:pPr/>
-              <a:t>8/11/2014</a:t>
+              <a:t>8/12/2014</a:t>
             </a:fld>
             <a:endParaRPr lang="en-US" dirty="0"/>
           </a:p>
@@ -26628,7 +27314,7 @@
           <a:ln/>
           <a:extLst>
             <a:ext uri="{91240B29-F687-4f45-9708-019B960494DF}">
-              <a14:hiddenLine xmlns:a14="http://schemas.microsoft.com/office/drawing/2010/main" xmlns="" w="9525">
+              <a14:hiddenLine xmlns="" xmlns:a14="http://schemas.microsoft.com/office/drawing/2010/main" w="9525">
                 <a:solidFill>
                   <a:srgbClr val="000000"/>
                 </a:solidFill>
@@ -26828,7 +27514,7 @@
             <a:fld id="{D0DF5E60-9974-AC48-9591-99C2BB44B7CF}" type="datetimeFigureOut">
               <a:rPr lang="en-US" dirty="0"/>
               <a:pPr/>
-              <a:t>8/11/2014</a:t>
+              <a:t>8/12/2014</a:t>
             </a:fld>
             <a:endParaRPr lang="en-US" dirty="0"/>
           </a:p>
@@ -27141,7 +27827,7 @@
             <a:fld id="{18C79C5D-2A6F-F04D-97DA-BEF2467B64E4}" type="datetimeFigureOut">
               <a:rPr lang="en-US" dirty="0"/>
               <a:pPr/>
-              <a:t>8/11/2014</a:t>
+              <a:t>8/12/2014</a:t>
             </a:fld>
             <a:endParaRPr lang="en-US" dirty="0"/>
           </a:p>
@@ -27411,7 +28097,7 @@
             <a:fld id="{09B482E8-6E0E-1B4F-B1FD-C69DB9E858D9}" type="datetimeFigureOut">
               <a:rPr lang="en-US" dirty="0"/>
               <a:pPr/>
-              <a:t>8/11/2014</a:t>
+              <a:t>8/12/2014</a:t>
             </a:fld>
             <a:endParaRPr lang="en-US" dirty="0"/>
           </a:p>
@@ -32942,6 +33628,488 @@
           <a:p>
             <a:r>
               <a:rPr lang="es-ES" dirty="0" smtClean="0"/>
+              <a:t>Relación entre Clases </a:t>
+            </a:r>
+            <a:endParaRPr lang="es-ES" dirty="0"/>
+          </a:p>
+        </p:txBody>
+      </p:sp>
+      <p:pic>
+        <p:nvPicPr>
+          <p:cNvPr id="5" name="Imagen 4"/>
+          <p:cNvPicPr>
+            <a:picLocks noChangeAspect="1"/>
+          </p:cNvPicPr>
+          <p:nvPr/>
+        </p:nvPicPr>
+        <p:blipFill>
+          <a:blip r:embed="rId2">
+            <a:grayscl/>
+            <a:extLst>
+              <a:ext uri="{28A0092B-C50C-407E-A947-70E740481C1C}">
+                <a14:useLocalDpi xmlns:a14="http://schemas.microsoft.com/office/drawing/2010/main" val="0"/>
+              </a:ext>
+            </a:extLst>
+          </a:blip>
+          <a:stretch>
+            <a:fillRect/>
+          </a:stretch>
+        </p:blipFill>
+        <p:spPr>
+          <a:xfrm>
+            <a:off x="418841" y="3814"/>
+            <a:ext cx="1780799" cy="1798832"/>
+          </a:xfrm>
+          <a:prstGeom prst="rect">
+            <a:avLst/>
+          </a:prstGeom>
+        </p:spPr>
+      </p:pic>
+      <p:sp>
+        <p:nvSpPr>
+          <p:cNvPr id="6" name="Rectángulo redondeado 5"/>
+          <p:cNvSpPr/>
+          <p:nvPr/>
+        </p:nvSpPr>
+        <p:spPr>
+          <a:xfrm>
+            <a:off x="1168400" y="2049516"/>
+            <a:ext cx="9677400" cy="4707667"/>
+          </a:xfrm>
+          <a:prstGeom prst="roundRect">
+            <a:avLst/>
+          </a:prstGeom>
+          <a:solidFill>
+            <a:schemeClr val="accent1">
+              <a:lumMod val="20000"/>
+              <a:lumOff val="80000"/>
+            </a:schemeClr>
+          </a:solidFill>
+        </p:spPr>
+        <p:style>
+          <a:lnRef idx="2">
+            <a:schemeClr val="accent1"/>
+          </a:lnRef>
+          <a:fillRef idx="1">
+            <a:schemeClr val="lt1"/>
+          </a:fillRef>
+          <a:effectRef idx="0">
+            <a:schemeClr val="accent1"/>
+          </a:effectRef>
+          <a:fontRef idx="minor">
+            <a:schemeClr val="dk1"/>
+          </a:fontRef>
+        </p:style>
+        <p:txBody>
+          <a:bodyPr rtlCol="0" anchor="ctr"/>
+          <a:lstStyle/>
+          <a:p>
+            <a:pPr algn="ctr"/>
+            <a:endParaRPr lang="es-ES"/>
+          </a:p>
+        </p:txBody>
+      </p:sp>
+      <p:pic>
+        <p:nvPicPr>
+          <p:cNvPr id="2" name="Imagen 1"/>
+          <p:cNvPicPr>
+            <a:picLocks noChangeAspect="1"/>
+          </p:cNvPicPr>
+          <p:nvPr/>
+        </p:nvPicPr>
+        <p:blipFill>
+          <a:blip r:embed="rId3"/>
+          <a:stretch>
+            <a:fillRect/>
+          </a:stretch>
+        </p:blipFill>
+        <p:spPr>
+          <a:xfrm>
+            <a:off x="1974984" y="3072656"/>
+            <a:ext cx="8064231" cy="3684528"/>
+          </a:xfrm>
+          <a:prstGeom prst="rect">
+            <a:avLst/>
+          </a:prstGeom>
+        </p:spPr>
+      </p:pic>
+      <p:sp>
+        <p:nvSpPr>
+          <p:cNvPr id="7" name="CuadroTexto 6"/>
+          <p:cNvSpPr txBox="1"/>
+          <p:nvPr/>
+        </p:nvSpPr>
+        <p:spPr>
+          <a:xfrm>
+            <a:off x="2390623" y="2448041"/>
+            <a:ext cx="1119352" cy="461665"/>
+          </a:xfrm>
+          <a:prstGeom prst="rect">
+            <a:avLst/>
+          </a:prstGeom>
+          <a:noFill/>
+        </p:spPr>
+        <p:txBody>
+          <a:bodyPr wrap="square" rtlCol="0">
+            <a:spAutoFit/>
+          </a:bodyPr>
+          <a:lstStyle/>
+          <a:p>
+            <a:r>
+              <a:rPr lang="es-ES" sz="2400" b="1" dirty="0" smtClean="0">
+                <a:solidFill>
+                  <a:schemeClr val="accent1">
+                    <a:lumMod val="75000"/>
+                  </a:schemeClr>
+                </a:solidFill>
+                <a:effectLst>
+                  <a:outerShdw blurRad="38100" dist="38100" dir="2700000" algn="tl">
+                    <a:srgbClr val="000000">
+                      <a:alpha val="43137"/>
+                    </a:srgbClr>
+                  </a:outerShdw>
+                </a:effectLst>
+              </a:rPr>
+              <a:t>Web</a:t>
+            </a:r>
+            <a:endParaRPr lang="es-ES" sz="2400" b="1" dirty="0">
+              <a:solidFill>
+                <a:schemeClr val="accent1">
+                  <a:lumMod val="75000"/>
+                </a:schemeClr>
+              </a:solidFill>
+              <a:effectLst>
+                <a:outerShdw blurRad="38100" dist="38100" dir="2700000" algn="tl">
+                  <a:srgbClr val="000000">
+                    <a:alpha val="43137"/>
+                  </a:srgbClr>
+                </a:outerShdw>
+              </a:effectLst>
+            </a:endParaRPr>
+          </a:p>
+        </p:txBody>
+      </p:sp>
+      <p:sp>
+        <p:nvSpPr>
+          <p:cNvPr id="8" name="CuadroTexto 7"/>
+          <p:cNvSpPr txBox="1"/>
+          <p:nvPr/>
+        </p:nvSpPr>
+        <p:spPr>
+          <a:xfrm>
+            <a:off x="4860762" y="2433659"/>
+            <a:ext cx="1963077" cy="461665"/>
+          </a:xfrm>
+          <a:prstGeom prst="rect">
+            <a:avLst/>
+          </a:prstGeom>
+          <a:noFill/>
+        </p:spPr>
+        <p:txBody>
+          <a:bodyPr wrap="square" rtlCol="0">
+            <a:spAutoFit/>
+          </a:bodyPr>
+          <a:lstStyle/>
+          <a:p>
+            <a:r>
+              <a:rPr lang="es-ES" sz="2400" b="1" dirty="0" smtClean="0">
+                <a:solidFill>
+                  <a:schemeClr val="accent1">
+                    <a:lumMod val="75000"/>
+                  </a:schemeClr>
+                </a:solidFill>
+                <a:effectLst>
+                  <a:outerShdw blurRad="38100" dist="38100" dir="2700000" algn="tl">
+                    <a:srgbClr val="000000">
+                      <a:alpha val="43137"/>
+                    </a:srgbClr>
+                  </a:outerShdw>
+                </a:effectLst>
+              </a:rPr>
+              <a:t>Lógica</a:t>
+            </a:r>
+            <a:endParaRPr lang="es-ES" sz="2400" b="1" dirty="0">
+              <a:solidFill>
+                <a:schemeClr val="accent1">
+                  <a:lumMod val="75000"/>
+                </a:schemeClr>
+              </a:solidFill>
+              <a:effectLst>
+                <a:outerShdw blurRad="38100" dist="38100" dir="2700000" algn="tl">
+                  <a:srgbClr val="000000">
+                    <a:alpha val="43137"/>
+                  </a:srgbClr>
+                </a:outerShdw>
+              </a:effectLst>
+            </a:endParaRPr>
+          </a:p>
+        </p:txBody>
+      </p:sp>
+      <p:sp>
+        <p:nvSpPr>
+          <p:cNvPr id="9" name="CuadroTexto 8"/>
+          <p:cNvSpPr txBox="1"/>
+          <p:nvPr/>
+        </p:nvSpPr>
+        <p:spPr>
+          <a:xfrm>
+            <a:off x="7639503" y="2285091"/>
+            <a:ext cx="2899914" cy="830997"/>
+          </a:xfrm>
+          <a:prstGeom prst="rect">
+            <a:avLst/>
+          </a:prstGeom>
+          <a:noFill/>
+        </p:spPr>
+        <p:txBody>
+          <a:bodyPr wrap="square" rtlCol="0">
+            <a:spAutoFit/>
+          </a:bodyPr>
+          <a:lstStyle/>
+          <a:p>
+            <a:r>
+              <a:rPr lang="es-ES" sz="2400" b="1" dirty="0" smtClean="0">
+                <a:solidFill>
+                  <a:schemeClr val="accent1">
+                    <a:lumMod val="75000"/>
+                  </a:schemeClr>
+                </a:solidFill>
+                <a:effectLst>
+                  <a:outerShdw blurRad="38100" dist="38100" dir="2700000" algn="tl">
+                    <a:srgbClr val="000000">
+                      <a:alpha val="43137"/>
+                    </a:srgbClr>
+                  </a:outerShdw>
+                </a:effectLst>
+              </a:rPr>
+              <a:t>Entidad / Acceso a Datos</a:t>
+            </a:r>
+            <a:endParaRPr lang="es-ES" sz="2400" b="1" dirty="0">
+              <a:solidFill>
+                <a:schemeClr val="accent1">
+                  <a:lumMod val="75000"/>
+                </a:schemeClr>
+              </a:solidFill>
+              <a:effectLst>
+                <a:outerShdw blurRad="38100" dist="38100" dir="2700000" algn="tl">
+                  <a:srgbClr val="000000">
+                    <a:alpha val="43137"/>
+                  </a:srgbClr>
+                </a:outerShdw>
+              </a:effectLst>
+            </a:endParaRPr>
+          </a:p>
+        </p:txBody>
+      </p:sp>
+      <p:cxnSp>
+        <p:nvCxnSpPr>
+          <p:cNvPr id="11" name="Conector recto 10"/>
+          <p:cNvCxnSpPr/>
+          <p:nvPr/>
+        </p:nvCxnSpPr>
+        <p:spPr>
+          <a:xfrm flipH="1">
+            <a:off x="3925614" y="2285091"/>
+            <a:ext cx="31531" cy="4210302"/>
+          </a:xfrm>
+          <a:prstGeom prst="line">
+            <a:avLst/>
+          </a:prstGeom>
+          <a:ln w="38100">
+            <a:prstDash val="dash"/>
+          </a:ln>
+        </p:spPr>
+        <p:style>
+          <a:lnRef idx="1">
+            <a:schemeClr val="accent1"/>
+          </a:lnRef>
+          <a:fillRef idx="0">
+            <a:schemeClr val="accent1"/>
+          </a:fillRef>
+          <a:effectRef idx="0">
+            <a:schemeClr val="accent1"/>
+          </a:effectRef>
+          <a:fontRef idx="minor">
+            <a:schemeClr val="tx1"/>
+          </a:fontRef>
+        </p:style>
+      </p:cxnSp>
+      <p:cxnSp>
+        <p:nvCxnSpPr>
+          <p:cNvPr id="12" name="Conector recto 11"/>
+          <p:cNvCxnSpPr/>
+          <p:nvPr/>
+        </p:nvCxnSpPr>
+        <p:spPr>
+          <a:xfrm flipH="1">
+            <a:off x="7086328" y="2348216"/>
+            <a:ext cx="31531" cy="4210302"/>
+          </a:xfrm>
+          <a:prstGeom prst="line">
+            <a:avLst/>
+          </a:prstGeom>
+          <a:ln w="38100">
+            <a:prstDash val="dash"/>
+          </a:ln>
+        </p:spPr>
+        <p:style>
+          <a:lnRef idx="1">
+            <a:schemeClr val="accent1"/>
+          </a:lnRef>
+          <a:fillRef idx="0">
+            <a:schemeClr val="accent1"/>
+          </a:fillRef>
+          <a:effectRef idx="0">
+            <a:schemeClr val="accent1"/>
+          </a:effectRef>
+          <a:fontRef idx="minor">
+            <a:schemeClr val="tx1"/>
+          </a:fontRef>
+        </p:style>
+      </p:cxnSp>
+    </p:spTree>
+    <p:extLst>
+      <p:ext uri="{BB962C8B-B14F-4D97-AF65-F5344CB8AC3E}">
+        <p14:creationId xmlns:p14="http://schemas.microsoft.com/office/powerpoint/2010/main" val="3630554406"/>
+      </p:ext>
+    </p:extLst>
+  </p:cSld>
+  <p:clrMapOvr>
+    <a:masterClrMapping/>
+  </p:clrMapOvr>
+  <p:transition spd="med">
+    <p:fade/>
+  </p:transition>
+  <p:timing>
+    <p:tnLst>
+      <p:par>
+        <p:cTn id="1" dur="indefinite" restart="never" nodeType="tmRoot"/>
+      </p:par>
+    </p:tnLst>
+  </p:timing>
+</p:sld>
+</file>
+
+<file path=ppt/slides/slide18.xml><?xml version="1.0" encoding="utf-8"?>
+<p:sld xmlns:a="http://schemas.openxmlformats.org/drawingml/2006/main" xmlns:r="http://schemas.openxmlformats.org/officeDocument/2006/relationships" xmlns:p="http://schemas.openxmlformats.org/presentationml/2006/main">
+  <p:cSld>
+    <p:spTree>
+      <p:nvGrpSpPr>
+        <p:cNvPr id="1" name=""/>
+        <p:cNvGrpSpPr/>
+        <p:nvPr/>
+      </p:nvGrpSpPr>
+      <p:grpSpPr>
+        <a:xfrm>
+          <a:off x="0" y="0"/>
+          <a:ext cx="0" cy="0"/>
+          <a:chOff x="0" y="0"/>
+          <a:chExt cx="0" cy="0"/>
+        </a:xfrm>
+      </p:grpSpPr>
+      <p:sp>
+        <p:nvSpPr>
+          <p:cNvPr id="4" name="Título 1"/>
+          <p:cNvSpPr txBox="1">
+            <a:spLocks/>
+          </p:cNvSpPr>
+          <p:nvPr/>
+        </p:nvSpPr>
+        <p:spPr>
+          <a:xfrm>
+            <a:off x="2199640" y="107756"/>
+            <a:ext cx="9248398" cy="970450"/>
+          </a:xfrm>
+          <a:prstGeom prst="rect">
+            <a:avLst/>
+          </a:prstGeom>
+          <a:effectLst>
+            <a:outerShdw blurRad="50800" dir="14400000">
+              <a:srgbClr val="000000">
+                <a:alpha val="60000"/>
+              </a:srgbClr>
+            </a:outerShdw>
+          </a:effectLst>
+        </p:spPr>
+        <p:txBody>
+          <a:bodyPr vert="horz" lIns="91440" tIns="45720" rIns="91440" bIns="45720" rtlCol="0" anchor="b">
+            <a:noAutofit/>
+          </a:bodyPr>
+          <a:lstStyle>
+            <a:lvl1pPr algn="l" defTabSz="457200" rtl="0" eaLnBrk="1" latinLnBrk="0" hangingPunct="1">
+              <a:spcBef>
+                <a:spcPct val="0"/>
+              </a:spcBef>
+              <a:buNone/>
+              <a:defRPr sz="4000" b="1" kern="1200">
+                <a:solidFill>
+                  <a:srgbClr val="FEFEFE"/>
+                </a:solidFill>
+                <a:latin typeface="+mj-lt"/>
+                <a:ea typeface="+mj-ea"/>
+                <a:cs typeface="+mj-cs"/>
+              </a:defRPr>
+            </a:lvl1pPr>
+            <a:lvl2pPr eaLnBrk="1" hangingPunct="1">
+              <a:defRPr>
+                <a:solidFill>
+                  <a:schemeClr val="tx2"/>
+                </a:solidFill>
+              </a:defRPr>
+            </a:lvl2pPr>
+            <a:lvl3pPr eaLnBrk="1" hangingPunct="1">
+              <a:defRPr>
+                <a:solidFill>
+                  <a:schemeClr val="tx2"/>
+                </a:solidFill>
+              </a:defRPr>
+            </a:lvl3pPr>
+            <a:lvl4pPr eaLnBrk="1" hangingPunct="1">
+              <a:defRPr>
+                <a:solidFill>
+                  <a:schemeClr val="tx2"/>
+                </a:solidFill>
+              </a:defRPr>
+            </a:lvl4pPr>
+            <a:lvl5pPr eaLnBrk="1" hangingPunct="1">
+              <a:defRPr>
+                <a:solidFill>
+                  <a:schemeClr val="tx2"/>
+                </a:solidFill>
+              </a:defRPr>
+            </a:lvl5pPr>
+            <a:lvl6pPr eaLnBrk="1" hangingPunct="1">
+              <a:defRPr>
+                <a:solidFill>
+                  <a:schemeClr val="tx2"/>
+                </a:solidFill>
+              </a:defRPr>
+            </a:lvl6pPr>
+            <a:lvl7pPr eaLnBrk="1" hangingPunct="1">
+              <a:defRPr>
+                <a:solidFill>
+                  <a:schemeClr val="tx2"/>
+                </a:solidFill>
+              </a:defRPr>
+            </a:lvl7pPr>
+            <a:lvl8pPr eaLnBrk="1" hangingPunct="1">
+              <a:defRPr>
+                <a:solidFill>
+                  <a:schemeClr val="tx2"/>
+                </a:solidFill>
+              </a:defRPr>
+            </a:lvl8pPr>
+            <a:lvl9pPr eaLnBrk="1" hangingPunct="1">
+              <a:defRPr>
+                <a:solidFill>
+                  <a:schemeClr val="tx2"/>
+                </a:solidFill>
+              </a:defRPr>
+            </a:lvl9pPr>
+          </a:lstStyle>
+          <a:p>
+            <a:r>
+              <a:rPr lang="es-ES" dirty="0" smtClean="0"/>
               <a:t>Diagrama de Clases (Entidades)</a:t>
             </a:r>
             <a:endParaRPr lang="es-ES" dirty="0"/>
@@ -32993,6 +34161,12 @@
           <a:prstGeom prst="roundRect">
             <a:avLst/>
           </a:prstGeom>
+          <a:solidFill>
+            <a:schemeClr val="accent1">
+              <a:lumMod val="20000"/>
+              <a:lumOff val="80000"/>
+            </a:schemeClr>
+          </a:solidFill>
         </p:spPr>
         <p:style>
           <a:lnRef idx="2">
@@ -33019,7 +34193,7 @@
       </p:sp>
       <p:pic>
         <p:nvPicPr>
-          <p:cNvPr id="2" name="Imagen 1"/>
+          <p:cNvPr id="3" name="Imagen 2"/>
           <p:cNvPicPr>
             <a:picLocks noChangeAspect="1"/>
           </p:cNvPicPr>
@@ -33041,15 +34215,12 @@
         </p:blipFill>
         <p:spPr>
           <a:xfrm>
-            <a:off x="1349829" y="1836891"/>
-            <a:ext cx="9187542" cy="4990822"/>
+            <a:off x="1781504" y="1906588"/>
+            <a:ext cx="8451799" cy="4762226"/>
           </a:xfrm>
           <a:prstGeom prst="rect">
             <a:avLst/>
           </a:prstGeom>
-          <a:ln>
-            <a:noFill/>
-          </a:ln>
         </p:spPr>
       </p:pic>
     </p:spTree>
@@ -33075,7 +34246,7 @@
 </p:sld>
 </file>
 
-<file path=ppt/slides/slide18.xml><?xml version="1.0" encoding="utf-8"?>
+<file path=ppt/slides/slide19.xml><?xml version="1.0" encoding="utf-8"?>
 <p:sld xmlns:a="http://schemas.openxmlformats.org/drawingml/2006/main" xmlns:r="http://schemas.openxmlformats.org/officeDocument/2006/relationships" xmlns:p="http://schemas.openxmlformats.org/presentationml/2006/main">
   <p:cSld>
     <p:spTree>
@@ -36190,360 +37361,6 @@
 </p:sld>
 </file>
 
-<file path=ppt/slides/slide19.xml><?xml version="1.0" encoding="utf-8"?>
-<p:sld xmlns:a="http://schemas.openxmlformats.org/drawingml/2006/main" xmlns:r="http://schemas.openxmlformats.org/officeDocument/2006/relationships" xmlns:p="http://schemas.openxmlformats.org/presentationml/2006/main">
-  <p:cSld>
-    <p:spTree>
-      <p:nvGrpSpPr>
-        <p:cNvPr id="1" name=""/>
-        <p:cNvGrpSpPr/>
-        <p:nvPr/>
-      </p:nvGrpSpPr>
-      <p:grpSpPr>
-        <a:xfrm>
-          <a:off x="0" y="0"/>
-          <a:ext cx="0" cy="0"/>
-          <a:chOff x="0" y="0"/>
-          <a:chExt cx="0" cy="0"/>
-        </a:xfrm>
-      </p:grpSpPr>
-      <p:sp>
-        <p:nvSpPr>
-          <p:cNvPr id="2" name="Título 1"/>
-          <p:cNvSpPr>
-            <a:spLocks noGrp="1"/>
-          </p:cNvSpPr>
-          <p:nvPr>
-            <p:ph type="title"/>
-          </p:nvPr>
-        </p:nvSpPr>
-        <p:spPr>
-          <a:xfrm>
-            <a:off x="2247899" y="192581"/>
-            <a:ext cx="9172198" cy="970450"/>
-          </a:xfrm>
-        </p:spPr>
-        <p:txBody>
-          <a:bodyPr/>
-          <a:lstStyle/>
-          <a:p>
-            <a:r>
-              <a:rPr lang="es-AR" dirty="0" smtClean="0"/>
-              <a:t>Fin</a:t>
-            </a:r>
-            <a:endParaRPr lang="es-AR" dirty="0"/>
-          </a:p>
-        </p:txBody>
-      </p:sp>
-      <p:pic>
-        <p:nvPicPr>
-          <p:cNvPr id="5" name="Imagen 4"/>
-          <p:cNvPicPr>
-            <a:picLocks noChangeAspect="1"/>
-          </p:cNvPicPr>
-          <p:nvPr/>
-        </p:nvPicPr>
-        <p:blipFill>
-          <a:blip r:embed="rId3">
-            <a:grayscl/>
-            <a:extLst>
-              <a:ext uri="{28A0092B-C50C-407E-A947-70E740481C1C}">
-                <a14:useLocalDpi xmlns:a14="http://schemas.microsoft.com/office/drawing/2010/main" val="0"/>
-              </a:ext>
-            </a:extLst>
-          </a:blip>
-          <a:stretch>
-            <a:fillRect/>
-          </a:stretch>
-        </p:blipFill>
-        <p:spPr>
-          <a:xfrm>
-            <a:off x="422650" y="0"/>
-            <a:ext cx="1780799" cy="1798832"/>
-          </a:xfrm>
-          <a:prstGeom prst="rect">
-            <a:avLst/>
-          </a:prstGeom>
-        </p:spPr>
-      </p:pic>
-      <p:sp>
-        <p:nvSpPr>
-          <p:cNvPr id="23" name="CuadroTexto 22"/>
-          <p:cNvSpPr txBox="1"/>
-          <p:nvPr/>
-        </p:nvSpPr>
-        <p:spPr>
-          <a:xfrm>
-            <a:off x="4430630" y="2974726"/>
-            <a:ext cx="3166280" cy="1323439"/>
-          </a:xfrm>
-          <a:prstGeom prst="rect">
-            <a:avLst/>
-          </a:prstGeom>
-          <a:ln w="19050">
-            <a:solidFill>
-              <a:schemeClr val="tx1">
-                <a:lumMod val="75000"/>
-              </a:schemeClr>
-            </a:solidFill>
-          </a:ln>
-        </p:spPr>
-        <p:style>
-          <a:lnRef idx="1">
-            <a:schemeClr val="accent1"/>
-          </a:lnRef>
-          <a:fillRef idx="3">
-            <a:schemeClr val="accent1"/>
-          </a:fillRef>
-          <a:effectRef idx="2">
-            <a:schemeClr val="accent1"/>
-          </a:effectRef>
-          <a:fontRef idx="minor">
-            <a:schemeClr val="lt1"/>
-          </a:fontRef>
-        </p:style>
-        <p:txBody>
-          <a:bodyPr wrap="square" rtlCol="0">
-            <a:spAutoFit/>
-          </a:bodyPr>
-          <a:lstStyle/>
-          <a:p>
-            <a:pPr algn="ctr"/>
-            <a:r>
-              <a:rPr lang="es-AR" sz="8000" dirty="0" smtClean="0"/>
-              <a:t>Fin</a:t>
-            </a:r>
-            <a:endParaRPr lang="es-AR" sz="8000" dirty="0"/>
-          </a:p>
-        </p:txBody>
-      </p:sp>
-      <p:sp>
-        <p:nvSpPr>
-          <p:cNvPr id="3" name="CuadroTexto 2"/>
-          <p:cNvSpPr txBox="1"/>
-          <p:nvPr/>
-        </p:nvSpPr>
-        <p:spPr>
-          <a:xfrm>
-            <a:off x="4249227" y="4351188"/>
-            <a:ext cx="3835020" cy="769441"/>
-          </a:xfrm>
-          <a:prstGeom prst="rect">
-            <a:avLst/>
-          </a:prstGeom>
-          <a:noFill/>
-        </p:spPr>
-        <p:txBody>
-          <a:bodyPr wrap="square" rtlCol="0">
-            <a:spAutoFit/>
-          </a:bodyPr>
-          <a:lstStyle/>
-          <a:p>
-            <a:r>
-              <a:rPr lang="es-AR" sz="4400" dirty="0" smtClean="0">
-                <a:solidFill>
-                  <a:schemeClr val="tx1">
-                    <a:lumMod val="85000"/>
-                  </a:schemeClr>
-                </a:solidFill>
-                <a:latin typeface="Arial" panose="020B0604020202020204" pitchFamily="34" charset="0"/>
-                <a:cs typeface="Arial" panose="020B0604020202020204" pitchFamily="34" charset="0"/>
-              </a:rPr>
-              <a:t>¿</a:t>
-            </a:r>
-            <a:r>
-              <a:rPr lang="es-AR" sz="4400" dirty="0" smtClean="0">
-                <a:solidFill>
-                  <a:schemeClr val="tx1">
-                    <a:lumMod val="85000"/>
-                  </a:schemeClr>
-                </a:solidFill>
-              </a:rPr>
-              <a:t>Preguntas</a:t>
-            </a:r>
-            <a:r>
-              <a:rPr lang="es-AR" sz="4400" dirty="0" smtClean="0">
-                <a:solidFill>
-                  <a:schemeClr val="tx1">
-                    <a:lumMod val="85000"/>
-                  </a:schemeClr>
-                </a:solidFill>
-                <a:latin typeface="Arial" panose="020B0604020202020204" pitchFamily="34" charset="0"/>
-                <a:cs typeface="Arial" panose="020B0604020202020204" pitchFamily="34" charset="0"/>
-              </a:rPr>
-              <a:t>?</a:t>
-            </a:r>
-            <a:endParaRPr lang="es-ES" sz="4400" dirty="0">
-              <a:solidFill>
-                <a:schemeClr val="tx1">
-                  <a:lumMod val="85000"/>
-                </a:schemeClr>
-              </a:solidFill>
-              <a:latin typeface="Arial" panose="020B0604020202020204" pitchFamily="34" charset="0"/>
-              <a:cs typeface="Arial" panose="020B0604020202020204" pitchFamily="34" charset="0"/>
-            </a:endParaRPr>
-          </a:p>
-        </p:txBody>
-      </p:sp>
-    </p:spTree>
-    <p:extLst>
-      <p:ext uri="{BB962C8B-B14F-4D97-AF65-F5344CB8AC3E}">
-        <p14:creationId xmlns:p14="http://schemas.microsoft.com/office/powerpoint/2010/main" val="2669761933"/>
-      </p:ext>
-    </p:extLst>
-  </p:cSld>
-  <p:clrMapOvr>
-    <a:masterClrMapping/>
-  </p:clrMapOvr>
-  <p:transition spd="med">
-    <p:fade/>
-  </p:transition>
-  <p:timing>
-    <p:tnLst>
-      <p:par>
-        <p:cTn id="1" dur="indefinite" restart="never" nodeType="tmRoot">
-          <p:childTnLst>
-            <p:seq concurrent="1" nextAc="seek">
-              <p:cTn id="2" dur="indefinite" nodeType="mainSeq">
-                <p:childTnLst>
-                  <p:par>
-                    <p:cTn id="3" fill="hold">
-                      <p:stCondLst>
-                        <p:cond delay="indefinite"/>
-                        <p:cond evt="onBegin" delay="0">
-                          <p:tn val="2"/>
-                        </p:cond>
-                      </p:stCondLst>
-                      <p:childTnLst>
-                        <p:par>
-                          <p:cTn id="4" fill="hold">
-                            <p:stCondLst>
-                              <p:cond delay="0"/>
-                            </p:stCondLst>
-                            <p:childTnLst>
-                              <p:par>
-                                <p:cTn id="5" presetID="10" presetClass="entr" presetSubtype="0" fill="hold" grpId="0" nodeType="afterEffect">
-                                  <p:stCondLst>
-                                    <p:cond delay="0"/>
-                                  </p:stCondLst>
-                                  <p:childTnLst>
-                                    <p:set>
-                                      <p:cBhvr>
-                                        <p:cTn id="6" dur="1" fill="hold">
-                                          <p:stCondLst>
-                                            <p:cond delay="0"/>
-                                          </p:stCondLst>
-                                        </p:cTn>
-                                        <p:tgtEl>
-                                          <p:spTgt spid="23"/>
-                                        </p:tgtEl>
-                                        <p:attrNameLst>
-                                          <p:attrName>style.visibility</p:attrName>
-                                        </p:attrNameLst>
-                                      </p:cBhvr>
-                                      <p:to>
-                                        <p:strVal val="visible"/>
-                                      </p:to>
-                                    </p:set>
-                                    <p:animEffect transition="in" filter="fade">
-                                      <p:cBhvr>
-                                        <p:cTn id="7" dur="500"/>
-                                        <p:tgtEl>
-                                          <p:spTgt spid="23"/>
-                                        </p:tgtEl>
-                                      </p:cBhvr>
-                                    </p:animEffect>
-                                  </p:childTnLst>
-                                </p:cTn>
-                              </p:par>
-                            </p:childTnLst>
-                          </p:cTn>
-                        </p:par>
-                      </p:childTnLst>
-                    </p:cTn>
-                  </p:par>
-                  <p:par>
-                    <p:cTn id="8" fill="hold">
-                      <p:stCondLst>
-                        <p:cond delay="indefinite"/>
-                      </p:stCondLst>
-                      <p:childTnLst>
-                        <p:par>
-                          <p:cTn id="9" fill="hold">
-                            <p:stCondLst>
-                              <p:cond delay="0"/>
-                            </p:stCondLst>
-                            <p:childTnLst>
-                              <p:par>
-                                <p:cTn id="10" presetID="10" presetClass="entr" presetSubtype="0" fill="hold" grpId="0" nodeType="clickEffect">
-                                  <p:stCondLst>
-                                    <p:cond delay="0"/>
-                                  </p:stCondLst>
-                                  <p:childTnLst>
-                                    <p:set>
-                                      <p:cBhvr>
-                                        <p:cTn id="11" dur="1" fill="hold">
-                                          <p:stCondLst>
-                                            <p:cond delay="0"/>
-                                          </p:stCondLst>
-                                        </p:cTn>
-                                        <p:tgtEl>
-                                          <p:spTgt spid="3"/>
-                                        </p:tgtEl>
-                                        <p:attrNameLst>
-                                          <p:attrName>style.visibility</p:attrName>
-                                        </p:attrNameLst>
-                                      </p:cBhvr>
-                                      <p:to>
-                                        <p:strVal val="visible"/>
-                                      </p:to>
-                                    </p:set>
-                                    <p:animEffect transition="in" filter="fade">
-                                      <p:cBhvr>
-                                        <p:cTn id="12" dur="500"/>
-                                        <p:tgtEl>
-                                          <p:spTgt spid="3"/>
-                                        </p:tgtEl>
-                                      </p:cBhvr>
-                                    </p:animEffect>
-                                  </p:childTnLst>
-                                </p:cTn>
-                              </p:par>
-                            </p:childTnLst>
-                          </p:cTn>
-                        </p:par>
-                      </p:childTnLst>
-                    </p:cTn>
-                  </p:par>
-                </p:childTnLst>
-              </p:cTn>
-              <p:prevCondLst>
-                <p:cond evt="onPrev" delay="0">
-                  <p:tgtEl>
-                    <p:sldTgt/>
-                  </p:tgtEl>
-                </p:cond>
-              </p:prevCondLst>
-              <p:nextCondLst>
-                <p:cond evt="onNext" delay="0">
-                  <p:tgtEl>
-                    <p:sldTgt/>
-                  </p:tgtEl>
-                </p:cond>
-              </p:nextCondLst>
-            </p:seq>
-          </p:childTnLst>
-        </p:cTn>
-      </p:par>
-    </p:tnLst>
-    <p:bldLst>
-      <p:bldP spid="23" grpId="0" animBg="1"/>
-      <p:bldP spid="3" grpId="0"/>
-    </p:bldLst>
-  </p:timing>
-</p:sld>
-</file>
-
 <file path=ppt/slides/slide2.xml><?xml version="1.0" encoding="utf-8"?>
 <p:sld xmlns:a="http://schemas.openxmlformats.org/drawingml/2006/main" xmlns:r="http://schemas.openxmlformats.org/officeDocument/2006/relationships" xmlns:p="http://schemas.openxmlformats.org/presentationml/2006/main">
   <p:cSld>
@@ -36957,6 +37774,360 @@
         <p:cTn id="1" dur="indefinite" restart="never" nodeType="tmRoot"/>
       </p:par>
     </p:tnLst>
+  </p:timing>
+</p:sld>
+</file>
+
+<file path=ppt/slides/slide20.xml><?xml version="1.0" encoding="utf-8"?>
+<p:sld xmlns:a="http://schemas.openxmlformats.org/drawingml/2006/main" xmlns:r="http://schemas.openxmlformats.org/officeDocument/2006/relationships" xmlns:p="http://schemas.openxmlformats.org/presentationml/2006/main">
+  <p:cSld>
+    <p:spTree>
+      <p:nvGrpSpPr>
+        <p:cNvPr id="1" name=""/>
+        <p:cNvGrpSpPr/>
+        <p:nvPr/>
+      </p:nvGrpSpPr>
+      <p:grpSpPr>
+        <a:xfrm>
+          <a:off x="0" y="0"/>
+          <a:ext cx="0" cy="0"/>
+          <a:chOff x="0" y="0"/>
+          <a:chExt cx="0" cy="0"/>
+        </a:xfrm>
+      </p:grpSpPr>
+      <p:sp>
+        <p:nvSpPr>
+          <p:cNvPr id="2" name="Título 1"/>
+          <p:cNvSpPr>
+            <a:spLocks noGrp="1"/>
+          </p:cNvSpPr>
+          <p:nvPr>
+            <p:ph type="title"/>
+          </p:nvPr>
+        </p:nvSpPr>
+        <p:spPr>
+          <a:xfrm>
+            <a:off x="2247899" y="192581"/>
+            <a:ext cx="9172198" cy="970450"/>
+          </a:xfrm>
+        </p:spPr>
+        <p:txBody>
+          <a:bodyPr/>
+          <a:lstStyle/>
+          <a:p>
+            <a:r>
+              <a:rPr lang="es-AR" dirty="0" smtClean="0"/>
+              <a:t>Fin</a:t>
+            </a:r>
+            <a:endParaRPr lang="es-AR" dirty="0"/>
+          </a:p>
+        </p:txBody>
+      </p:sp>
+      <p:pic>
+        <p:nvPicPr>
+          <p:cNvPr id="5" name="Imagen 4"/>
+          <p:cNvPicPr>
+            <a:picLocks noChangeAspect="1"/>
+          </p:cNvPicPr>
+          <p:nvPr/>
+        </p:nvPicPr>
+        <p:blipFill>
+          <a:blip r:embed="rId3">
+            <a:grayscl/>
+            <a:extLst>
+              <a:ext uri="{28A0092B-C50C-407E-A947-70E740481C1C}">
+                <a14:useLocalDpi xmlns:a14="http://schemas.microsoft.com/office/drawing/2010/main" val="0"/>
+              </a:ext>
+            </a:extLst>
+          </a:blip>
+          <a:stretch>
+            <a:fillRect/>
+          </a:stretch>
+        </p:blipFill>
+        <p:spPr>
+          <a:xfrm>
+            <a:off x="422650" y="0"/>
+            <a:ext cx="1780799" cy="1798832"/>
+          </a:xfrm>
+          <a:prstGeom prst="rect">
+            <a:avLst/>
+          </a:prstGeom>
+        </p:spPr>
+      </p:pic>
+      <p:sp>
+        <p:nvSpPr>
+          <p:cNvPr id="23" name="CuadroTexto 22"/>
+          <p:cNvSpPr txBox="1"/>
+          <p:nvPr/>
+        </p:nvSpPr>
+        <p:spPr>
+          <a:xfrm>
+            <a:off x="4430630" y="2974726"/>
+            <a:ext cx="3166280" cy="1323439"/>
+          </a:xfrm>
+          <a:prstGeom prst="rect">
+            <a:avLst/>
+          </a:prstGeom>
+          <a:ln w="19050">
+            <a:solidFill>
+              <a:schemeClr val="tx1">
+                <a:lumMod val="75000"/>
+              </a:schemeClr>
+            </a:solidFill>
+          </a:ln>
+        </p:spPr>
+        <p:style>
+          <a:lnRef idx="1">
+            <a:schemeClr val="accent1"/>
+          </a:lnRef>
+          <a:fillRef idx="3">
+            <a:schemeClr val="accent1"/>
+          </a:fillRef>
+          <a:effectRef idx="2">
+            <a:schemeClr val="accent1"/>
+          </a:effectRef>
+          <a:fontRef idx="minor">
+            <a:schemeClr val="lt1"/>
+          </a:fontRef>
+        </p:style>
+        <p:txBody>
+          <a:bodyPr wrap="square" rtlCol="0">
+            <a:spAutoFit/>
+          </a:bodyPr>
+          <a:lstStyle/>
+          <a:p>
+            <a:pPr algn="ctr"/>
+            <a:r>
+              <a:rPr lang="es-AR" sz="8000" dirty="0" smtClean="0"/>
+              <a:t>Fin</a:t>
+            </a:r>
+            <a:endParaRPr lang="es-AR" sz="8000" dirty="0"/>
+          </a:p>
+        </p:txBody>
+      </p:sp>
+      <p:sp>
+        <p:nvSpPr>
+          <p:cNvPr id="3" name="CuadroTexto 2"/>
+          <p:cNvSpPr txBox="1"/>
+          <p:nvPr/>
+        </p:nvSpPr>
+        <p:spPr>
+          <a:xfrm>
+            <a:off x="4249227" y="4351188"/>
+            <a:ext cx="3835020" cy="769441"/>
+          </a:xfrm>
+          <a:prstGeom prst="rect">
+            <a:avLst/>
+          </a:prstGeom>
+          <a:noFill/>
+        </p:spPr>
+        <p:txBody>
+          <a:bodyPr wrap="square" rtlCol="0">
+            <a:spAutoFit/>
+          </a:bodyPr>
+          <a:lstStyle/>
+          <a:p>
+            <a:r>
+              <a:rPr lang="es-AR" sz="4400" dirty="0" smtClean="0">
+                <a:solidFill>
+                  <a:schemeClr val="tx1">
+                    <a:lumMod val="85000"/>
+                  </a:schemeClr>
+                </a:solidFill>
+                <a:latin typeface="Arial" panose="020B0604020202020204" pitchFamily="34" charset="0"/>
+                <a:cs typeface="Arial" panose="020B0604020202020204" pitchFamily="34" charset="0"/>
+              </a:rPr>
+              <a:t>¿</a:t>
+            </a:r>
+            <a:r>
+              <a:rPr lang="es-AR" sz="4400" dirty="0" smtClean="0">
+                <a:solidFill>
+                  <a:schemeClr val="tx1">
+                    <a:lumMod val="85000"/>
+                  </a:schemeClr>
+                </a:solidFill>
+              </a:rPr>
+              <a:t>Preguntas</a:t>
+            </a:r>
+            <a:r>
+              <a:rPr lang="es-AR" sz="4400" dirty="0" smtClean="0">
+                <a:solidFill>
+                  <a:schemeClr val="tx1">
+                    <a:lumMod val="85000"/>
+                  </a:schemeClr>
+                </a:solidFill>
+                <a:latin typeface="Arial" panose="020B0604020202020204" pitchFamily="34" charset="0"/>
+                <a:cs typeface="Arial" panose="020B0604020202020204" pitchFamily="34" charset="0"/>
+              </a:rPr>
+              <a:t>?</a:t>
+            </a:r>
+            <a:endParaRPr lang="es-ES" sz="4400" dirty="0">
+              <a:solidFill>
+                <a:schemeClr val="tx1">
+                  <a:lumMod val="85000"/>
+                </a:schemeClr>
+              </a:solidFill>
+              <a:latin typeface="Arial" panose="020B0604020202020204" pitchFamily="34" charset="0"/>
+              <a:cs typeface="Arial" panose="020B0604020202020204" pitchFamily="34" charset="0"/>
+            </a:endParaRPr>
+          </a:p>
+        </p:txBody>
+      </p:sp>
+    </p:spTree>
+    <p:extLst>
+      <p:ext uri="{BB962C8B-B14F-4D97-AF65-F5344CB8AC3E}">
+        <p14:creationId xmlns:p14="http://schemas.microsoft.com/office/powerpoint/2010/main" val="2669761933"/>
+      </p:ext>
+    </p:extLst>
+  </p:cSld>
+  <p:clrMapOvr>
+    <a:masterClrMapping/>
+  </p:clrMapOvr>
+  <p:transition spd="med">
+    <p:fade/>
+  </p:transition>
+  <p:timing>
+    <p:tnLst>
+      <p:par>
+        <p:cTn id="1" dur="indefinite" restart="never" nodeType="tmRoot">
+          <p:childTnLst>
+            <p:seq concurrent="1" nextAc="seek">
+              <p:cTn id="2" dur="indefinite" nodeType="mainSeq">
+                <p:childTnLst>
+                  <p:par>
+                    <p:cTn id="3" fill="hold">
+                      <p:stCondLst>
+                        <p:cond delay="indefinite"/>
+                        <p:cond evt="onBegin" delay="0">
+                          <p:tn val="2"/>
+                        </p:cond>
+                      </p:stCondLst>
+                      <p:childTnLst>
+                        <p:par>
+                          <p:cTn id="4" fill="hold">
+                            <p:stCondLst>
+                              <p:cond delay="0"/>
+                            </p:stCondLst>
+                            <p:childTnLst>
+                              <p:par>
+                                <p:cTn id="5" presetID="10" presetClass="entr" presetSubtype="0" fill="hold" grpId="0" nodeType="afterEffect">
+                                  <p:stCondLst>
+                                    <p:cond delay="0"/>
+                                  </p:stCondLst>
+                                  <p:childTnLst>
+                                    <p:set>
+                                      <p:cBhvr>
+                                        <p:cTn id="6" dur="1" fill="hold">
+                                          <p:stCondLst>
+                                            <p:cond delay="0"/>
+                                          </p:stCondLst>
+                                        </p:cTn>
+                                        <p:tgtEl>
+                                          <p:spTgt spid="23"/>
+                                        </p:tgtEl>
+                                        <p:attrNameLst>
+                                          <p:attrName>style.visibility</p:attrName>
+                                        </p:attrNameLst>
+                                      </p:cBhvr>
+                                      <p:to>
+                                        <p:strVal val="visible"/>
+                                      </p:to>
+                                    </p:set>
+                                    <p:animEffect transition="in" filter="fade">
+                                      <p:cBhvr>
+                                        <p:cTn id="7" dur="500"/>
+                                        <p:tgtEl>
+                                          <p:spTgt spid="23"/>
+                                        </p:tgtEl>
+                                      </p:cBhvr>
+                                    </p:animEffect>
+                                  </p:childTnLst>
+                                </p:cTn>
+                              </p:par>
+                            </p:childTnLst>
+                          </p:cTn>
+                        </p:par>
+                      </p:childTnLst>
+                    </p:cTn>
+                  </p:par>
+                  <p:par>
+                    <p:cTn id="8" fill="hold">
+                      <p:stCondLst>
+                        <p:cond delay="indefinite"/>
+                      </p:stCondLst>
+                      <p:childTnLst>
+                        <p:par>
+                          <p:cTn id="9" fill="hold">
+                            <p:stCondLst>
+                              <p:cond delay="0"/>
+                            </p:stCondLst>
+                            <p:childTnLst>
+                              <p:par>
+                                <p:cTn id="10" presetID="10" presetClass="entr" presetSubtype="0" fill="hold" grpId="0" nodeType="clickEffect">
+                                  <p:stCondLst>
+                                    <p:cond delay="0"/>
+                                  </p:stCondLst>
+                                  <p:childTnLst>
+                                    <p:set>
+                                      <p:cBhvr>
+                                        <p:cTn id="11" dur="1" fill="hold">
+                                          <p:stCondLst>
+                                            <p:cond delay="0"/>
+                                          </p:stCondLst>
+                                        </p:cTn>
+                                        <p:tgtEl>
+                                          <p:spTgt spid="3"/>
+                                        </p:tgtEl>
+                                        <p:attrNameLst>
+                                          <p:attrName>style.visibility</p:attrName>
+                                        </p:attrNameLst>
+                                      </p:cBhvr>
+                                      <p:to>
+                                        <p:strVal val="visible"/>
+                                      </p:to>
+                                    </p:set>
+                                    <p:animEffect transition="in" filter="fade">
+                                      <p:cBhvr>
+                                        <p:cTn id="12" dur="500"/>
+                                        <p:tgtEl>
+                                          <p:spTgt spid="3"/>
+                                        </p:tgtEl>
+                                      </p:cBhvr>
+                                    </p:animEffect>
+                                  </p:childTnLst>
+                                </p:cTn>
+                              </p:par>
+                            </p:childTnLst>
+                          </p:cTn>
+                        </p:par>
+                      </p:childTnLst>
+                    </p:cTn>
+                  </p:par>
+                </p:childTnLst>
+              </p:cTn>
+              <p:prevCondLst>
+                <p:cond evt="onPrev" delay="0">
+                  <p:tgtEl>
+                    <p:sldTgt/>
+                  </p:tgtEl>
+                </p:cond>
+              </p:prevCondLst>
+              <p:nextCondLst>
+                <p:cond evt="onNext" delay="0">
+                  <p:tgtEl>
+                    <p:sldTgt/>
+                  </p:tgtEl>
+                </p:cond>
+              </p:nextCondLst>
+            </p:seq>
+          </p:childTnLst>
+        </p:cTn>
+      </p:par>
+    </p:tnLst>
+    <p:bldLst>
+      <p:bldP spid="23" grpId="0" animBg="1"/>
+      <p:bldP spid="3" grpId="0"/>
+    </p:bldLst>
   </p:timing>
 </p:sld>
 </file>

</xml_diff>

<commit_message>
- Cambios menores en la Presentación.
</commit_message>
<xml_diff>
--- a/Documentacion/Presentación Grado de Avances/Presentación Proyecto - Grado de Avances.pptx
+++ b/Documentacion/Presentación Grado de Avances/Presentación Proyecto - Grado de Avances.pptx
@@ -3914,13 +3914,27 @@
         <a:lstStyle/>
         <a:p>
           <a:r>
-            <a:rPr lang="es-AR" sz="2400" b="0" dirty="0" smtClean="0">
-              <a:latin typeface="Calibri" panose="020F0502020204030204" pitchFamily="34" charset="0"/>
+            <a:rPr lang="es-AR" sz="2400" b="1" dirty="0" smtClean="0">
+              <a:effectLst>
+                <a:outerShdw blurRad="38100" dist="38100" dir="2700000" algn="tl">
+                  <a:srgbClr val="000000">
+                    <a:alpha val="43137"/>
+                  </a:srgbClr>
+                </a:outerShdw>
+              </a:effectLst>
+              <a:latin typeface="+mj-lt"/>
             </a:rPr>
             <a:t>¿Dónde Estamos?</a:t>
           </a:r>
-          <a:endParaRPr lang="es-AR" sz="2400" b="0" dirty="0">
-            <a:latin typeface="Calibri" panose="020F0502020204030204" pitchFamily="34" charset="0"/>
+          <a:endParaRPr lang="es-AR" sz="2400" b="1" dirty="0">
+            <a:effectLst>
+              <a:outerShdw blurRad="38100" dist="38100" dir="2700000" algn="tl">
+                <a:srgbClr val="000000">
+                  <a:alpha val="43137"/>
+                </a:srgbClr>
+              </a:outerShdw>
+            </a:effectLst>
+            <a:latin typeface="+mj-lt"/>
           </a:endParaRPr>
         </a:p>
       </dgm:t>
@@ -3955,13 +3969,27 @@
         <a:lstStyle/>
         <a:p>
           <a:r>
-            <a:rPr lang="es-AR" sz="2400" b="0" dirty="0" smtClean="0">
-              <a:latin typeface="Calibri" panose="020F0502020204030204" pitchFamily="34" charset="0"/>
+            <a:rPr lang="es-AR" sz="2400" b="1" dirty="0" smtClean="0">
+              <a:effectLst>
+                <a:outerShdw blurRad="38100" dist="38100" dir="2700000" algn="tl">
+                  <a:srgbClr val="000000">
+                    <a:alpha val="43137"/>
+                  </a:srgbClr>
+                </a:outerShdw>
+              </a:effectLst>
+              <a:latin typeface="+mj-lt"/>
             </a:rPr>
             <a:t>Herramientas y Cambios</a:t>
           </a:r>
-          <a:endParaRPr lang="es-AR" sz="2400" b="0" dirty="0">
-            <a:latin typeface="Calibri" panose="020F0502020204030204" pitchFamily="34" charset="0"/>
+          <a:endParaRPr lang="es-AR" sz="2400" b="1" dirty="0">
+            <a:effectLst>
+              <a:outerShdw blurRad="38100" dist="38100" dir="2700000" algn="tl">
+                <a:srgbClr val="000000">
+                  <a:alpha val="43137"/>
+                </a:srgbClr>
+              </a:outerShdw>
+            </a:effectLst>
+            <a:latin typeface="+mj-lt"/>
           </a:endParaRPr>
         </a:p>
       </dgm:t>
@@ -3996,13 +4024,27 @@
         <a:lstStyle/>
         <a:p>
           <a:r>
-            <a:rPr lang="es-AR" sz="2400" b="0" dirty="0" smtClean="0">
-              <a:latin typeface="Calibri" panose="020F0502020204030204" pitchFamily="34" charset="0"/>
+            <a:rPr lang="es-AR" sz="2400" b="1" dirty="0" smtClean="0">
+              <a:effectLst>
+                <a:outerShdw blurRad="38100" dist="38100" dir="2700000" algn="tl">
+                  <a:srgbClr val="000000">
+                    <a:alpha val="43137"/>
+                  </a:srgbClr>
+                </a:outerShdw>
+              </a:effectLst>
+              <a:latin typeface="+mj-lt"/>
             </a:rPr>
             <a:t>Gestión del Proyecto - Métricas</a:t>
           </a:r>
-          <a:endParaRPr lang="es-AR" sz="2400" b="0" dirty="0">
-            <a:latin typeface="Calibri" panose="020F0502020204030204" pitchFamily="34" charset="0"/>
+          <a:endParaRPr lang="es-AR" sz="2400" b="1" dirty="0">
+            <a:effectLst>
+              <a:outerShdw blurRad="38100" dist="38100" dir="2700000" algn="tl">
+                <a:srgbClr val="000000">
+                  <a:alpha val="43137"/>
+                </a:srgbClr>
+              </a:outerShdw>
+            </a:effectLst>
+            <a:latin typeface="+mj-lt"/>
           </a:endParaRPr>
         </a:p>
       </dgm:t>
@@ -4037,13 +4079,27 @@
         <a:lstStyle/>
         <a:p>
           <a:r>
-            <a:rPr lang="es-AR" sz="2400" b="0" dirty="0" smtClean="0">
-              <a:latin typeface="Calibri" panose="020F0502020204030204" pitchFamily="34" charset="0"/>
+            <a:rPr lang="es-AR" sz="2400" b="1" dirty="0" smtClean="0">
+              <a:effectLst>
+                <a:outerShdw blurRad="38100" dist="38100" dir="2700000" algn="tl">
+                  <a:srgbClr val="000000">
+                    <a:alpha val="43137"/>
+                  </a:srgbClr>
+                </a:outerShdw>
+              </a:effectLst>
+              <a:latin typeface="+mj-lt"/>
             </a:rPr>
             <a:t>Arquitectura y Modelos</a:t>
           </a:r>
-          <a:endParaRPr lang="es-AR" sz="2400" b="0" dirty="0">
-            <a:latin typeface="Calibri" panose="020F0502020204030204" pitchFamily="34" charset="0"/>
+          <a:endParaRPr lang="es-AR" sz="2400" b="1" dirty="0">
+            <a:effectLst>
+              <a:outerShdw blurRad="38100" dist="38100" dir="2700000" algn="tl">
+                <a:srgbClr val="000000">
+                  <a:alpha val="43137"/>
+                </a:srgbClr>
+              </a:outerShdw>
+            </a:effectLst>
+            <a:latin typeface="+mj-lt"/>
           </a:endParaRPr>
         </a:p>
       </dgm:t>
@@ -4078,13 +4134,27 @@
         <a:lstStyle/>
         <a:p>
           <a:r>
-            <a:rPr lang="es-AR" sz="2400" b="0" dirty="0" smtClean="0">
-              <a:latin typeface="Calibri" panose="020F0502020204030204" pitchFamily="34" charset="0"/>
+            <a:rPr lang="es-AR" sz="2400" b="1" dirty="0" smtClean="0">
+              <a:effectLst>
+                <a:outerShdw blurRad="38100" dist="38100" dir="2700000" algn="tl">
+                  <a:srgbClr val="000000">
+                    <a:alpha val="43137"/>
+                  </a:srgbClr>
+                </a:outerShdw>
+              </a:effectLst>
+              <a:latin typeface="+mj-lt"/>
             </a:rPr>
             <a:t>¿Cómo Seguimos?</a:t>
           </a:r>
-          <a:endParaRPr lang="es-AR" sz="2400" b="0" dirty="0">
-            <a:latin typeface="Calibri" panose="020F0502020204030204" pitchFamily="34" charset="0"/>
+          <a:endParaRPr lang="es-AR" sz="2400" b="1" dirty="0">
+            <a:effectLst>
+              <a:outerShdw blurRad="38100" dist="38100" dir="2700000" algn="tl">
+                <a:srgbClr val="000000">
+                  <a:alpha val="43137"/>
+                </a:srgbClr>
+              </a:outerShdw>
+            </a:effectLst>
+            <a:latin typeface="+mj-lt"/>
           </a:endParaRPr>
         </a:p>
       </dgm:t>
@@ -5037,8 +5107,8 @@
     <dgm:cxn modelId="{033E09AC-6D4D-414E-862D-B5A442B1AC27}" type="presOf" srcId="{ABDCEAC1-7F67-454D-84AF-2ECB51702D13}" destId="{474233D3-0411-4ECF-9B57-DA9032FAB377}" srcOrd="0" destOrd="0" presId="urn:microsoft.com/office/officeart/2005/8/layout/vList5"/>
     <dgm:cxn modelId="{71EEBC94-C7CD-44E6-B1DC-DAF8B3C40CCA}" srcId="{5B42A3B2-F1A4-4AAD-92E6-CBE520DF75A4}" destId="{D80178D8-855D-4D8C-BAE2-17D72C190F1C}" srcOrd="4" destOrd="0" parTransId="{CE8167CF-87E1-42C1-8B64-351F9D65AEA0}" sibTransId="{42623A96-96F1-43CA-BA62-11C446A70135}"/>
     <dgm:cxn modelId="{4137832A-ED43-4C35-B279-B35137E9B3E9}" srcId="{8587132E-9006-496A-8F9A-F4971DD58E1B}" destId="{6896E919-8BCC-48FF-BCE3-BFE66BFB1A06}" srcOrd="0" destOrd="0" parTransId="{E36E377B-B494-400F-B163-198EA04FA50E}" sibTransId="{7D1BA1F4-2223-4C45-815D-8FB75C8F2E3A}"/>
+    <dgm:cxn modelId="{1118EDD1-B889-4A46-BD09-FD906CE2F23D}" type="presOf" srcId="{AA89FF9F-D7AB-46FF-8516-736811A50D78}" destId="{81427C62-5655-4813-AC16-2932A923AE10}" srcOrd="0" destOrd="0" presId="urn:microsoft.com/office/officeart/2005/8/layout/vList5"/>
     <dgm:cxn modelId="{E08744B4-69D5-4A50-89E1-C260D5ED9AC7}" type="presOf" srcId="{B7551B5D-2840-4B19-AA2B-F2E0633B3A37}" destId="{EA225968-22AD-4266-B086-723503A371EA}" srcOrd="0" destOrd="0" presId="urn:microsoft.com/office/officeart/2005/8/layout/vList5"/>
-    <dgm:cxn modelId="{1118EDD1-B889-4A46-BD09-FD906CE2F23D}" type="presOf" srcId="{AA89FF9F-D7AB-46FF-8516-736811A50D78}" destId="{81427C62-5655-4813-AC16-2932A923AE10}" srcOrd="0" destOrd="0" presId="urn:microsoft.com/office/officeart/2005/8/layout/vList5"/>
     <dgm:cxn modelId="{3F3BF574-AAD8-419F-B503-96D047DF15CE}" type="presParOf" srcId="{1AC5862D-3A38-4A56-8BBB-5228D3259E64}" destId="{6FBAC80C-69A4-4EBB-A9DA-D287B5B59A74}" srcOrd="0" destOrd="0" presId="urn:microsoft.com/office/officeart/2005/8/layout/vList5"/>
     <dgm:cxn modelId="{85AE3A7E-A6C9-4A33-B561-3AC2428D6853}" type="presParOf" srcId="{6FBAC80C-69A4-4EBB-A9DA-D287B5B59A74}" destId="{909E8BCD-0B1A-41E7-BFFF-B89785456621}" srcOrd="0" destOrd="0" presId="urn:microsoft.com/office/officeart/2005/8/layout/vList5"/>
     <dgm:cxn modelId="{134167C9-1E13-44A1-A9FB-452A02FA070E}" type="presParOf" srcId="{6FBAC80C-69A4-4EBB-A9DA-D287B5B59A74}" destId="{D79D4B58-D90B-49E8-B5D0-2B484EB6045D}" srcOrd="1" destOrd="0" presId="urn:microsoft.com/office/officeart/2005/8/layout/vList5"/>
@@ -5096,7 +5166,11 @@
           </a:r>
           <a:r>
             <a:rPr lang="es-AR" sz="2000" dirty="0" smtClean="0"/>
-            <a:t>de Proyecto </a:t>
+            <a:t>de </a:t>
+          </a:r>
+          <a:r>
+            <a:rPr lang="es-AR" sz="2000" dirty="0" smtClean="0"/>
+            <a:t>Proyecto y de Producto </a:t>
           </a:r>
           <a:endParaRPr lang="es-ES" sz="2000" dirty="0"/>
         </a:p>
@@ -6141,20 +6215,20 @@
     </dgm:pt>
   </dgm:ptLst>
   <dgm:cxnLst>
+    <dgm:cxn modelId="{A489847D-2ECA-4424-B17A-DB6FCE7A8A5A}" srcId="{380B52FA-39C6-48EA-999F-FF4935E2FF90}" destId="{61775FC0-4D76-4DBD-8D6A-B45D8C8F447D}" srcOrd="3" destOrd="0" parTransId="{5627AB7B-8D76-4D3F-B033-0452D2740CB8}" sibTransId="{A90BBD6A-B4C6-4C41-B0C1-AFAF3DD96903}"/>
+    <dgm:cxn modelId="{DD7C9394-52EF-48F5-8584-BA6AE850F2E4}" type="presOf" srcId="{380B52FA-39C6-48EA-999F-FF4935E2FF90}" destId="{E0294AD7-5684-4880-AFE3-8A287502C171}" srcOrd="0" destOrd="0" presId="urn:microsoft.com/office/officeart/2008/layout/VerticalCurvedList"/>
+    <dgm:cxn modelId="{E783B8BE-2BD4-4C04-BDDF-BE17ACA9F295}" type="presOf" srcId="{61775FC0-4D76-4DBD-8D6A-B45D8C8F447D}" destId="{2844CD40-437E-4C4F-A2EE-801021F6711B}" srcOrd="0" destOrd="0" presId="urn:microsoft.com/office/officeart/2008/layout/VerticalCurvedList"/>
     <dgm:cxn modelId="{49EE22DC-5F2C-4520-9ECA-69CA034E3E84}" type="presOf" srcId="{E3E24D61-DC83-4221-A625-3253A8A07D4E}" destId="{889CCFCF-85CF-42EE-B1C3-B84E8EE140C2}" srcOrd="0" destOrd="0" presId="urn:microsoft.com/office/officeart/2008/layout/VerticalCurvedList"/>
+    <dgm:cxn modelId="{8EDA5967-C3EE-4BA9-A906-3EBA10582C14}" srcId="{380B52FA-39C6-48EA-999F-FF4935E2FF90}" destId="{EB69C98D-0511-46AE-8510-7CCD8A94F1AD}" srcOrd="5" destOrd="0" parTransId="{D1EF9142-BF1B-46DC-9394-13F37661F665}" sibTransId="{10F45A30-D8F2-4C20-943B-AD10ADAF5F81}"/>
+    <dgm:cxn modelId="{8F895F7B-4E24-4CBD-875F-FDA24134C40E}" srcId="{380B52FA-39C6-48EA-999F-FF4935E2FF90}" destId="{0E8DDFC9-A553-43E8-8ADD-DACAFE998484}" srcOrd="4" destOrd="0" parTransId="{9A92C10D-6A46-4A28-B36F-8C076C8A2723}" sibTransId="{FA11F3E5-A6EE-4D12-9C43-9DA399E6752D}"/>
+    <dgm:cxn modelId="{DADC3634-6D46-4546-8DF3-F7E7D8CF2AD4}" type="presOf" srcId="{CC4D44A6-7179-4CCE-8B0E-9D963F120C7F}" destId="{969B7A61-92F9-49CC-BB98-4FCC80682E86}" srcOrd="0" destOrd="0" presId="urn:microsoft.com/office/officeart/2008/layout/VerticalCurvedList"/>
+    <dgm:cxn modelId="{89D38CD6-64FE-4FD5-BED7-753169C4CACF}" srcId="{380B52FA-39C6-48EA-999F-FF4935E2FF90}" destId="{269BCB6E-2880-4F18-9732-C0DD14CA6895}" srcOrd="1" destOrd="0" parTransId="{5152B2E3-1FA3-4D1F-89EB-C3BF645E7CFB}" sibTransId="{D9B8F87E-83B6-41F9-969F-08D3D7CDBBE0}"/>
     <dgm:cxn modelId="{A74E0EB2-308F-403E-9F75-A6F630C4E55D}" type="presOf" srcId="{0E8DDFC9-A553-43E8-8ADD-DACAFE998484}" destId="{E7CE5C3F-775D-45A0-8FC7-59E2443FB5BB}" srcOrd="0" destOrd="0" presId="urn:microsoft.com/office/officeart/2008/layout/VerticalCurvedList"/>
-    <dgm:cxn modelId="{009EA7D8-905E-4CF5-AD7F-033F2C5F116E}" type="presOf" srcId="{767EEABE-FA01-434B-BFB1-DABB2B0B3538}" destId="{B1E84231-A085-4FBA-A7F1-0724F2582F6F}" srcOrd="0" destOrd="0" presId="urn:microsoft.com/office/officeart/2008/layout/VerticalCurvedList"/>
-    <dgm:cxn modelId="{E783B8BE-2BD4-4C04-BDDF-BE17ACA9F295}" type="presOf" srcId="{61775FC0-4D76-4DBD-8D6A-B45D8C8F447D}" destId="{2844CD40-437E-4C4F-A2EE-801021F6711B}" srcOrd="0" destOrd="0" presId="urn:microsoft.com/office/officeart/2008/layout/VerticalCurvedList"/>
     <dgm:cxn modelId="{36190A50-AB37-4DBE-841D-84CE7B3AE27C}" type="presOf" srcId="{EB69C98D-0511-46AE-8510-7CCD8A94F1AD}" destId="{A6715B7B-E69E-49A7-BBDE-A964109AD82E}" srcOrd="0" destOrd="0" presId="urn:microsoft.com/office/officeart/2008/layout/VerticalCurvedList"/>
-    <dgm:cxn modelId="{89D38CD6-64FE-4FD5-BED7-753169C4CACF}" srcId="{380B52FA-39C6-48EA-999F-FF4935E2FF90}" destId="{269BCB6E-2880-4F18-9732-C0DD14CA6895}" srcOrd="1" destOrd="0" parTransId="{5152B2E3-1FA3-4D1F-89EB-C3BF645E7CFB}" sibTransId="{D9B8F87E-83B6-41F9-969F-08D3D7CDBBE0}"/>
-    <dgm:cxn modelId="{DADC3634-6D46-4546-8DF3-F7E7D8CF2AD4}" type="presOf" srcId="{CC4D44A6-7179-4CCE-8B0E-9D963F120C7F}" destId="{969B7A61-92F9-49CC-BB98-4FCC80682E86}" srcOrd="0" destOrd="0" presId="urn:microsoft.com/office/officeart/2008/layout/VerticalCurvedList"/>
-    <dgm:cxn modelId="{DD7C9394-52EF-48F5-8584-BA6AE850F2E4}" type="presOf" srcId="{380B52FA-39C6-48EA-999F-FF4935E2FF90}" destId="{E0294AD7-5684-4880-AFE3-8A287502C171}" srcOrd="0" destOrd="0" presId="urn:microsoft.com/office/officeart/2008/layout/VerticalCurvedList"/>
-    <dgm:cxn modelId="{A489847D-2ECA-4424-B17A-DB6FCE7A8A5A}" srcId="{380B52FA-39C6-48EA-999F-FF4935E2FF90}" destId="{61775FC0-4D76-4DBD-8D6A-B45D8C8F447D}" srcOrd="3" destOrd="0" parTransId="{5627AB7B-8D76-4D3F-B033-0452D2740CB8}" sibTransId="{A90BBD6A-B4C6-4C41-B0C1-AFAF3DD96903}"/>
-    <dgm:cxn modelId="{FFD5E230-1508-477F-88DA-0B1AAA7F61BA}" srcId="{380B52FA-39C6-48EA-999F-FF4935E2FF90}" destId="{E3E24D61-DC83-4221-A625-3253A8A07D4E}" srcOrd="0" destOrd="0" parTransId="{171B5AE9-D9B6-4240-9D84-221E824F7A31}" sibTransId="{CC4D44A6-7179-4CCE-8B0E-9D963F120C7F}"/>
-    <dgm:cxn modelId="{8F895F7B-4E24-4CBD-875F-FDA24134C40E}" srcId="{380B52FA-39C6-48EA-999F-FF4935E2FF90}" destId="{0E8DDFC9-A553-43E8-8ADD-DACAFE998484}" srcOrd="4" destOrd="0" parTransId="{9A92C10D-6A46-4A28-B36F-8C076C8A2723}" sibTransId="{FA11F3E5-A6EE-4D12-9C43-9DA399E6752D}"/>
-    <dgm:cxn modelId="{8EDA5967-C3EE-4BA9-A906-3EBA10582C14}" srcId="{380B52FA-39C6-48EA-999F-FF4935E2FF90}" destId="{EB69C98D-0511-46AE-8510-7CCD8A94F1AD}" srcOrd="5" destOrd="0" parTransId="{D1EF9142-BF1B-46DC-9394-13F37661F665}" sibTransId="{10F45A30-D8F2-4C20-943B-AD10ADAF5F81}"/>
     <dgm:cxn modelId="{60CFD0AC-A92A-4E72-A578-D3B8F4590D91}" srcId="{380B52FA-39C6-48EA-999F-FF4935E2FF90}" destId="{767EEABE-FA01-434B-BFB1-DABB2B0B3538}" srcOrd="2" destOrd="0" parTransId="{B7276962-EA13-4004-8FCA-9E43AC3736C6}" sibTransId="{3D676867-16F7-4C1B-968F-0A14807FFE0B}"/>
     <dgm:cxn modelId="{25D2925A-D2DA-429F-B20F-2442D31D4DFD}" type="presOf" srcId="{269BCB6E-2880-4F18-9732-C0DD14CA6895}" destId="{21664CED-339C-476D-85A5-28A63C40B1E3}" srcOrd="0" destOrd="0" presId="urn:microsoft.com/office/officeart/2008/layout/VerticalCurvedList"/>
+    <dgm:cxn modelId="{009EA7D8-905E-4CF5-AD7F-033F2C5F116E}" type="presOf" srcId="{767EEABE-FA01-434B-BFB1-DABB2B0B3538}" destId="{B1E84231-A085-4FBA-A7F1-0724F2582F6F}" srcOrd="0" destOrd="0" presId="urn:microsoft.com/office/officeart/2008/layout/VerticalCurvedList"/>
+    <dgm:cxn modelId="{FFD5E230-1508-477F-88DA-0B1AAA7F61BA}" srcId="{380B52FA-39C6-48EA-999F-FF4935E2FF90}" destId="{E3E24D61-DC83-4221-A625-3253A8A07D4E}" srcOrd="0" destOrd="0" parTransId="{171B5AE9-D9B6-4240-9D84-221E824F7A31}" sibTransId="{CC4D44A6-7179-4CCE-8B0E-9D963F120C7F}"/>
     <dgm:cxn modelId="{C46509FA-7F85-4FA4-8CA6-EECBA266541B}" type="presParOf" srcId="{E0294AD7-5684-4880-AFE3-8A287502C171}" destId="{2E0DEE6A-5A2C-4DBC-BAF6-E16EE66D546C}" srcOrd="0" destOrd="0" presId="urn:microsoft.com/office/officeart/2008/layout/VerticalCurvedList"/>
     <dgm:cxn modelId="{8A2611CE-8BE6-42B4-9D4E-C80EE0450B79}" type="presParOf" srcId="{2E0DEE6A-5A2C-4DBC-BAF6-E16EE66D546C}" destId="{6EF8B487-7303-479A-BD85-C2D10E331B67}" srcOrd="0" destOrd="0" presId="urn:microsoft.com/office/officeart/2008/layout/VerticalCurvedList"/>
     <dgm:cxn modelId="{72A1D9A8-C010-4595-9578-E6A7B2DB590D}" type="presParOf" srcId="{6EF8B487-7303-479A-BD85-C2D10E331B67}" destId="{D36A4E98-F327-423B-891D-6DAB05EE96EE}" srcOrd="0" destOrd="0" presId="urn:microsoft.com/office/officeart/2008/layout/VerticalCurvedList"/>
@@ -6309,13 +6383,27 @@
             </a:spcAft>
           </a:pPr>
           <a:r>
-            <a:rPr lang="es-AR" sz="2400" b="0" kern="1200" dirty="0" smtClean="0">
-              <a:latin typeface="Calibri" panose="020F0502020204030204" pitchFamily="34" charset="0"/>
+            <a:rPr lang="es-AR" sz="2400" b="1" kern="1200" dirty="0" smtClean="0">
+              <a:effectLst>
+                <a:outerShdw blurRad="38100" dist="38100" dir="2700000" algn="tl">
+                  <a:srgbClr val="000000">
+                    <a:alpha val="43137"/>
+                  </a:srgbClr>
+                </a:outerShdw>
+              </a:effectLst>
+              <a:latin typeface="+mj-lt"/>
             </a:rPr>
             <a:t>¿Dónde Estamos?</a:t>
           </a:r>
-          <a:endParaRPr lang="es-AR" sz="2400" b="0" kern="1200" dirty="0">
-            <a:latin typeface="Calibri" panose="020F0502020204030204" pitchFamily="34" charset="0"/>
+          <a:endParaRPr lang="es-AR" sz="2400" b="1" kern="1200" dirty="0">
+            <a:effectLst>
+              <a:outerShdw blurRad="38100" dist="38100" dir="2700000" algn="tl">
+                <a:srgbClr val="000000">
+                  <a:alpha val="43137"/>
+                </a:srgbClr>
+              </a:outerShdw>
+            </a:effectLst>
+            <a:latin typeface="+mj-lt"/>
           </a:endParaRPr>
         </a:p>
       </dsp:txBody>
@@ -6437,13 +6525,27 @@
             </a:spcAft>
           </a:pPr>
           <a:r>
-            <a:rPr lang="es-AR" sz="2400" b="0" kern="1200" dirty="0" smtClean="0">
-              <a:latin typeface="Calibri" panose="020F0502020204030204" pitchFamily="34" charset="0"/>
+            <a:rPr lang="es-AR" sz="2400" b="1" kern="1200" dirty="0" smtClean="0">
+              <a:effectLst>
+                <a:outerShdw blurRad="38100" dist="38100" dir="2700000" algn="tl">
+                  <a:srgbClr val="000000">
+                    <a:alpha val="43137"/>
+                  </a:srgbClr>
+                </a:outerShdw>
+              </a:effectLst>
+              <a:latin typeface="+mj-lt"/>
             </a:rPr>
             <a:t>Herramientas y Cambios</a:t>
           </a:r>
-          <a:endParaRPr lang="es-AR" sz="2400" b="0" kern="1200" dirty="0">
-            <a:latin typeface="Calibri" panose="020F0502020204030204" pitchFamily="34" charset="0"/>
+          <a:endParaRPr lang="es-AR" sz="2400" b="1" kern="1200" dirty="0">
+            <a:effectLst>
+              <a:outerShdw blurRad="38100" dist="38100" dir="2700000" algn="tl">
+                <a:srgbClr val="000000">
+                  <a:alpha val="43137"/>
+                </a:srgbClr>
+              </a:outerShdw>
+            </a:effectLst>
+            <a:latin typeface="+mj-lt"/>
           </a:endParaRPr>
         </a:p>
       </dsp:txBody>
@@ -6565,13 +6667,27 @@
             </a:spcAft>
           </a:pPr>
           <a:r>
-            <a:rPr lang="es-AR" sz="2400" b="0" kern="1200" dirty="0" smtClean="0">
-              <a:latin typeface="Calibri" panose="020F0502020204030204" pitchFamily="34" charset="0"/>
+            <a:rPr lang="es-AR" sz="2400" b="1" kern="1200" dirty="0" smtClean="0">
+              <a:effectLst>
+                <a:outerShdw blurRad="38100" dist="38100" dir="2700000" algn="tl">
+                  <a:srgbClr val="000000">
+                    <a:alpha val="43137"/>
+                  </a:srgbClr>
+                </a:outerShdw>
+              </a:effectLst>
+              <a:latin typeface="+mj-lt"/>
             </a:rPr>
             <a:t>Gestión del Proyecto - Métricas</a:t>
           </a:r>
-          <a:endParaRPr lang="es-AR" sz="2400" b="0" kern="1200" dirty="0">
-            <a:latin typeface="Calibri" panose="020F0502020204030204" pitchFamily="34" charset="0"/>
+          <a:endParaRPr lang="es-AR" sz="2400" b="1" kern="1200" dirty="0">
+            <a:effectLst>
+              <a:outerShdw blurRad="38100" dist="38100" dir="2700000" algn="tl">
+                <a:srgbClr val="000000">
+                  <a:alpha val="43137"/>
+                </a:srgbClr>
+              </a:outerShdw>
+            </a:effectLst>
+            <a:latin typeface="+mj-lt"/>
           </a:endParaRPr>
         </a:p>
       </dsp:txBody>
@@ -6693,13 +6809,27 @@
             </a:spcAft>
           </a:pPr>
           <a:r>
-            <a:rPr lang="es-AR" sz="2400" b="0" kern="1200" dirty="0" smtClean="0">
-              <a:latin typeface="Calibri" panose="020F0502020204030204" pitchFamily="34" charset="0"/>
+            <a:rPr lang="es-AR" sz="2400" b="1" kern="1200" dirty="0" smtClean="0">
+              <a:effectLst>
+                <a:outerShdw blurRad="38100" dist="38100" dir="2700000" algn="tl">
+                  <a:srgbClr val="000000">
+                    <a:alpha val="43137"/>
+                  </a:srgbClr>
+                </a:outerShdw>
+              </a:effectLst>
+              <a:latin typeface="+mj-lt"/>
             </a:rPr>
             <a:t>Arquitectura y Modelos</a:t>
           </a:r>
-          <a:endParaRPr lang="es-AR" sz="2400" b="0" kern="1200" dirty="0">
-            <a:latin typeface="Calibri" panose="020F0502020204030204" pitchFamily="34" charset="0"/>
+          <a:endParaRPr lang="es-AR" sz="2400" b="1" kern="1200" dirty="0">
+            <a:effectLst>
+              <a:outerShdw blurRad="38100" dist="38100" dir="2700000" algn="tl">
+                <a:srgbClr val="000000">
+                  <a:alpha val="43137"/>
+                </a:srgbClr>
+              </a:outerShdw>
+            </a:effectLst>
+            <a:latin typeface="+mj-lt"/>
           </a:endParaRPr>
         </a:p>
       </dsp:txBody>
@@ -6821,13 +6951,27 @@
             </a:spcAft>
           </a:pPr>
           <a:r>
-            <a:rPr lang="es-AR" sz="2400" b="0" kern="1200" dirty="0" smtClean="0">
-              <a:latin typeface="Calibri" panose="020F0502020204030204" pitchFamily="34" charset="0"/>
+            <a:rPr lang="es-AR" sz="2400" b="1" kern="1200" dirty="0" smtClean="0">
+              <a:effectLst>
+                <a:outerShdw blurRad="38100" dist="38100" dir="2700000" algn="tl">
+                  <a:srgbClr val="000000">
+                    <a:alpha val="43137"/>
+                  </a:srgbClr>
+                </a:outerShdw>
+              </a:effectLst>
+              <a:latin typeface="+mj-lt"/>
             </a:rPr>
             <a:t>¿Cómo Seguimos?</a:t>
           </a:r>
-          <a:endParaRPr lang="es-AR" sz="2400" b="0" kern="1200" dirty="0">
-            <a:latin typeface="Calibri" panose="020F0502020204030204" pitchFamily="34" charset="0"/>
+          <a:endParaRPr lang="es-AR" sz="2400" b="1" kern="1200" dirty="0">
+            <a:effectLst>
+              <a:outerShdw blurRad="38100" dist="38100" dir="2700000" algn="tl">
+                <a:srgbClr val="000000">
+                  <a:alpha val="43137"/>
+                </a:srgbClr>
+              </a:outerShdw>
+            </a:effectLst>
+            <a:latin typeface="+mj-lt"/>
           </a:endParaRPr>
         </a:p>
       </dsp:txBody>
@@ -8080,7 +8224,11 @@
           </a:r>
           <a:r>
             <a:rPr lang="es-AR" sz="2000" kern="1200" dirty="0" smtClean="0"/>
-            <a:t>de Proyecto </a:t>
+            <a:t>de </a:t>
+          </a:r>
+          <a:r>
+            <a:rPr lang="es-AR" sz="2000" kern="1200" dirty="0" smtClean="0"/>
+            <a:t>Proyecto y de Producto </a:t>
           </a:r>
           <a:endParaRPr lang="es-ES" sz="2000" kern="1200" dirty="0"/>
         </a:p>
@@ -23356,7 +23504,7 @@
           <a:effectLst/>
           <a:extLst>
             <a:ext uri="{91240B29-F687-4f45-9708-019B960494DF}">
-              <a14:hiddenLine xmlns="" xmlns:a14="http://schemas.microsoft.com/office/drawing/2010/main" w="9525">
+              <a14:hiddenLine xmlns:a14="http://schemas.microsoft.com/office/drawing/2010/main" xmlns="" w="9525">
                 <a:solidFill>
                   <a:srgbClr val="000000"/>
                 </a:solidFill>
@@ -24878,7 +25026,7 @@
           <a:ln/>
           <a:extLst>
             <a:ext uri="{91240B29-F687-4f45-9708-019B960494DF}">
-              <a14:hiddenLine xmlns="" xmlns:a14="http://schemas.microsoft.com/office/drawing/2010/main" w="9525">
+              <a14:hiddenLine xmlns:a14="http://schemas.microsoft.com/office/drawing/2010/main" xmlns="" w="9525">
                 <a:solidFill>
                   <a:srgbClr val="000000"/>
                 </a:solidFill>
@@ -25153,7 +25301,7 @@
           <a:ln/>
           <a:extLst>
             <a:ext uri="{91240B29-F687-4f45-9708-019B960494DF}">
-              <a14:hiddenLine xmlns="" xmlns:a14="http://schemas.microsoft.com/office/drawing/2010/main" w="9525">
+              <a14:hiddenLine xmlns:a14="http://schemas.microsoft.com/office/drawing/2010/main" xmlns="" w="9525">
                 <a:solidFill>
                   <a:srgbClr val="000000"/>
                 </a:solidFill>
@@ -25436,7 +25584,7 @@
           <a:ln/>
           <a:extLst>
             <a:ext uri="{91240B29-F687-4f45-9708-019B960494DF}">
-              <a14:hiddenLine xmlns="" xmlns:a14="http://schemas.microsoft.com/office/drawing/2010/main" w="9525">
+              <a14:hiddenLine xmlns:a14="http://schemas.microsoft.com/office/drawing/2010/main" xmlns="" w="9525">
                 <a:solidFill>
                   <a:srgbClr val="000000"/>
                 </a:solidFill>
@@ -26069,7 +26217,7 @@
           <a:ln/>
           <a:extLst>
             <a:ext uri="{91240B29-F687-4f45-9708-019B960494DF}">
-              <a14:hiddenLine xmlns="" xmlns:a14="http://schemas.microsoft.com/office/drawing/2010/main" w="9525">
+              <a14:hiddenLine xmlns:a14="http://schemas.microsoft.com/office/drawing/2010/main" xmlns="" w="9525">
                 <a:solidFill>
                   <a:srgbClr val="000000"/>
                 </a:solidFill>
@@ -26408,7 +26556,7 @@
           <a:ln/>
           <a:extLst>
             <a:ext uri="{91240B29-F687-4f45-9708-019B960494DF}">
-              <a14:hiddenLine xmlns="" xmlns:a14="http://schemas.microsoft.com/office/drawing/2010/main" w="9525">
+              <a14:hiddenLine xmlns:a14="http://schemas.microsoft.com/office/drawing/2010/main" xmlns="" w="9525">
                 <a:solidFill>
                   <a:srgbClr val="000000"/>
                 </a:solidFill>
@@ -26885,7 +27033,7 @@
           <a:ln/>
           <a:extLst>
             <a:ext uri="{91240B29-F687-4f45-9708-019B960494DF}">
-              <a14:hiddenLine xmlns="" xmlns:a14="http://schemas.microsoft.com/office/drawing/2010/main" w="9525">
+              <a14:hiddenLine xmlns:a14="http://schemas.microsoft.com/office/drawing/2010/main" xmlns="" w="9525">
                 <a:solidFill>
                   <a:srgbClr val="000000"/>
                 </a:solidFill>
@@ -27314,7 +27462,7 @@
           <a:ln/>
           <a:extLst>
             <a:ext uri="{91240B29-F687-4f45-9708-019B960494DF}">
-              <a14:hiddenLine xmlns="" xmlns:a14="http://schemas.microsoft.com/office/drawing/2010/main" w="9525">
+              <a14:hiddenLine xmlns:a14="http://schemas.microsoft.com/office/drawing/2010/main" xmlns="" w="9525">
                 <a:solidFill>
                   <a:srgbClr val="000000"/>
                 </a:solidFill>
@@ -28576,7 +28724,11 @@
           <a:p>
             <a:r>
               <a:rPr lang="es-AR" sz="4800" dirty="0" smtClean="0"/>
-              <a:t>Sistema de Gestión de Campeonatos de Futbol</a:t>
+              <a:t>Sistema de Gestión de Campeonatos de </a:t>
+            </a:r>
+            <a:r>
+              <a:rPr lang="es-AR" sz="4800" dirty="0" smtClean="0"/>
+              <a:t>Fútbol</a:t>
             </a:r>
             <a:endParaRPr lang="es-AR" sz="4800" dirty="0"/>
           </a:p>
@@ -29855,7 +30007,11 @@
           <a:p>
             <a:r>
               <a:rPr lang="es-AR" dirty="0" smtClean="0"/>
-              <a:t>Métricas e Indicadores de Proyecto</a:t>
+              <a:t>Métricas e Indicadores de </a:t>
+            </a:r>
+            <a:r>
+              <a:rPr lang="es-AR" dirty="0" smtClean="0"/>
+              <a:t>Producto</a:t>
             </a:r>
             <a:endParaRPr lang="es-AR" dirty="0"/>
           </a:p>
@@ -30191,7 +30347,11 @@
           <a:p>
             <a:r>
               <a:rPr lang="es-AR" dirty="0" smtClean="0"/>
-              <a:t>Métricas e Indicadores de Proyecto</a:t>
+              <a:t>Métricas e Indicadores de </a:t>
+            </a:r>
+            <a:r>
+              <a:rPr lang="es-AR" dirty="0" smtClean="0"/>
+              <a:t>Producto</a:t>
             </a:r>
             <a:endParaRPr lang="es-AR" dirty="0"/>
           </a:p>
@@ -37496,7 +37656,7 @@
           <p:nvPr>
             <p:extLst>
               <p:ext uri="{D42A27DB-BD31-4B8C-83A1-F6EECF244321}">
-                <p14:modId xmlns:p14="http://schemas.microsoft.com/office/powerpoint/2010/main" val="3443583309"/>
+                <p14:modId xmlns:p14="http://schemas.microsoft.com/office/powerpoint/2010/main" val="2698174108"/>
               </p:ext>
             </p:extLst>
           </p:nvPr>
@@ -42210,7 +42370,11 @@
           <a:p>
             <a:r>
               <a:rPr lang="es-AR" sz="3600" dirty="0" smtClean="0"/>
-              <a:t>Documentación e investigación</a:t>
+              <a:t>Documentación e </a:t>
+            </a:r>
+            <a:r>
+              <a:rPr lang="es-AR" sz="3600" dirty="0" smtClean="0"/>
+              <a:t>Investigación</a:t>
             </a:r>
             <a:endParaRPr lang="es-AR" sz="3600" dirty="0"/>
           </a:p>
@@ -45392,7 +45556,7 @@
           <p:nvPr>
             <p:extLst>
               <p:ext uri="{D42A27DB-BD31-4B8C-83A1-F6EECF244321}">
-                <p14:modId xmlns:p14="http://schemas.microsoft.com/office/powerpoint/2010/main" val="4215968128"/>
+                <p14:modId xmlns:p14="http://schemas.microsoft.com/office/powerpoint/2010/main" val="3470294768"/>
               </p:ext>
             </p:extLst>
           </p:nvPr>
@@ -45838,208 +46002,9 @@
   <p:timing>
     <p:tnLst>
       <p:par>
-        <p:cTn id="1" dur="indefinite" restart="never" nodeType="tmRoot">
-          <p:childTnLst>
-            <p:seq concurrent="1" nextAc="seek">
-              <p:cTn id="2" dur="indefinite" nodeType="mainSeq">
-                <p:childTnLst>
-                  <p:par>
-                    <p:cTn id="3" fill="hold">
-                      <p:stCondLst>
-                        <p:cond delay="indefinite"/>
-                        <p:cond evt="onBegin" delay="0">
-                          <p:tn val="2"/>
-                        </p:cond>
-                      </p:stCondLst>
-                      <p:childTnLst>
-                        <p:par>
-                          <p:cTn id="4" fill="hold">
-                            <p:stCondLst>
-                              <p:cond delay="0"/>
-                            </p:stCondLst>
-                            <p:childTnLst>
-                              <p:par>
-                                <p:cTn id="5" presetID="10" presetClass="entr" presetSubtype="0" fill="hold" grpId="0" nodeType="withEffect">
-                                  <p:stCondLst>
-                                    <p:cond delay="0"/>
-                                  </p:stCondLst>
-                                  <p:childTnLst>
-                                    <p:set>
-                                      <p:cBhvr>
-                                        <p:cTn id="6" dur="1" fill="hold">
-                                          <p:stCondLst>
-                                            <p:cond delay="0"/>
-                                          </p:stCondLst>
-                                        </p:cTn>
-                                        <p:tgtEl>
-                                          <p:spTgt spid="44"/>
-                                        </p:tgtEl>
-                                        <p:attrNameLst>
-                                          <p:attrName>style.visibility</p:attrName>
-                                        </p:attrNameLst>
-                                      </p:cBhvr>
-                                      <p:to>
-                                        <p:strVal val="visible"/>
-                                      </p:to>
-                                    </p:set>
-                                    <p:animEffect transition="in" filter="fade">
-                                      <p:cBhvr>
-                                        <p:cTn id="7" dur="1000"/>
-                                        <p:tgtEl>
-                                          <p:spTgt spid="44"/>
-                                        </p:tgtEl>
-                                      </p:cBhvr>
-                                    </p:animEffect>
-                                  </p:childTnLst>
-                                </p:cTn>
-                              </p:par>
-                              <p:par>
-                                <p:cTn id="8" presetID="10" presetClass="exit" presetSubtype="0" fill="hold" nodeType="withEffect">
-                                  <p:stCondLst>
-                                    <p:cond delay="0"/>
-                                  </p:stCondLst>
-                                  <p:childTnLst>
-                                    <p:animEffect transition="out" filter="fade">
-                                      <p:cBhvr>
-                                        <p:cTn id="9" dur="500"/>
-                                        <p:tgtEl>
-                                          <p:spTgt spid="4"/>
-                                        </p:tgtEl>
-                                      </p:cBhvr>
-                                    </p:animEffect>
-                                    <p:set>
-                                      <p:cBhvr>
-                                        <p:cTn id="10" dur="1" fill="hold">
-                                          <p:stCondLst>
-                                            <p:cond delay="499"/>
-                                          </p:stCondLst>
-                                        </p:cTn>
-                                        <p:tgtEl>
-                                          <p:spTgt spid="4"/>
-                                        </p:tgtEl>
-                                        <p:attrNameLst>
-                                          <p:attrName>style.visibility</p:attrName>
-                                        </p:attrNameLst>
-                                      </p:cBhvr>
-                                      <p:to>
-                                        <p:strVal val="hidden"/>
-                                      </p:to>
-                                    </p:set>
-                                  </p:childTnLst>
-                                </p:cTn>
-                              </p:par>
-                            </p:childTnLst>
-                          </p:cTn>
-                        </p:par>
-                        <p:par>
-                          <p:cTn id="11" fill="hold">
-                            <p:stCondLst>
-                              <p:cond delay="1000"/>
-                            </p:stCondLst>
-                            <p:childTnLst>
-                              <p:par>
-                                <p:cTn id="12" presetID="10" presetClass="entr" presetSubtype="0" fill="hold" grpId="0" nodeType="afterEffect">
-                                  <p:stCondLst>
-                                    <p:cond delay="0"/>
-                                  </p:stCondLst>
-                                  <p:childTnLst>
-                                    <p:set>
-                                      <p:cBhvr>
-                                        <p:cTn id="13" dur="1" fill="hold">
-                                          <p:stCondLst>
-                                            <p:cond delay="0"/>
-                                          </p:stCondLst>
-                                        </p:cTn>
-                                        <p:tgtEl>
-                                          <p:spTgt spid="51"/>
-                                        </p:tgtEl>
-                                        <p:attrNameLst>
-                                          <p:attrName>style.visibility</p:attrName>
-                                        </p:attrNameLst>
-                                      </p:cBhvr>
-                                      <p:to>
-                                        <p:strVal val="visible"/>
-                                      </p:to>
-                                    </p:set>
-                                    <p:animEffect transition="in" filter="fade">
-                                      <p:cBhvr>
-                                        <p:cTn id="14" dur="1000"/>
-                                        <p:tgtEl>
-                                          <p:spTgt spid="51"/>
-                                        </p:tgtEl>
-                                      </p:cBhvr>
-                                    </p:animEffect>
-                                  </p:childTnLst>
-                                </p:cTn>
-                              </p:par>
-                              <p:par>
-                                <p:cTn id="15" presetID="10" presetClass="entr" presetSubtype="0" fill="hold" nodeType="withEffect">
-                                  <p:stCondLst>
-                                    <p:cond delay="0"/>
-                                  </p:stCondLst>
-                                  <p:childTnLst>
-                                    <p:set>
-                                      <p:cBhvr>
-                                        <p:cTn id="16" dur="1" fill="hold">
-                                          <p:stCondLst>
-                                            <p:cond delay="0"/>
-                                          </p:stCondLst>
-                                        </p:cTn>
-                                        <p:tgtEl>
-                                          <p:spTgt spid="4"/>
-                                        </p:tgtEl>
-                                        <p:attrNameLst>
-                                          <p:attrName>style.visibility</p:attrName>
-                                        </p:attrNameLst>
-                                      </p:cBhvr>
-                                      <p:to>
-                                        <p:strVal val="visible"/>
-                                      </p:to>
-                                    </p:set>
-                                    <p:animEffect transition="in" filter="fade">
-                                      <p:cBhvr>
-                                        <p:cTn id="17" dur="1000"/>
-                                        <p:tgtEl>
-                                          <p:spTgt spid="4"/>
-                                        </p:tgtEl>
-                                      </p:cBhvr>
-                                    </p:animEffect>
-                                  </p:childTnLst>
-                                </p:cTn>
-                              </p:par>
-                            </p:childTnLst>
-                          </p:cTn>
-                        </p:par>
-                      </p:childTnLst>
-                    </p:cTn>
-                  </p:par>
-                </p:childTnLst>
-              </p:cTn>
-              <p:prevCondLst>
-                <p:cond evt="onPrev" delay="0">
-                  <p:tgtEl>
-                    <p:sldTgt/>
-                  </p:tgtEl>
-                </p:cond>
-              </p:prevCondLst>
-              <p:nextCondLst>
-                <p:cond evt="onNext" delay="0">
-                  <p:tgtEl>
-                    <p:sldTgt/>
-                  </p:tgtEl>
-                </p:cond>
-              </p:nextCondLst>
-            </p:seq>
-          </p:childTnLst>
-        </p:cTn>
+        <p:cTn id="1" dur="indefinite" restart="never" nodeType="tmRoot"/>
       </p:par>
     </p:tnLst>
-    <p:bldLst>
-      <p:bldGraphic spid="44" grpId="0">
-        <p:bldAsOne/>
-      </p:bldGraphic>
-      <p:bldP spid="51" grpId="0" animBg="1"/>
-    </p:bldLst>
   </p:timing>
 </p:sld>
 </file>
@@ -46073,8 +46038,8 @@
         </p:nvSpPr>
         <p:spPr>
           <a:xfrm>
-            <a:off x="2247899" y="192581"/>
-            <a:ext cx="9172198" cy="970450"/>
+            <a:off x="1942433" y="163084"/>
+            <a:ext cx="11916696" cy="970450"/>
           </a:xfrm>
         </p:spPr>
         <p:txBody>
@@ -46082,10 +46047,14 @@
           <a:lstStyle/>
           <a:p>
             <a:r>
-              <a:rPr lang="es-AR" dirty="0" smtClean="0"/>
-              <a:t>Métricas e Indicadores de Proyecto</a:t>
+              <a:rPr lang="es-AR" sz="3500" dirty="0" smtClean="0"/>
+              <a:t>Métricas e Indicadores de </a:t>
             </a:r>
-            <a:endParaRPr lang="es-AR" dirty="0"/>
+            <a:r>
+              <a:rPr lang="es-AR" sz="3500" dirty="0" smtClean="0"/>
+              <a:t>Proyecto y Producto</a:t>
+            </a:r>
+            <a:endParaRPr lang="es-AR" sz="3500" dirty="0"/>
           </a:p>
         </p:txBody>
       </p:sp>

</xml_diff>

<commit_message>
-Cambios menores en la Presentación
</commit_message>
<xml_diff>
--- a/Documentacion/Presentación Grado de Avances/Presentación Proyecto - Grado de Avances.pptx
+++ b/Documentacion/Presentación Grado de Avances/Presentación Proyecto - Grado de Avances.pptx
@@ -3969,7 +3969,7 @@
         <a:lstStyle/>
         <a:p>
           <a:r>
-            <a:rPr lang="es-AR" sz="2400" b="1" dirty="0" smtClean="0">
+            <a:rPr lang="es-AR" sz="2400" b="1" smtClean="0">
               <a:effectLst>
                 <a:outerShdw blurRad="38100" dist="38100" dir="2700000" algn="tl">
                   <a:srgbClr val="000000">
@@ -3979,7 +3979,7 @@
               </a:effectLst>
               <a:latin typeface="+mj-lt"/>
             </a:rPr>
-            <a:t>Herramientas y Cambios</a:t>
+            <a:t>Cambios en el Plan</a:t>
           </a:r>
           <a:endParaRPr lang="es-AR" sz="2400" b="1" dirty="0">
             <a:effectLst>
@@ -5107,8 +5107,8 @@
     <dgm:cxn modelId="{033E09AC-6D4D-414E-862D-B5A442B1AC27}" type="presOf" srcId="{ABDCEAC1-7F67-454D-84AF-2ECB51702D13}" destId="{474233D3-0411-4ECF-9B57-DA9032FAB377}" srcOrd="0" destOrd="0" presId="urn:microsoft.com/office/officeart/2005/8/layout/vList5"/>
     <dgm:cxn modelId="{71EEBC94-C7CD-44E6-B1DC-DAF8B3C40CCA}" srcId="{5B42A3B2-F1A4-4AAD-92E6-CBE520DF75A4}" destId="{D80178D8-855D-4D8C-BAE2-17D72C190F1C}" srcOrd="4" destOrd="0" parTransId="{CE8167CF-87E1-42C1-8B64-351F9D65AEA0}" sibTransId="{42623A96-96F1-43CA-BA62-11C446A70135}"/>
     <dgm:cxn modelId="{4137832A-ED43-4C35-B279-B35137E9B3E9}" srcId="{8587132E-9006-496A-8F9A-F4971DD58E1B}" destId="{6896E919-8BCC-48FF-BCE3-BFE66BFB1A06}" srcOrd="0" destOrd="0" parTransId="{E36E377B-B494-400F-B163-198EA04FA50E}" sibTransId="{7D1BA1F4-2223-4C45-815D-8FB75C8F2E3A}"/>
+    <dgm:cxn modelId="{E08744B4-69D5-4A50-89E1-C260D5ED9AC7}" type="presOf" srcId="{B7551B5D-2840-4B19-AA2B-F2E0633B3A37}" destId="{EA225968-22AD-4266-B086-723503A371EA}" srcOrd="0" destOrd="0" presId="urn:microsoft.com/office/officeart/2005/8/layout/vList5"/>
     <dgm:cxn modelId="{1118EDD1-B889-4A46-BD09-FD906CE2F23D}" type="presOf" srcId="{AA89FF9F-D7AB-46FF-8516-736811A50D78}" destId="{81427C62-5655-4813-AC16-2932A923AE10}" srcOrd="0" destOrd="0" presId="urn:microsoft.com/office/officeart/2005/8/layout/vList5"/>
-    <dgm:cxn modelId="{E08744B4-69D5-4A50-89E1-C260D5ED9AC7}" type="presOf" srcId="{B7551B5D-2840-4B19-AA2B-F2E0633B3A37}" destId="{EA225968-22AD-4266-B086-723503A371EA}" srcOrd="0" destOrd="0" presId="urn:microsoft.com/office/officeart/2005/8/layout/vList5"/>
     <dgm:cxn modelId="{3F3BF574-AAD8-419F-B503-96D047DF15CE}" type="presParOf" srcId="{1AC5862D-3A38-4A56-8BBB-5228D3259E64}" destId="{6FBAC80C-69A4-4EBB-A9DA-D287B5B59A74}" srcOrd="0" destOrd="0" presId="urn:microsoft.com/office/officeart/2005/8/layout/vList5"/>
     <dgm:cxn modelId="{85AE3A7E-A6C9-4A33-B561-3AC2428D6853}" type="presParOf" srcId="{6FBAC80C-69A4-4EBB-A9DA-D287B5B59A74}" destId="{909E8BCD-0B1A-41E7-BFFF-B89785456621}" srcOrd="0" destOrd="0" presId="urn:microsoft.com/office/officeart/2005/8/layout/vList5"/>
     <dgm:cxn modelId="{134167C9-1E13-44A1-A9FB-452A02FA070E}" type="presParOf" srcId="{6FBAC80C-69A4-4EBB-A9DA-D287B5B59A74}" destId="{D79D4B58-D90B-49E8-B5D0-2B484EB6045D}" srcOrd="1" destOrd="0" presId="urn:microsoft.com/office/officeart/2005/8/layout/vList5"/>
@@ -5166,11 +5166,7 @@
           </a:r>
           <a:r>
             <a:rPr lang="es-AR" sz="2000" dirty="0" smtClean="0"/>
-            <a:t>de </a:t>
-          </a:r>
-          <a:r>
-            <a:rPr lang="es-AR" sz="2000" dirty="0" smtClean="0"/>
-            <a:t>Proyecto y de Producto </a:t>
+            <a:t>de Proyecto y de Producto </a:t>
           </a:r>
           <a:endParaRPr lang="es-ES" sz="2000" dirty="0"/>
         </a:p>
@@ -6215,20 +6211,20 @@
     </dgm:pt>
   </dgm:ptLst>
   <dgm:cxnLst>
+    <dgm:cxn modelId="{49EE22DC-5F2C-4520-9ECA-69CA034E3E84}" type="presOf" srcId="{E3E24D61-DC83-4221-A625-3253A8A07D4E}" destId="{889CCFCF-85CF-42EE-B1C3-B84E8EE140C2}" srcOrd="0" destOrd="0" presId="urn:microsoft.com/office/officeart/2008/layout/VerticalCurvedList"/>
+    <dgm:cxn modelId="{A74E0EB2-308F-403E-9F75-A6F630C4E55D}" type="presOf" srcId="{0E8DDFC9-A553-43E8-8ADD-DACAFE998484}" destId="{E7CE5C3F-775D-45A0-8FC7-59E2443FB5BB}" srcOrd="0" destOrd="0" presId="urn:microsoft.com/office/officeart/2008/layout/VerticalCurvedList"/>
+    <dgm:cxn modelId="{009EA7D8-905E-4CF5-AD7F-033F2C5F116E}" type="presOf" srcId="{767EEABE-FA01-434B-BFB1-DABB2B0B3538}" destId="{B1E84231-A085-4FBA-A7F1-0724F2582F6F}" srcOrd="0" destOrd="0" presId="urn:microsoft.com/office/officeart/2008/layout/VerticalCurvedList"/>
+    <dgm:cxn modelId="{E783B8BE-2BD4-4C04-BDDF-BE17ACA9F295}" type="presOf" srcId="{61775FC0-4D76-4DBD-8D6A-B45D8C8F447D}" destId="{2844CD40-437E-4C4F-A2EE-801021F6711B}" srcOrd="0" destOrd="0" presId="urn:microsoft.com/office/officeart/2008/layout/VerticalCurvedList"/>
+    <dgm:cxn modelId="{36190A50-AB37-4DBE-841D-84CE7B3AE27C}" type="presOf" srcId="{EB69C98D-0511-46AE-8510-7CCD8A94F1AD}" destId="{A6715B7B-E69E-49A7-BBDE-A964109AD82E}" srcOrd="0" destOrd="0" presId="urn:microsoft.com/office/officeart/2008/layout/VerticalCurvedList"/>
+    <dgm:cxn modelId="{89D38CD6-64FE-4FD5-BED7-753169C4CACF}" srcId="{380B52FA-39C6-48EA-999F-FF4935E2FF90}" destId="{269BCB6E-2880-4F18-9732-C0DD14CA6895}" srcOrd="1" destOrd="0" parTransId="{5152B2E3-1FA3-4D1F-89EB-C3BF645E7CFB}" sibTransId="{D9B8F87E-83B6-41F9-969F-08D3D7CDBBE0}"/>
+    <dgm:cxn modelId="{DADC3634-6D46-4546-8DF3-F7E7D8CF2AD4}" type="presOf" srcId="{CC4D44A6-7179-4CCE-8B0E-9D963F120C7F}" destId="{969B7A61-92F9-49CC-BB98-4FCC80682E86}" srcOrd="0" destOrd="0" presId="urn:microsoft.com/office/officeart/2008/layout/VerticalCurvedList"/>
+    <dgm:cxn modelId="{DD7C9394-52EF-48F5-8584-BA6AE850F2E4}" type="presOf" srcId="{380B52FA-39C6-48EA-999F-FF4935E2FF90}" destId="{E0294AD7-5684-4880-AFE3-8A287502C171}" srcOrd="0" destOrd="0" presId="urn:microsoft.com/office/officeart/2008/layout/VerticalCurvedList"/>
     <dgm:cxn modelId="{A489847D-2ECA-4424-B17A-DB6FCE7A8A5A}" srcId="{380B52FA-39C6-48EA-999F-FF4935E2FF90}" destId="{61775FC0-4D76-4DBD-8D6A-B45D8C8F447D}" srcOrd="3" destOrd="0" parTransId="{5627AB7B-8D76-4D3F-B033-0452D2740CB8}" sibTransId="{A90BBD6A-B4C6-4C41-B0C1-AFAF3DD96903}"/>
-    <dgm:cxn modelId="{DD7C9394-52EF-48F5-8584-BA6AE850F2E4}" type="presOf" srcId="{380B52FA-39C6-48EA-999F-FF4935E2FF90}" destId="{E0294AD7-5684-4880-AFE3-8A287502C171}" srcOrd="0" destOrd="0" presId="urn:microsoft.com/office/officeart/2008/layout/VerticalCurvedList"/>
-    <dgm:cxn modelId="{E783B8BE-2BD4-4C04-BDDF-BE17ACA9F295}" type="presOf" srcId="{61775FC0-4D76-4DBD-8D6A-B45D8C8F447D}" destId="{2844CD40-437E-4C4F-A2EE-801021F6711B}" srcOrd="0" destOrd="0" presId="urn:microsoft.com/office/officeart/2008/layout/VerticalCurvedList"/>
-    <dgm:cxn modelId="{49EE22DC-5F2C-4520-9ECA-69CA034E3E84}" type="presOf" srcId="{E3E24D61-DC83-4221-A625-3253A8A07D4E}" destId="{889CCFCF-85CF-42EE-B1C3-B84E8EE140C2}" srcOrd="0" destOrd="0" presId="urn:microsoft.com/office/officeart/2008/layout/VerticalCurvedList"/>
+    <dgm:cxn modelId="{FFD5E230-1508-477F-88DA-0B1AAA7F61BA}" srcId="{380B52FA-39C6-48EA-999F-FF4935E2FF90}" destId="{E3E24D61-DC83-4221-A625-3253A8A07D4E}" srcOrd="0" destOrd="0" parTransId="{171B5AE9-D9B6-4240-9D84-221E824F7A31}" sibTransId="{CC4D44A6-7179-4CCE-8B0E-9D963F120C7F}"/>
+    <dgm:cxn modelId="{8F895F7B-4E24-4CBD-875F-FDA24134C40E}" srcId="{380B52FA-39C6-48EA-999F-FF4935E2FF90}" destId="{0E8DDFC9-A553-43E8-8ADD-DACAFE998484}" srcOrd="4" destOrd="0" parTransId="{9A92C10D-6A46-4A28-B36F-8C076C8A2723}" sibTransId="{FA11F3E5-A6EE-4D12-9C43-9DA399E6752D}"/>
     <dgm:cxn modelId="{8EDA5967-C3EE-4BA9-A906-3EBA10582C14}" srcId="{380B52FA-39C6-48EA-999F-FF4935E2FF90}" destId="{EB69C98D-0511-46AE-8510-7CCD8A94F1AD}" srcOrd="5" destOrd="0" parTransId="{D1EF9142-BF1B-46DC-9394-13F37661F665}" sibTransId="{10F45A30-D8F2-4C20-943B-AD10ADAF5F81}"/>
-    <dgm:cxn modelId="{8F895F7B-4E24-4CBD-875F-FDA24134C40E}" srcId="{380B52FA-39C6-48EA-999F-FF4935E2FF90}" destId="{0E8DDFC9-A553-43E8-8ADD-DACAFE998484}" srcOrd="4" destOrd="0" parTransId="{9A92C10D-6A46-4A28-B36F-8C076C8A2723}" sibTransId="{FA11F3E5-A6EE-4D12-9C43-9DA399E6752D}"/>
-    <dgm:cxn modelId="{DADC3634-6D46-4546-8DF3-F7E7D8CF2AD4}" type="presOf" srcId="{CC4D44A6-7179-4CCE-8B0E-9D963F120C7F}" destId="{969B7A61-92F9-49CC-BB98-4FCC80682E86}" srcOrd="0" destOrd="0" presId="urn:microsoft.com/office/officeart/2008/layout/VerticalCurvedList"/>
-    <dgm:cxn modelId="{89D38CD6-64FE-4FD5-BED7-753169C4CACF}" srcId="{380B52FA-39C6-48EA-999F-FF4935E2FF90}" destId="{269BCB6E-2880-4F18-9732-C0DD14CA6895}" srcOrd="1" destOrd="0" parTransId="{5152B2E3-1FA3-4D1F-89EB-C3BF645E7CFB}" sibTransId="{D9B8F87E-83B6-41F9-969F-08D3D7CDBBE0}"/>
-    <dgm:cxn modelId="{A74E0EB2-308F-403E-9F75-A6F630C4E55D}" type="presOf" srcId="{0E8DDFC9-A553-43E8-8ADD-DACAFE998484}" destId="{E7CE5C3F-775D-45A0-8FC7-59E2443FB5BB}" srcOrd="0" destOrd="0" presId="urn:microsoft.com/office/officeart/2008/layout/VerticalCurvedList"/>
-    <dgm:cxn modelId="{36190A50-AB37-4DBE-841D-84CE7B3AE27C}" type="presOf" srcId="{EB69C98D-0511-46AE-8510-7CCD8A94F1AD}" destId="{A6715B7B-E69E-49A7-BBDE-A964109AD82E}" srcOrd="0" destOrd="0" presId="urn:microsoft.com/office/officeart/2008/layout/VerticalCurvedList"/>
     <dgm:cxn modelId="{60CFD0AC-A92A-4E72-A578-D3B8F4590D91}" srcId="{380B52FA-39C6-48EA-999F-FF4935E2FF90}" destId="{767EEABE-FA01-434B-BFB1-DABB2B0B3538}" srcOrd="2" destOrd="0" parTransId="{B7276962-EA13-4004-8FCA-9E43AC3736C6}" sibTransId="{3D676867-16F7-4C1B-968F-0A14807FFE0B}"/>
     <dgm:cxn modelId="{25D2925A-D2DA-429F-B20F-2442D31D4DFD}" type="presOf" srcId="{269BCB6E-2880-4F18-9732-C0DD14CA6895}" destId="{21664CED-339C-476D-85A5-28A63C40B1E3}" srcOrd="0" destOrd="0" presId="urn:microsoft.com/office/officeart/2008/layout/VerticalCurvedList"/>
-    <dgm:cxn modelId="{009EA7D8-905E-4CF5-AD7F-033F2C5F116E}" type="presOf" srcId="{767EEABE-FA01-434B-BFB1-DABB2B0B3538}" destId="{B1E84231-A085-4FBA-A7F1-0724F2582F6F}" srcOrd="0" destOrd="0" presId="urn:microsoft.com/office/officeart/2008/layout/VerticalCurvedList"/>
-    <dgm:cxn modelId="{FFD5E230-1508-477F-88DA-0B1AAA7F61BA}" srcId="{380B52FA-39C6-48EA-999F-FF4935E2FF90}" destId="{E3E24D61-DC83-4221-A625-3253A8A07D4E}" srcOrd="0" destOrd="0" parTransId="{171B5AE9-D9B6-4240-9D84-221E824F7A31}" sibTransId="{CC4D44A6-7179-4CCE-8B0E-9D963F120C7F}"/>
     <dgm:cxn modelId="{C46509FA-7F85-4FA4-8CA6-EECBA266541B}" type="presParOf" srcId="{E0294AD7-5684-4880-AFE3-8A287502C171}" destId="{2E0DEE6A-5A2C-4DBC-BAF6-E16EE66D546C}" srcOrd="0" destOrd="0" presId="urn:microsoft.com/office/officeart/2008/layout/VerticalCurvedList"/>
     <dgm:cxn modelId="{8A2611CE-8BE6-42B4-9D4E-C80EE0450B79}" type="presParOf" srcId="{2E0DEE6A-5A2C-4DBC-BAF6-E16EE66D546C}" destId="{6EF8B487-7303-479A-BD85-C2D10E331B67}" srcOrd="0" destOrd="0" presId="urn:microsoft.com/office/officeart/2008/layout/VerticalCurvedList"/>
     <dgm:cxn modelId="{72A1D9A8-C010-4595-9578-E6A7B2DB590D}" type="presParOf" srcId="{6EF8B487-7303-479A-BD85-C2D10E331B67}" destId="{D36A4E98-F327-423B-891D-6DAB05EE96EE}" srcOrd="0" destOrd="0" presId="urn:microsoft.com/office/officeart/2008/layout/VerticalCurvedList"/>
@@ -6525,7 +6521,7 @@
             </a:spcAft>
           </a:pPr>
           <a:r>
-            <a:rPr lang="es-AR" sz="2400" b="1" kern="1200" dirty="0" smtClean="0">
+            <a:rPr lang="es-AR" sz="2400" b="1" kern="1200" smtClean="0">
               <a:effectLst>
                 <a:outerShdw blurRad="38100" dist="38100" dir="2700000" algn="tl">
                   <a:srgbClr val="000000">
@@ -6535,7 +6531,7 @@
               </a:effectLst>
               <a:latin typeface="+mj-lt"/>
             </a:rPr>
-            <a:t>Herramientas y Cambios</a:t>
+            <a:t>Cambios en el Plan</a:t>
           </a:r>
           <a:endParaRPr lang="es-AR" sz="2400" b="1" kern="1200" dirty="0">
             <a:effectLst>
@@ -7039,811 +7035,6 @@
       <dsp:cNvGrpSpPr/>
     </dsp:nvGrpSpPr>
     <dsp:grpSpPr/>
-    <dsp:sp modelId="{D79D4B58-D90B-49E8-B5D0-2B484EB6045D}">
-      <dsp:nvSpPr>
-        <dsp:cNvPr id="0" name=""/>
-        <dsp:cNvSpPr/>
-      </dsp:nvSpPr>
-      <dsp:spPr>
-        <a:xfrm rot="5400000">
-          <a:off x="4461523" y="-1861918"/>
-          <a:ext cx="647910" cy="4627465"/>
-        </a:xfrm>
-        <a:prstGeom prst="round2SameRect">
-          <a:avLst/>
-        </a:prstGeom>
-        <a:solidFill>
-          <a:schemeClr val="accent1">
-            <a:alpha val="90000"/>
-            <a:tint val="40000"/>
-            <a:hueOff val="0"/>
-            <a:satOff val="0"/>
-            <a:lumOff val="0"/>
-            <a:alphaOff val="0"/>
-          </a:schemeClr>
-        </a:solidFill>
-        <a:ln w="15875" cap="rnd" cmpd="sng" algn="ctr">
-          <a:solidFill>
-            <a:schemeClr val="accent1">
-              <a:alpha val="90000"/>
-              <a:tint val="40000"/>
-              <a:hueOff val="0"/>
-              <a:satOff val="0"/>
-              <a:lumOff val="0"/>
-              <a:alphaOff val="0"/>
-            </a:schemeClr>
-          </a:solidFill>
-          <a:prstDash val="solid"/>
-        </a:ln>
-        <a:effectLst/>
-      </dsp:spPr>
-      <dsp:style>
-        <a:lnRef idx="2">
-          <a:scrgbClr r="0" g="0" b="0"/>
-        </a:lnRef>
-        <a:fillRef idx="1">
-          <a:scrgbClr r="0" g="0" b="0"/>
-        </a:fillRef>
-        <a:effectRef idx="0">
-          <a:scrgbClr r="0" g="0" b="0"/>
-        </a:effectRef>
-        <a:fontRef idx="minor"/>
-      </dsp:style>
-      <dsp:txBody>
-        <a:bodyPr spcFirstLastPara="0" vert="horz" wrap="square" lIns="247650" tIns="123825" rIns="247650" bIns="123825" numCol="1" spcCol="1270" anchor="ctr" anchorCtr="0">
-          <a:noAutofit/>
-        </a:bodyPr>
-        <a:lstStyle/>
-        <a:p>
-          <a:pPr marL="228600" lvl="1" indent="-228600" algn="l" defTabSz="889000">
-            <a:lnSpc>
-              <a:spcPct val="90000"/>
-            </a:lnSpc>
-            <a:spcBef>
-              <a:spcPct val="0"/>
-            </a:spcBef>
-            <a:spcAft>
-              <a:spcPct val="15000"/>
-            </a:spcAft>
-            <a:buChar char="••"/>
-          </a:pPr>
-          <a:r>
-            <a:rPr lang="es-AR" sz="2000" kern="1200" dirty="0" smtClean="0"/>
-            <a:t>C# - </a:t>
-          </a:r>
-          <a:r>
-            <a:rPr lang="es-AR" sz="2000" kern="1200" dirty="0" err="1" smtClean="0"/>
-            <a:t>Ide</a:t>
-          </a:r>
-          <a:r>
-            <a:rPr lang="es-AR" sz="2000" kern="1200" dirty="0" smtClean="0"/>
-            <a:t> Visual Studio 2012</a:t>
-          </a:r>
-          <a:endParaRPr lang="es-AR" sz="2000" kern="1200" dirty="0"/>
-        </a:p>
-      </dsp:txBody>
-      <dsp:txXfrm rot="-5400000">
-        <a:off x="2471746" y="159487"/>
-        <a:ext cx="4595837" cy="584654"/>
-      </dsp:txXfrm>
-    </dsp:sp>
-    <dsp:sp modelId="{909E8BCD-0B1A-41E7-BFFF-B89785456621}">
-      <dsp:nvSpPr>
-        <dsp:cNvPr id="0" name=""/>
-        <dsp:cNvSpPr/>
-      </dsp:nvSpPr>
-      <dsp:spPr>
-        <a:xfrm>
-          <a:off x="87994" y="53736"/>
-          <a:ext cx="2433690" cy="809887"/>
-        </a:xfrm>
-        <a:prstGeom prst="roundRect">
-          <a:avLst/>
-        </a:prstGeom>
-        <a:solidFill>
-          <a:schemeClr val="accent1">
-            <a:hueOff val="0"/>
-            <a:satOff val="0"/>
-            <a:lumOff val="0"/>
-            <a:alphaOff val="0"/>
-          </a:schemeClr>
-        </a:solidFill>
-        <a:ln w="15875" cap="rnd" cmpd="sng" algn="ctr">
-          <a:solidFill>
-            <a:schemeClr val="lt1">
-              <a:hueOff val="0"/>
-              <a:satOff val="0"/>
-              <a:lumOff val="0"/>
-              <a:alphaOff val="0"/>
-            </a:schemeClr>
-          </a:solidFill>
-          <a:prstDash val="solid"/>
-        </a:ln>
-        <a:effectLst/>
-      </dsp:spPr>
-      <dsp:style>
-        <a:lnRef idx="2">
-          <a:scrgbClr r="0" g="0" b="0"/>
-        </a:lnRef>
-        <a:fillRef idx="1">
-          <a:scrgbClr r="0" g="0" b="0"/>
-        </a:fillRef>
-        <a:effectRef idx="0">
-          <a:scrgbClr r="0" g="0" b="0"/>
-        </a:effectRef>
-        <a:fontRef idx="minor">
-          <a:schemeClr val="lt1"/>
-        </a:fontRef>
-      </dsp:style>
-      <dsp:txBody>
-        <a:bodyPr spcFirstLastPara="0" vert="horz" wrap="square" lIns="83820" tIns="41910" rIns="83820" bIns="41910" numCol="1" spcCol="1270" anchor="ctr" anchorCtr="0">
-          <a:noAutofit/>
-        </a:bodyPr>
-        <a:lstStyle/>
-        <a:p>
-          <a:pPr lvl="0" algn="ctr" defTabSz="977900">
-            <a:lnSpc>
-              <a:spcPct val="90000"/>
-            </a:lnSpc>
-            <a:spcBef>
-              <a:spcPct val="0"/>
-            </a:spcBef>
-            <a:spcAft>
-              <a:spcPct val="35000"/>
-            </a:spcAft>
-          </a:pPr>
-          <a:r>
-            <a:rPr lang="es-AR" sz="2200" kern="1200" dirty="0" smtClean="0"/>
-            <a:t>Lenguaje de Programación</a:t>
-          </a:r>
-          <a:endParaRPr lang="es-AR" sz="2200" kern="1200" dirty="0"/>
-        </a:p>
-      </dsp:txBody>
-      <dsp:txXfrm>
-        <a:off x="127529" y="93271"/>
-        <a:ext cx="2354620" cy="730817"/>
-      </dsp:txXfrm>
-    </dsp:sp>
-    <dsp:sp modelId="{81427C62-5655-4813-AC16-2932A923AE10}">
-      <dsp:nvSpPr>
-        <dsp:cNvPr id="0" name=""/>
-        <dsp:cNvSpPr/>
-      </dsp:nvSpPr>
-      <dsp:spPr>
-        <a:xfrm rot="5400000">
-          <a:off x="4474848" y="-937561"/>
-          <a:ext cx="647910" cy="4627465"/>
-        </a:xfrm>
-        <a:prstGeom prst="round2SameRect">
-          <a:avLst/>
-        </a:prstGeom>
-        <a:solidFill>
-          <a:schemeClr val="accent1">
-            <a:alpha val="90000"/>
-            <a:tint val="40000"/>
-            <a:hueOff val="0"/>
-            <a:satOff val="0"/>
-            <a:lumOff val="0"/>
-            <a:alphaOff val="0"/>
-          </a:schemeClr>
-        </a:solidFill>
-        <a:ln w="15875" cap="rnd" cmpd="sng" algn="ctr">
-          <a:solidFill>
-            <a:schemeClr val="accent1">
-              <a:alpha val="90000"/>
-              <a:tint val="40000"/>
-              <a:hueOff val="0"/>
-              <a:satOff val="0"/>
-              <a:lumOff val="0"/>
-              <a:alphaOff val="0"/>
-            </a:schemeClr>
-          </a:solidFill>
-          <a:prstDash val="solid"/>
-        </a:ln>
-        <a:effectLst/>
-      </dsp:spPr>
-      <dsp:style>
-        <a:lnRef idx="2">
-          <a:scrgbClr r="0" g="0" b="0"/>
-        </a:lnRef>
-        <a:fillRef idx="1">
-          <a:scrgbClr r="0" g="0" b="0"/>
-        </a:fillRef>
-        <a:effectRef idx="0">
-          <a:scrgbClr r="0" g="0" b="0"/>
-        </a:effectRef>
-        <a:fontRef idx="minor"/>
-      </dsp:style>
-      <dsp:txBody>
-        <a:bodyPr spcFirstLastPara="0" vert="horz" wrap="square" lIns="247650" tIns="123825" rIns="247650" bIns="123825" numCol="1" spcCol="1270" anchor="ctr" anchorCtr="0">
-          <a:noAutofit/>
-        </a:bodyPr>
-        <a:lstStyle/>
-        <a:p>
-          <a:pPr marL="228600" lvl="1" indent="-228600" algn="l" defTabSz="889000">
-            <a:lnSpc>
-              <a:spcPct val="90000"/>
-            </a:lnSpc>
-            <a:spcBef>
-              <a:spcPct val="0"/>
-            </a:spcBef>
-            <a:spcAft>
-              <a:spcPct val="15000"/>
-            </a:spcAft>
-            <a:buChar char="••"/>
-          </a:pPr>
-          <a:r>
-            <a:rPr lang="es-AR" sz="2000" kern="1200" dirty="0" smtClean="0"/>
-            <a:t>SQL Server 2012</a:t>
-          </a:r>
-          <a:endParaRPr lang="es-AR" sz="2000" kern="1200" dirty="0"/>
-        </a:p>
-      </dsp:txBody>
-      <dsp:txXfrm rot="-5400000">
-        <a:off x="2485071" y="1083844"/>
-        <a:ext cx="4595837" cy="584654"/>
-      </dsp:txXfrm>
-    </dsp:sp>
-    <dsp:sp modelId="{E917558F-FB63-4C8C-B6E7-90B2277A6599}">
-      <dsp:nvSpPr>
-        <dsp:cNvPr id="0" name=""/>
-        <dsp:cNvSpPr/>
-      </dsp:nvSpPr>
-      <dsp:spPr>
-        <a:xfrm>
-          <a:off x="87994" y="991722"/>
-          <a:ext cx="2433690" cy="809887"/>
-        </a:xfrm>
-        <a:prstGeom prst="roundRect">
-          <a:avLst/>
-        </a:prstGeom>
-        <a:solidFill>
-          <a:schemeClr val="accent1">
-            <a:hueOff val="0"/>
-            <a:satOff val="0"/>
-            <a:lumOff val="0"/>
-            <a:alphaOff val="0"/>
-          </a:schemeClr>
-        </a:solidFill>
-        <a:ln w="15875" cap="rnd" cmpd="sng" algn="ctr">
-          <a:solidFill>
-            <a:schemeClr val="lt1">
-              <a:hueOff val="0"/>
-              <a:satOff val="0"/>
-              <a:lumOff val="0"/>
-              <a:alphaOff val="0"/>
-            </a:schemeClr>
-          </a:solidFill>
-          <a:prstDash val="solid"/>
-        </a:ln>
-        <a:effectLst/>
-      </dsp:spPr>
-      <dsp:style>
-        <a:lnRef idx="2">
-          <a:scrgbClr r="0" g="0" b="0"/>
-        </a:lnRef>
-        <a:fillRef idx="1">
-          <a:scrgbClr r="0" g="0" b="0"/>
-        </a:fillRef>
-        <a:effectRef idx="0">
-          <a:scrgbClr r="0" g="0" b="0"/>
-        </a:effectRef>
-        <a:fontRef idx="minor">
-          <a:schemeClr val="lt1"/>
-        </a:fontRef>
-      </dsp:style>
-      <dsp:txBody>
-        <a:bodyPr spcFirstLastPara="0" vert="horz" wrap="square" lIns="83820" tIns="41910" rIns="83820" bIns="41910" numCol="1" spcCol="1270" anchor="ctr" anchorCtr="0">
-          <a:noAutofit/>
-        </a:bodyPr>
-        <a:lstStyle/>
-        <a:p>
-          <a:pPr lvl="0" algn="ctr" defTabSz="977900">
-            <a:lnSpc>
-              <a:spcPct val="90000"/>
-            </a:lnSpc>
-            <a:spcBef>
-              <a:spcPct val="0"/>
-            </a:spcBef>
-            <a:spcAft>
-              <a:spcPct val="35000"/>
-            </a:spcAft>
-          </a:pPr>
-          <a:r>
-            <a:rPr lang="es-AR" sz="2200" kern="1200" dirty="0" smtClean="0"/>
-            <a:t>Base de Datos</a:t>
-          </a:r>
-          <a:endParaRPr lang="es-AR" sz="2200" kern="1200" dirty="0"/>
-        </a:p>
-      </dsp:txBody>
-      <dsp:txXfrm>
-        <a:off x="127529" y="1031257"/>
-        <a:ext cx="2354620" cy="730817"/>
-      </dsp:txXfrm>
-    </dsp:sp>
-    <dsp:sp modelId="{99BD9C8E-022D-4F32-A31D-148DD74E6557}">
-      <dsp:nvSpPr>
-        <dsp:cNvPr id="0" name=""/>
-        <dsp:cNvSpPr/>
-      </dsp:nvSpPr>
-      <dsp:spPr>
-        <a:xfrm rot="5400000">
-          <a:off x="4461523" y="-110355"/>
-          <a:ext cx="647910" cy="4627465"/>
-        </a:xfrm>
-        <a:prstGeom prst="round2SameRect">
-          <a:avLst/>
-        </a:prstGeom>
-        <a:solidFill>
-          <a:schemeClr val="accent1">
-            <a:alpha val="90000"/>
-            <a:tint val="40000"/>
-            <a:hueOff val="0"/>
-            <a:satOff val="0"/>
-            <a:lumOff val="0"/>
-            <a:alphaOff val="0"/>
-          </a:schemeClr>
-        </a:solidFill>
-        <a:ln w="15875" cap="rnd" cmpd="sng" algn="ctr">
-          <a:solidFill>
-            <a:schemeClr val="accent1">
-              <a:alpha val="90000"/>
-              <a:tint val="40000"/>
-              <a:hueOff val="0"/>
-              <a:satOff val="0"/>
-              <a:lumOff val="0"/>
-              <a:alphaOff val="0"/>
-            </a:schemeClr>
-          </a:solidFill>
-          <a:prstDash val="solid"/>
-        </a:ln>
-        <a:effectLst/>
-      </dsp:spPr>
-      <dsp:style>
-        <a:lnRef idx="2">
-          <a:scrgbClr r="0" g="0" b="0"/>
-        </a:lnRef>
-        <a:fillRef idx="1">
-          <a:scrgbClr r="0" g="0" b="0"/>
-        </a:fillRef>
-        <a:effectRef idx="0">
-          <a:scrgbClr r="0" g="0" b="0"/>
-        </a:effectRef>
-        <a:fontRef idx="minor"/>
-      </dsp:style>
-      <dsp:txBody>
-        <a:bodyPr spcFirstLastPara="0" vert="horz" wrap="square" lIns="247650" tIns="123825" rIns="247650" bIns="123825" numCol="1" spcCol="1270" anchor="ctr" anchorCtr="0">
-          <a:noAutofit/>
-        </a:bodyPr>
-        <a:lstStyle/>
-        <a:p>
-          <a:pPr marL="228600" lvl="1" indent="-228600" algn="l" defTabSz="889000">
-            <a:lnSpc>
-              <a:spcPct val="90000"/>
-            </a:lnSpc>
-            <a:spcBef>
-              <a:spcPct val="0"/>
-            </a:spcBef>
-            <a:spcAft>
-              <a:spcPct val="15000"/>
-            </a:spcAft>
-            <a:buChar char="••"/>
-          </a:pPr>
-          <a:r>
-            <a:rPr lang="es-AR" sz="2000" kern="1200" dirty="0" err="1" smtClean="0"/>
-            <a:t>Tortoise</a:t>
-          </a:r>
-          <a:r>
-            <a:rPr lang="es-AR" sz="2000" kern="1200" dirty="0" smtClean="0"/>
-            <a:t> SVN</a:t>
-          </a:r>
-          <a:endParaRPr lang="es-AR" sz="2000" kern="1200" dirty="0"/>
-        </a:p>
-      </dsp:txBody>
-      <dsp:txXfrm rot="-5400000">
-        <a:off x="2471746" y="1911050"/>
-        <a:ext cx="4595837" cy="584654"/>
-      </dsp:txXfrm>
-    </dsp:sp>
-    <dsp:sp modelId="{EA225968-22AD-4266-B086-723503A371EA}">
-      <dsp:nvSpPr>
-        <dsp:cNvPr id="0" name=""/>
-        <dsp:cNvSpPr/>
-      </dsp:nvSpPr>
-      <dsp:spPr>
-        <a:xfrm>
-          <a:off x="87994" y="1846214"/>
-          <a:ext cx="2433690" cy="809887"/>
-        </a:xfrm>
-        <a:prstGeom prst="roundRect">
-          <a:avLst/>
-        </a:prstGeom>
-        <a:solidFill>
-          <a:schemeClr val="accent1">
-            <a:hueOff val="0"/>
-            <a:satOff val="0"/>
-            <a:lumOff val="0"/>
-            <a:alphaOff val="0"/>
-          </a:schemeClr>
-        </a:solidFill>
-        <a:ln w="15875" cap="rnd" cmpd="sng" algn="ctr">
-          <a:solidFill>
-            <a:schemeClr val="lt1">
-              <a:hueOff val="0"/>
-              <a:satOff val="0"/>
-              <a:lumOff val="0"/>
-              <a:alphaOff val="0"/>
-            </a:schemeClr>
-          </a:solidFill>
-          <a:prstDash val="solid"/>
-        </a:ln>
-        <a:effectLst/>
-      </dsp:spPr>
-      <dsp:style>
-        <a:lnRef idx="2">
-          <a:scrgbClr r="0" g="0" b="0"/>
-        </a:lnRef>
-        <a:fillRef idx="1">
-          <a:scrgbClr r="0" g="0" b="0"/>
-        </a:fillRef>
-        <a:effectRef idx="0">
-          <a:scrgbClr r="0" g="0" b="0"/>
-        </a:effectRef>
-        <a:fontRef idx="minor">
-          <a:schemeClr val="lt1"/>
-        </a:fontRef>
-      </dsp:style>
-      <dsp:txBody>
-        <a:bodyPr spcFirstLastPara="0" vert="horz" wrap="square" lIns="83820" tIns="41910" rIns="83820" bIns="41910" numCol="1" spcCol="1270" anchor="ctr" anchorCtr="0">
-          <a:noAutofit/>
-        </a:bodyPr>
-        <a:lstStyle/>
-        <a:p>
-          <a:pPr lvl="0" algn="ctr" defTabSz="977900">
-            <a:lnSpc>
-              <a:spcPct val="90000"/>
-            </a:lnSpc>
-            <a:spcBef>
-              <a:spcPct val="0"/>
-            </a:spcBef>
-            <a:spcAft>
-              <a:spcPct val="35000"/>
-            </a:spcAft>
-          </a:pPr>
-          <a:r>
-            <a:rPr lang="es-AR" sz="2200" kern="1200" dirty="0" smtClean="0"/>
-            <a:t>Versionado</a:t>
-          </a:r>
-          <a:endParaRPr lang="es-AR" sz="2200" kern="1200" dirty="0"/>
-        </a:p>
-      </dsp:txBody>
-      <dsp:txXfrm>
-        <a:off x="127529" y="1885749"/>
-        <a:ext cx="2354620" cy="730817"/>
-      </dsp:txXfrm>
-    </dsp:sp>
-    <dsp:sp modelId="{474233D3-0411-4ECF-9B57-DA9032FAB377}">
-      <dsp:nvSpPr>
-        <dsp:cNvPr id="0" name=""/>
-        <dsp:cNvSpPr/>
-      </dsp:nvSpPr>
-      <dsp:spPr>
-        <a:xfrm rot="5400000">
-          <a:off x="4461523" y="868561"/>
-          <a:ext cx="647910" cy="4627465"/>
-        </a:xfrm>
-        <a:prstGeom prst="round2SameRect">
-          <a:avLst/>
-        </a:prstGeom>
-        <a:solidFill>
-          <a:schemeClr val="accent1">
-            <a:alpha val="90000"/>
-            <a:tint val="40000"/>
-            <a:hueOff val="0"/>
-            <a:satOff val="0"/>
-            <a:lumOff val="0"/>
-            <a:alphaOff val="0"/>
-          </a:schemeClr>
-        </a:solidFill>
-        <a:ln w="15875" cap="rnd" cmpd="sng" algn="ctr">
-          <a:solidFill>
-            <a:schemeClr val="accent1">
-              <a:alpha val="90000"/>
-              <a:tint val="40000"/>
-              <a:hueOff val="0"/>
-              <a:satOff val="0"/>
-              <a:lumOff val="0"/>
-              <a:alphaOff val="0"/>
-            </a:schemeClr>
-          </a:solidFill>
-          <a:prstDash val="solid"/>
-        </a:ln>
-        <a:effectLst/>
-      </dsp:spPr>
-      <dsp:style>
-        <a:lnRef idx="2">
-          <a:scrgbClr r="0" g="0" b="0"/>
-        </a:lnRef>
-        <a:fillRef idx="1">
-          <a:scrgbClr r="0" g="0" b="0"/>
-        </a:fillRef>
-        <a:effectRef idx="0">
-          <a:scrgbClr r="0" g="0" b="0"/>
-        </a:effectRef>
-        <a:fontRef idx="minor"/>
-      </dsp:style>
-      <dsp:txBody>
-        <a:bodyPr spcFirstLastPara="0" vert="horz" wrap="square" lIns="247650" tIns="123825" rIns="247650" bIns="123825" numCol="1" spcCol="1270" anchor="ctr" anchorCtr="0">
-          <a:noAutofit/>
-        </a:bodyPr>
-        <a:lstStyle/>
-        <a:p>
-          <a:pPr marL="228600" lvl="1" indent="-228600" algn="l" defTabSz="889000">
-            <a:lnSpc>
-              <a:spcPct val="90000"/>
-            </a:lnSpc>
-            <a:spcBef>
-              <a:spcPct val="0"/>
-            </a:spcBef>
-            <a:spcAft>
-              <a:spcPct val="15000"/>
-            </a:spcAft>
-            <a:buChar char="••"/>
-          </a:pPr>
-          <a:r>
-            <a:rPr lang="es-AR" sz="2000" kern="1200" dirty="0" smtClean="0"/>
-            <a:t>Google </a:t>
-          </a:r>
-          <a:r>
-            <a:rPr lang="es-AR" sz="2000" kern="1200" dirty="0" err="1" smtClean="0"/>
-            <a:t>Code</a:t>
-          </a:r>
-          <a:endParaRPr lang="es-AR" sz="2000" kern="1200" dirty="0"/>
-        </a:p>
-      </dsp:txBody>
-      <dsp:txXfrm rot="-5400000">
-        <a:off x="2471746" y="2889966"/>
-        <a:ext cx="4595837" cy="584654"/>
-      </dsp:txXfrm>
-    </dsp:sp>
-    <dsp:sp modelId="{BBCE9DB0-30FE-4481-8950-EA0291BD87A0}">
-      <dsp:nvSpPr>
-        <dsp:cNvPr id="0" name=""/>
-        <dsp:cNvSpPr/>
-      </dsp:nvSpPr>
-      <dsp:spPr>
-        <a:xfrm>
-          <a:off x="87994" y="2733243"/>
-          <a:ext cx="2433690" cy="809887"/>
-        </a:xfrm>
-        <a:prstGeom prst="roundRect">
-          <a:avLst/>
-        </a:prstGeom>
-        <a:solidFill>
-          <a:schemeClr val="accent1">
-            <a:hueOff val="0"/>
-            <a:satOff val="0"/>
-            <a:lumOff val="0"/>
-            <a:alphaOff val="0"/>
-          </a:schemeClr>
-        </a:solidFill>
-        <a:ln w="15875" cap="rnd" cmpd="sng" algn="ctr">
-          <a:solidFill>
-            <a:schemeClr val="lt1">
-              <a:hueOff val="0"/>
-              <a:satOff val="0"/>
-              <a:lumOff val="0"/>
-              <a:alphaOff val="0"/>
-            </a:schemeClr>
-          </a:solidFill>
-          <a:prstDash val="solid"/>
-        </a:ln>
-        <a:effectLst/>
-      </dsp:spPr>
-      <dsp:style>
-        <a:lnRef idx="2">
-          <a:scrgbClr r="0" g="0" b="0"/>
-        </a:lnRef>
-        <a:fillRef idx="1">
-          <a:scrgbClr r="0" g="0" b="0"/>
-        </a:fillRef>
-        <a:effectRef idx="0">
-          <a:scrgbClr r="0" g="0" b="0"/>
-        </a:effectRef>
-        <a:fontRef idx="minor">
-          <a:schemeClr val="lt1"/>
-        </a:fontRef>
-      </dsp:style>
-      <dsp:txBody>
-        <a:bodyPr spcFirstLastPara="0" vert="horz" wrap="square" lIns="83820" tIns="41910" rIns="83820" bIns="41910" numCol="1" spcCol="1270" anchor="ctr" anchorCtr="0">
-          <a:noAutofit/>
-        </a:bodyPr>
-        <a:lstStyle/>
-        <a:p>
-          <a:pPr lvl="0" algn="ctr" defTabSz="977900">
-            <a:lnSpc>
-              <a:spcPct val="90000"/>
-            </a:lnSpc>
-            <a:spcBef>
-              <a:spcPct val="0"/>
-            </a:spcBef>
-            <a:spcAft>
-              <a:spcPct val="35000"/>
-            </a:spcAft>
-          </a:pPr>
-          <a:r>
-            <a:rPr lang="es-AR" sz="2200" kern="1200" dirty="0" smtClean="0"/>
-            <a:t>Repositorio</a:t>
-          </a:r>
-          <a:endParaRPr lang="es-AR" sz="2200" kern="1200" dirty="0"/>
-        </a:p>
-      </dsp:txBody>
-      <dsp:txXfrm>
-        <a:off x="127529" y="2772778"/>
-        <a:ext cx="2354620" cy="730817"/>
-      </dsp:txXfrm>
-    </dsp:sp>
-    <dsp:sp modelId="{D97DA0F3-6CD0-44B6-8BDD-0058B220E174}">
-      <dsp:nvSpPr>
-        <dsp:cNvPr id="0" name=""/>
-        <dsp:cNvSpPr/>
-      </dsp:nvSpPr>
-      <dsp:spPr>
-        <a:xfrm rot="5400000">
-          <a:off x="4461523" y="1806547"/>
-          <a:ext cx="647910" cy="4627465"/>
-        </a:xfrm>
-        <a:prstGeom prst="round2SameRect">
-          <a:avLst/>
-        </a:prstGeom>
-        <a:solidFill>
-          <a:schemeClr val="accent1">
-            <a:alpha val="90000"/>
-            <a:tint val="40000"/>
-            <a:hueOff val="0"/>
-            <a:satOff val="0"/>
-            <a:lumOff val="0"/>
-            <a:alphaOff val="0"/>
-          </a:schemeClr>
-        </a:solidFill>
-        <a:ln w="15875" cap="rnd" cmpd="sng" algn="ctr">
-          <a:solidFill>
-            <a:schemeClr val="accent1">
-              <a:alpha val="90000"/>
-              <a:tint val="40000"/>
-              <a:hueOff val="0"/>
-              <a:satOff val="0"/>
-              <a:lumOff val="0"/>
-              <a:alphaOff val="0"/>
-            </a:schemeClr>
-          </a:solidFill>
-          <a:prstDash val="solid"/>
-        </a:ln>
-        <a:effectLst/>
-      </dsp:spPr>
-      <dsp:style>
-        <a:lnRef idx="2">
-          <a:scrgbClr r="0" g="0" b="0"/>
-        </a:lnRef>
-        <a:fillRef idx="1">
-          <a:scrgbClr r="0" g="0" b="0"/>
-        </a:fillRef>
-        <a:effectRef idx="0">
-          <a:scrgbClr r="0" g="0" b="0"/>
-        </a:effectRef>
-        <a:fontRef idx="minor"/>
-      </dsp:style>
-      <dsp:txBody>
-        <a:bodyPr spcFirstLastPara="0" vert="horz" wrap="square" lIns="247650" tIns="123825" rIns="247650" bIns="123825" numCol="1" spcCol="1270" anchor="ctr" anchorCtr="0">
-          <a:noAutofit/>
-        </a:bodyPr>
-        <a:lstStyle/>
-        <a:p>
-          <a:pPr marL="228600" lvl="1" indent="-228600" algn="l" defTabSz="889000">
-            <a:lnSpc>
-              <a:spcPct val="90000"/>
-            </a:lnSpc>
-            <a:spcBef>
-              <a:spcPct val="0"/>
-            </a:spcBef>
-            <a:spcAft>
-              <a:spcPct val="15000"/>
-            </a:spcAft>
-            <a:buChar char="••"/>
-          </a:pPr>
-          <a:r>
-            <a:rPr lang="es-AR" sz="2000" kern="1200" dirty="0" err="1" smtClean="0"/>
-            <a:t>Start</a:t>
-          </a:r>
-          <a:r>
-            <a:rPr lang="es-AR" sz="2000" kern="1200" dirty="0" smtClean="0"/>
-            <a:t> UML</a:t>
-          </a:r>
-          <a:endParaRPr lang="es-AR" sz="2000" kern="1200" dirty="0"/>
-        </a:p>
-      </dsp:txBody>
-      <dsp:txXfrm rot="-5400000">
-        <a:off x="2471746" y="3827952"/>
-        <a:ext cx="4595837" cy="584654"/>
-      </dsp:txXfrm>
-    </dsp:sp>
-    <dsp:sp modelId="{0444FB80-74ED-4F37-8840-17FDC27037F5}">
-      <dsp:nvSpPr>
-        <dsp:cNvPr id="0" name=""/>
-        <dsp:cNvSpPr/>
-      </dsp:nvSpPr>
-      <dsp:spPr>
-        <a:xfrm>
-          <a:off x="87994" y="3671229"/>
-          <a:ext cx="2433690" cy="809887"/>
-        </a:xfrm>
-        <a:prstGeom prst="roundRect">
-          <a:avLst/>
-        </a:prstGeom>
-        <a:solidFill>
-          <a:schemeClr val="accent1">
-            <a:hueOff val="0"/>
-            <a:satOff val="0"/>
-            <a:lumOff val="0"/>
-            <a:alphaOff val="0"/>
-          </a:schemeClr>
-        </a:solidFill>
-        <a:ln w="15875" cap="rnd" cmpd="sng" algn="ctr">
-          <a:solidFill>
-            <a:schemeClr val="lt1">
-              <a:hueOff val="0"/>
-              <a:satOff val="0"/>
-              <a:lumOff val="0"/>
-              <a:alphaOff val="0"/>
-            </a:schemeClr>
-          </a:solidFill>
-          <a:prstDash val="solid"/>
-        </a:ln>
-        <a:effectLst/>
-      </dsp:spPr>
-      <dsp:style>
-        <a:lnRef idx="2">
-          <a:scrgbClr r="0" g="0" b="0"/>
-        </a:lnRef>
-        <a:fillRef idx="1">
-          <a:scrgbClr r="0" g="0" b="0"/>
-        </a:fillRef>
-        <a:effectRef idx="0">
-          <a:scrgbClr r="0" g="0" b="0"/>
-        </a:effectRef>
-        <a:fontRef idx="minor">
-          <a:schemeClr val="lt1"/>
-        </a:fontRef>
-      </dsp:style>
-      <dsp:txBody>
-        <a:bodyPr spcFirstLastPara="0" vert="horz" wrap="square" lIns="83820" tIns="41910" rIns="83820" bIns="41910" numCol="1" spcCol="1270" anchor="ctr" anchorCtr="0">
-          <a:noAutofit/>
-        </a:bodyPr>
-        <a:lstStyle/>
-        <a:p>
-          <a:pPr lvl="0" algn="ctr" defTabSz="977900">
-            <a:lnSpc>
-              <a:spcPct val="90000"/>
-            </a:lnSpc>
-            <a:spcBef>
-              <a:spcPct val="0"/>
-            </a:spcBef>
-            <a:spcAft>
-              <a:spcPct val="35000"/>
-            </a:spcAft>
-          </a:pPr>
-          <a:r>
-            <a:rPr lang="es-AR" sz="2200" kern="1200" dirty="0" smtClean="0"/>
-            <a:t>Modelado</a:t>
-          </a:r>
-          <a:endParaRPr lang="es-AR" sz="2200" kern="1200" dirty="0"/>
-        </a:p>
-      </dsp:txBody>
-      <dsp:txXfrm>
-        <a:off x="127529" y="3710764"/>
-        <a:ext cx="2354620" cy="730817"/>
-      </dsp:txXfrm>
-    </dsp:sp>
   </dsp:spTree>
 </dsp:drawing>
 </file>
@@ -7856,435 +7047,6 @@
       <dsp:cNvGrpSpPr/>
     </dsp:nvGrpSpPr>
     <dsp:grpSpPr/>
-    <dsp:sp modelId="{969B7A61-92F9-49CC-BB98-4FCC80682E86}">
-      <dsp:nvSpPr>
-        <dsp:cNvPr id="0" name=""/>
-        <dsp:cNvSpPr/>
-      </dsp:nvSpPr>
-      <dsp:spPr>
-        <a:xfrm>
-          <a:off x="-2377311" y="-367361"/>
-          <a:ext cx="2839151" cy="2839151"/>
-        </a:xfrm>
-        <a:prstGeom prst="blockArc">
-          <a:avLst>
-            <a:gd name="adj1" fmla="val 18900000"/>
-            <a:gd name="adj2" fmla="val 2700000"/>
-            <a:gd name="adj3" fmla="val 761"/>
-          </a:avLst>
-        </a:prstGeom>
-        <a:noFill/>
-        <a:ln w="15875" cap="rnd" cmpd="sng" algn="ctr">
-          <a:solidFill>
-            <a:schemeClr val="accent1">
-              <a:shade val="60000"/>
-              <a:hueOff val="0"/>
-              <a:satOff val="0"/>
-              <a:lumOff val="0"/>
-              <a:alphaOff val="0"/>
-            </a:schemeClr>
-          </a:solidFill>
-          <a:prstDash val="solid"/>
-        </a:ln>
-        <a:effectLst/>
-      </dsp:spPr>
-      <dsp:style>
-        <a:lnRef idx="2">
-          <a:scrgbClr r="0" g="0" b="0"/>
-        </a:lnRef>
-        <a:fillRef idx="0">
-          <a:scrgbClr r="0" g="0" b="0"/>
-        </a:fillRef>
-        <a:effectRef idx="0">
-          <a:scrgbClr r="0" g="0" b="0"/>
-        </a:effectRef>
-        <a:fontRef idx="minor"/>
-      </dsp:style>
-    </dsp:sp>
-    <dsp:sp modelId="{41020649-5A09-447F-B967-57AFAA3251EE}">
-      <dsp:nvSpPr>
-        <dsp:cNvPr id="0" name=""/>
-        <dsp:cNvSpPr/>
-      </dsp:nvSpPr>
-      <dsp:spPr>
-        <a:xfrm>
-          <a:off x="296898" y="210442"/>
-          <a:ext cx="7853874" cy="420885"/>
-        </a:xfrm>
-        <a:prstGeom prst="rect">
-          <a:avLst/>
-        </a:prstGeom>
-        <a:solidFill>
-          <a:schemeClr val="accent1">
-            <a:hueOff val="0"/>
-            <a:satOff val="0"/>
-            <a:lumOff val="0"/>
-            <a:alphaOff val="0"/>
-          </a:schemeClr>
-        </a:solidFill>
-        <a:ln w="15875" cap="rnd" cmpd="sng" algn="ctr">
-          <a:solidFill>
-            <a:schemeClr val="lt1">
-              <a:hueOff val="0"/>
-              <a:satOff val="0"/>
-              <a:lumOff val="0"/>
-              <a:alphaOff val="0"/>
-            </a:schemeClr>
-          </a:solidFill>
-          <a:prstDash val="solid"/>
-        </a:ln>
-        <a:effectLst/>
-      </dsp:spPr>
-      <dsp:style>
-        <a:lnRef idx="2">
-          <a:scrgbClr r="0" g="0" b="0"/>
-        </a:lnRef>
-        <a:fillRef idx="1">
-          <a:scrgbClr r="0" g="0" b="0"/>
-        </a:fillRef>
-        <a:effectRef idx="0">
-          <a:scrgbClr r="0" g="0" b="0"/>
-        </a:effectRef>
-        <a:fontRef idx="minor">
-          <a:schemeClr val="lt1"/>
-        </a:fontRef>
-      </dsp:style>
-      <dsp:txBody>
-        <a:bodyPr spcFirstLastPara="0" vert="horz" wrap="square" lIns="334078" tIns="50800" rIns="50800" bIns="50800" numCol="1" spcCol="1270" anchor="ctr" anchorCtr="0">
-          <a:noAutofit/>
-        </a:bodyPr>
-        <a:lstStyle/>
-        <a:p>
-          <a:pPr lvl="0" algn="l" defTabSz="889000">
-            <a:lnSpc>
-              <a:spcPct val="90000"/>
-            </a:lnSpc>
-            <a:spcBef>
-              <a:spcPct val="0"/>
-            </a:spcBef>
-            <a:spcAft>
-              <a:spcPct val="35000"/>
-            </a:spcAft>
-          </a:pPr>
-          <a:r>
-            <a:rPr lang="es-AR" sz="2000" b="1" kern="1200" dirty="0" smtClean="0"/>
-            <a:t>SCRUM: </a:t>
-          </a:r>
-          <a:r>
-            <a:rPr lang="es-AR" sz="2000" kern="1200" dirty="0" smtClean="0"/>
-            <a:t>Framework de Gestión de Proyecto</a:t>
-          </a:r>
-          <a:endParaRPr lang="es-ES" sz="2000" kern="1200" dirty="0"/>
-        </a:p>
-      </dsp:txBody>
-      <dsp:txXfrm>
-        <a:off x="296898" y="210442"/>
-        <a:ext cx="7853874" cy="420885"/>
-      </dsp:txXfrm>
-    </dsp:sp>
-    <dsp:sp modelId="{1952AAD4-5524-418F-83C8-E32D1A990390}">
-      <dsp:nvSpPr>
-        <dsp:cNvPr id="0" name=""/>
-        <dsp:cNvSpPr/>
-      </dsp:nvSpPr>
-      <dsp:spPr>
-        <a:xfrm>
-          <a:off x="33845" y="157832"/>
-          <a:ext cx="526107" cy="526107"/>
-        </a:xfrm>
-        <a:prstGeom prst="ellipse">
-          <a:avLst/>
-        </a:prstGeom>
-        <a:solidFill>
-          <a:schemeClr val="lt1">
-            <a:hueOff val="0"/>
-            <a:satOff val="0"/>
-            <a:lumOff val="0"/>
-            <a:alphaOff val="0"/>
-          </a:schemeClr>
-        </a:solidFill>
-        <a:ln w="15875" cap="rnd" cmpd="sng" algn="ctr">
-          <a:solidFill>
-            <a:schemeClr val="accent1">
-              <a:hueOff val="0"/>
-              <a:satOff val="0"/>
-              <a:lumOff val="0"/>
-              <a:alphaOff val="0"/>
-            </a:schemeClr>
-          </a:solidFill>
-          <a:prstDash val="solid"/>
-        </a:ln>
-        <a:effectLst/>
-      </dsp:spPr>
-      <dsp:style>
-        <a:lnRef idx="2">
-          <a:scrgbClr r="0" g="0" b="0"/>
-        </a:lnRef>
-        <a:fillRef idx="1">
-          <a:scrgbClr r="0" g="0" b="0"/>
-        </a:fillRef>
-        <a:effectRef idx="0">
-          <a:scrgbClr r="0" g="0" b="0"/>
-        </a:effectRef>
-        <a:fontRef idx="minor"/>
-      </dsp:style>
-    </dsp:sp>
-    <dsp:sp modelId="{2FAE4E58-6639-4FEB-B790-D54E65E84C74}">
-      <dsp:nvSpPr>
-        <dsp:cNvPr id="0" name=""/>
-        <dsp:cNvSpPr/>
-      </dsp:nvSpPr>
-      <dsp:spPr>
-        <a:xfrm>
-          <a:off x="449890" y="841771"/>
-          <a:ext cx="7700882" cy="420885"/>
-        </a:xfrm>
-        <a:prstGeom prst="rect">
-          <a:avLst/>
-        </a:prstGeom>
-        <a:solidFill>
-          <a:schemeClr val="accent1">
-            <a:hueOff val="0"/>
-            <a:satOff val="0"/>
-            <a:lumOff val="0"/>
-            <a:alphaOff val="0"/>
-          </a:schemeClr>
-        </a:solidFill>
-        <a:ln w="15875" cap="rnd" cmpd="sng" algn="ctr">
-          <a:solidFill>
-            <a:schemeClr val="lt1">
-              <a:hueOff val="0"/>
-              <a:satOff val="0"/>
-              <a:lumOff val="0"/>
-              <a:alphaOff val="0"/>
-            </a:schemeClr>
-          </a:solidFill>
-          <a:prstDash val="solid"/>
-        </a:ln>
-        <a:effectLst/>
-      </dsp:spPr>
-      <dsp:style>
-        <a:lnRef idx="2">
-          <a:scrgbClr r="0" g="0" b="0"/>
-        </a:lnRef>
-        <a:fillRef idx="1">
-          <a:scrgbClr r="0" g="0" b="0"/>
-        </a:fillRef>
-        <a:effectRef idx="0">
-          <a:scrgbClr r="0" g="0" b="0"/>
-        </a:effectRef>
-        <a:fontRef idx="minor">
-          <a:schemeClr val="lt1"/>
-        </a:fontRef>
-      </dsp:style>
-      <dsp:txBody>
-        <a:bodyPr spcFirstLastPara="0" vert="horz" wrap="square" lIns="334078" tIns="50800" rIns="50800" bIns="50800" numCol="1" spcCol="1270" anchor="ctr" anchorCtr="0">
-          <a:noAutofit/>
-        </a:bodyPr>
-        <a:lstStyle/>
-        <a:p>
-          <a:pPr lvl="0" algn="l" defTabSz="889000">
-            <a:lnSpc>
-              <a:spcPct val="90000"/>
-            </a:lnSpc>
-            <a:spcBef>
-              <a:spcPct val="0"/>
-            </a:spcBef>
-            <a:spcAft>
-              <a:spcPct val="35000"/>
-            </a:spcAft>
-          </a:pPr>
-          <a:r>
-            <a:rPr lang="es-ES" sz="2000" kern="1200" dirty="0" smtClean="0"/>
-            <a:t>Seguimiento y Control de Proyecto</a:t>
-          </a:r>
-          <a:endParaRPr lang="es-ES" sz="2000" kern="1200" dirty="0"/>
-        </a:p>
-      </dsp:txBody>
-      <dsp:txXfrm>
-        <a:off x="449890" y="841771"/>
-        <a:ext cx="7700882" cy="420885"/>
-      </dsp:txXfrm>
-    </dsp:sp>
-    <dsp:sp modelId="{147902AD-0839-4A77-B901-5788D58B81DA}">
-      <dsp:nvSpPr>
-        <dsp:cNvPr id="0" name=""/>
-        <dsp:cNvSpPr/>
-      </dsp:nvSpPr>
-      <dsp:spPr>
-        <a:xfrm>
-          <a:off x="186836" y="789160"/>
-          <a:ext cx="526107" cy="526107"/>
-        </a:xfrm>
-        <a:prstGeom prst="ellipse">
-          <a:avLst/>
-        </a:prstGeom>
-        <a:solidFill>
-          <a:schemeClr val="lt1">
-            <a:hueOff val="0"/>
-            <a:satOff val="0"/>
-            <a:lumOff val="0"/>
-            <a:alphaOff val="0"/>
-          </a:schemeClr>
-        </a:solidFill>
-        <a:ln w="15875" cap="rnd" cmpd="sng" algn="ctr">
-          <a:solidFill>
-            <a:schemeClr val="accent1">
-              <a:hueOff val="0"/>
-              <a:satOff val="0"/>
-              <a:lumOff val="0"/>
-              <a:alphaOff val="0"/>
-            </a:schemeClr>
-          </a:solidFill>
-          <a:prstDash val="solid"/>
-        </a:ln>
-        <a:effectLst/>
-      </dsp:spPr>
-      <dsp:style>
-        <a:lnRef idx="2">
-          <a:scrgbClr r="0" g="0" b="0"/>
-        </a:lnRef>
-        <a:fillRef idx="1">
-          <a:scrgbClr r="0" g="0" b="0"/>
-        </a:fillRef>
-        <a:effectRef idx="0">
-          <a:scrgbClr r="0" g="0" b="0"/>
-        </a:effectRef>
-        <a:fontRef idx="minor"/>
-      </dsp:style>
-    </dsp:sp>
-    <dsp:sp modelId="{C7361695-FD83-4385-A0C8-BA8686F4E414}">
-      <dsp:nvSpPr>
-        <dsp:cNvPr id="0" name=""/>
-        <dsp:cNvSpPr/>
-      </dsp:nvSpPr>
-      <dsp:spPr>
-        <a:xfrm>
-          <a:off x="296898" y="1473099"/>
-          <a:ext cx="7853874" cy="420885"/>
-        </a:xfrm>
-        <a:prstGeom prst="rect">
-          <a:avLst/>
-        </a:prstGeom>
-        <a:solidFill>
-          <a:schemeClr val="accent1">
-            <a:hueOff val="0"/>
-            <a:satOff val="0"/>
-            <a:lumOff val="0"/>
-            <a:alphaOff val="0"/>
-          </a:schemeClr>
-        </a:solidFill>
-        <a:ln w="15875" cap="rnd" cmpd="sng" algn="ctr">
-          <a:solidFill>
-            <a:schemeClr val="lt1">
-              <a:hueOff val="0"/>
-              <a:satOff val="0"/>
-              <a:lumOff val="0"/>
-              <a:alphaOff val="0"/>
-            </a:schemeClr>
-          </a:solidFill>
-          <a:prstDash val="solid"/>
-        </a:ln>
-        <a:effectLst/>
-      </dsp:spPr>
-      <dsp:style>
-        <a:lnRef idx="2">
-          <a:scrgbClr r="0" g="0" b="0"/>
-        </a:lnRef>
-        <a:fillRef idx="1">
-          <a:scrgbClr r="0" g="0" b="0"/>
-        </a:fillRef>
-        <a:effectRef idx="0">
-          <a:scrgbClr r="0" g="0" b="0"/>
-        </a:effectRef>
-        <a:fontRef idx="minor">
-          <a:schemeClr val="lt1"/>
-        </a:fontRef>
-      </dsp:style>
-      <dsp:txBody>
-        <a:bodyPr spcFirstLastPara="0" vert="horz" wrap="square" lIns="334078" tIns="50800" rIns="50800" bIns="50800" numCol="1" spcCol="1270" anchor="ctr" anchorCtr="0">
-          <a:noAutofit/>
-        </a:bodyPr>
-        <a:lstStyle/>
-        <a:p>
-          <a:pPr lvl="0" algn="l" defTabSz="889000">
-            <a:lnSpc>
-              <a:spcPct val="90000"/>
-            </a:lnSpc>
-            <a:spcBef>
-              <a:spcPct val="0"/>
-            </a:spcBef>
-            <a:spcAft>
-              <a:spcPct val="35000"/>
-            </a:spcAft>
-          </a:pPr>
-          <a:r>
-            <a:rPr lang="es-AR" sz="2000" b="1" kern="1200" dirty="0" smtClean="0"/>
-            <a:t>Métricas e Indicadores </a:t>
-          </a:r>
-          <a:r>
-            <a:rPr lang="es-AR" sz="2000" kern="1200" dirty="0" smtClean="0"/>
-            <a:t>de </a:t>
-          </a:r>
-          <a:r>
-            <a:rPr lang="es-AR" sz="2000" kern="1200" dirty="0" smtClean="0"/>
-            <a:t>Proyecto y de Producto </a:t>
-          </a:r>
-          <a:endParaRPr lang="es-ES" sz="2000" kern="1200" dirty="0"/>
-        </a:p>
-      </dsp:txBody>
-      <dsp:txXfrm>
-        <a:off x="296898" y="1473099"/>
-        <a:ext cx="7853874" cy="420885"/>
-      </dsp:txXfrm>
-    </dsp:sp>
-    <dsp:sp modelId="{876F9F0B-15C7-4E40-97CF-C02C7289BCAE}">
-      <dsp:nvSpPr>
-        <dsp:cNvPr id="0" name=""/>
-        <dsp:cNvSpPr/>
-      </dsp:nvSpPr>
-      <dsp:spPr>
-        <a:xfrm>
-          <a:off x="33845" y="1420488"/>
-          <a:ext cx="526107" cy="526107"/>
-        </a:xfrm>
-        <a:prstGeom prst="ellipse">
-          <a:avLst/>
-        </a:prstGeom>
-        <a:solidFill>
-          <a:schemeClr val="lt1">
-            <a:hueOff val="0"/>
-            <a:satOff val="0"/>
-            <a:lumOff val="0"/>
-            <a:alphaOff val="0"/>
-          </a:schemeClr>
-        </a:solidFill>
-        <a:ln w="15875" cap="rnd" cmpd="sng" algn="ctr">
-          <a:solidFill>
-            <a:schemeClr val="accent1">
-              <a:hueOff val="0"/>
-              <a:satOff val="0"/>
-              <a:lumOff val="0"/>
-              <a:alphaOff val="0"/>
-            </a:schemeClr>
-          </a:solidFill>
-          <a:prstDash val="solid"/>
-        </a:ln>
-        <a:effectLst/>
-      </dsp:spPr>
-      <dsp:style>
-        <a:lnRef idx="2">
-          <a:scrgbClr r="0" g="0" b="0"/>
-        </a:lnRef>
-        <a:fillRef idx="1">
-          <a:scrgbClr r="0" g="0" b="0"/>
-        </a:fillRef>
-        <a:effectRef idx="0">
-          <a:scrgbClr r="0" g="0" b="0"/>
-        </a:effectRef>
-        <a:fontRef idx="minor"/>
-      </dsp:style>
-    </dsp:sp>
   </dsp:spTree>
 </dsp:drawing>
 </file>
@@ -8297,303 +7059,6 @@
       <dsp:cNvGrpSpPr/>
     </dsp:nvGrpSpPr>
     <dsp:grpSpPr/>
-    <dsp:sp modelId="{969B7A61-92F9-49CC-BB98-4FCC80682E86}">
-      <dsp:nvSpPr>
-        <dsp:cNvPr id="0" name=""/>
-        <dsp:cNvSpPr/>
-      </dsp:nvSpPr>
-      <dsp:spPr>
-        <a:xfrm>
-          <a:off x="-2702414" y="-419265"/>
-          <a:ext cx="3244726" cy="3244726"/>
-        </a:xfrm>
-        <a:prstGeom prst="blockArc">
-          <a:avLst>
-            <a:gd name="adj1" fmla="val 18900000"/>
-            <a:gd name="adj2" fmla="val 2700000"/>
-            <a:gd name="adj3" fmla="val 666"/>
-          </a:avLst>
-        </a:prstGeom>
-        <a:noFill/>
-        <a:ln w="15875" cap="rnd" cmpd="sng" algn="ctr">
-          <a:solidFill>
-            <a:schemeClr val="accent3">
-              <a:shade val="60000"/>
-              <a:hueOff val="0"/>
-              <a:satOff val="0"/>
-              <a:lumOff val="0"/>
-              <a:alphaOff val="0"/>
-            </a:schemeClr>
-          </a:solidFill>
-          <a:prstDash val="solid"/>
-        </a:ln>
-        <a:effectLst/>
-      </dsp:spPr>
-      <dsp:style>
-        <a:lnRef idx="2">
-          <a:scrgbClr r="0" g="0" b="0"/>
-        </a:lnRef>
-        <a:fillRef idx="0">
-          <a:scrgbClr r="0" g="0" b="0"/>
-        </a:fillRef>
-        <a:effectRef idx="0">
-          <a:scrgbClr r="0" g="0" b="0"/>
-        </a:effectRef>
-        <a:fontRef idx="minor"/>
-      </dsp:style>
-    </dsp:sp>
-    <dsp:sp modelId="{6055E40E-88DB-42DB-BE2A-E111F24F0BAC}">
-      <dsp:nvSpPr>
-        <dsp:cNvPr id="0" name=""/>
-        <dsp:cNvSpPr/>
-      </dsp:nvSpPr>
-      <dsp:spPr>
-        <a:xfrm>
-          <a:off x="442318" y="343749"/>
-          <a:ext cx="5455866" cy="687401"/>
-        </a:xfrm>
-        <a:prstGeom prst="rect">
-          <a:avLst/>
-        </a:prstGeom>
-        <a:solidFill>
-          <a:schemeClr val="accent3">
-            <a:hueOff val="0"/>
-            <a:satOff val="0"/>
-            <a:lumOff val="0"/>
-            <a:alphaOff val="0"/>
-          </a:schemeClr>
-        </a:solidFill>
-        <a:ln w="15875" cap="rnd" cmpd="sng" algn="ctr">
-          <a:solidFill>
-            <a:schemeClr val="lt1">
-              <a:hueOff val="0"/>
-              <a:satOff val="0"/>
-              <a:lumOff val="0"/>
-              <a:alphaOff val="0"/>
-            </a:schemeClr>
-          </a:solidFill>
-          <a:prstDash val="solid"/>
-        </a:ln>
-        <a:effectLst/>
-      </dsp:spPr>
-      <dsp:style>
-        <a:lnRef idx="2">
-          <a:scrgbClr r="0" g="0" b="0"/>
-        </a:lnRef>
-        <a:fillRef idx="1">
-          <a:scrgbClr r="0" g="0" b="0"/>
-        </a:fillRef>
-        <a:effectRef idx="0">
-          <a:scrgbClr r="0" g="0" b="0"/>
-        </a:effectRef>
-        <a:fontRef idx="minor">
-          <a:schemeClr val="lt1"/>
-        </a:fontRef>
-      </dsp:style>
-      <dsp:txBody>
-        <a:bodyPr spcFirstLastPara="0" vert="horz" wrap="square" lIns="545625" tIns="45720" rIns="45720" bIns="45720" numCol="1" spcCol="1270" anchor="ctr" anchorCtr="0">
-          <a:noAutofit/>
-        </a:bodyPr>
-        <a:lstStyle/>
-        <a:p>
-          <a:pPr lvl="0" algn="l" defTabSz="800100">
-            <a:lnSpc>
-              <a:spcPct val="90000"/>
-            </a:lnSpc>
-            <a:spcBef>
-              <a:spcPct val="0"/>
-            </a:spcBef>
-            <a:spcAft>
-              <a:spcPct val="35000"/>
-            </a:spcAft>
-          </a:pPr>
-          <a:r>
-            <a:rPr lang="es-AR" sz="1800" kern="1200" dirty="0" smtClean="0"/>
-            <a:t>2 reuniones semanales: </a:t>
-          </a:r>
-          <a:r>
-            <a:rPr lang="es-AR" sz="1800" b="1" kern="1200" dirty="0" smtClean="0"/>
-            <a:t>Martes y Sábados</a:t>
-          </a:r>
-          <a:endParaRPr lang="es-ES" sz="1800" b="1" kern="1200" dirty="0"/>
-        </a:p>
-      </dsp:txBody>
-      <dsp:txXfrm>
-        <a:off x="442318" y="343749"/>
-        <a:ext cx="5455866" cy="687401"/>
-      </dsp:txXfrm>
-    </dsp:sp>
-    <dsp:sp modelId="{EE92931F-C7E4-4156-83F5-14B75555FB3E}">
-      <dsp:nvSpPr>
-        <dsp:cNvPr id="0" name=""/>
-        <dsp:cNvSpPr/>
-      </dsp:nvSpPr>
-      <dsp:spPr>
-        <a:xfrm>
-          <a:off x="12692" y="257823"/>
-          <a:ext cx="859252" cy="859252"/>
-        </a:xfrm>
-        <a:prstGeom prst="ellipse">
-          <a:avLst/>
-        </a:prstGeom>
-        <a:solidFill>
-          <a:schemeClr val="lt1">
-            <a:hueOff val="0"/>
-            <a:satOff val="0"/>
-            <a:lumOff val="0"/>
-            <a:alphaOff val="0"/>
-          </a:schemeClr>
-        </a:solidFill>
-        <a:ln w="15875" cap="rnd" cmpd="sng" algn="ctr">
-          <a:solidFill>
-            <a:schemeClr val="accent3">
-              <a:hueOff val="0"/>
-              <a:satOff val="0"/>
-              <a:lumOff val="0"/>
-              <a:alphaOff val="0"/>
-            </a:schemeClr>
-          </a:solidFill>
-          <a:prstDash val="solid"/>
-        </a:ln>
-        <a:effectLst/>
-      </dsp:spPr>
-      <dsp:style>
-        <a:lnRef idx="2">
-          <a:scrgbClr r="0" g="0" b="0"/>
-        </a:lnRef>
-        <a:fillRef idx="1">
-          <a:scrgbClr r="0" g="0" b="0"/>
-        </a:fillRef>
-        <a:effectRef idx="0">
-          <a:scrgbClr r="0" g="0" b="0"/>
-        </a:effectRef>
-        <a:fontRef idx="minor"/>
-      </dsp:style>
-    </dsp:sp>
-    <dsp:sp modelId="{8B67C55B-DA1F-45A6-BC20-E88131C085C4}">
-      <dsp:nvSpPr>
-        <dsp:cNvPr id="0" name=""/>
-        <dsp:cNvSpPr/>
-      </dsp:nvSpPr>
-      <dsp:spPr>
-        <a:xfrm>
-          <a:off x="442318" y="1480869"/>
-          <a:ext cx="5455866" cy="475750"/>
-        </a:xfrm>
-        <a:prstGeom prst="rect">
-          <a:avLst/>
-        </a:prstGeom>
-        <a:solidFill>
-          <a:schemeClr val="accent3">
-            <a:hueOff val="0"/>
-            <a:satOff val="0"/>
-            <a:lumOff val="0"/>
-            <a:alphaOff val="0"/>
-          </a:schemeClr>
-        </a:solidFill>
-        <a:ln w="15875" cap="rnd" cmpd="sng" algn="ctr">
-          <a:solidFill>
-            <a:schemeClr val="lt1">
-              <a:hueOff val="0"/>
-              <a:satOff val="0"/>
-              <a:lumOff val="0"/>
-              <a:alphaOff val="0"/>
-            </a:schemeClr>
-          </a:solidFill>
-          <a:prstDash val="solid"/>
-        </a:ln>
-        <a:effectLst/>
-      </dsp:spPr>
-      <dsp:style>
-        <a:lnRef idx="2">
-          <a:scrgbClr r="0" g="0" b="0"/>
-        </a:lnRef>
-        <a:fillRef idx="1">
-          <a:scrgbClr r="0" g="0" b="0"/>
-        </a:fillRef>
-        <a:effectRef idx="0">
-          <a:scrgbClr r="0" g="0" b="0"/>
-        </a:effectRef>
-        <a:fontRef idx="minor">
-          <a:schemeClr val="lt1"/>
-        </a:fontRef>
-      </dsp:style>
-      <dsp:txBody>
-        <a:bodyPr spcFirstLastPara="0" vert="horz" wrap="square" lIns="545625" tIns="45720" rIns="45720" bIns="45720" numCol="1" spcCol="1270" anchor="ctr" anchorCtr="0">
-          <a:noAutofit/>
-        </a:bodyPr>
-        <a:lstStyle/>
-        <a:p>
-          <a:pPr lvl="0" algn="l" defTabSz="800100">
-            <a:lnSpc>
-              <a:spcPct val="90000"/>
-            </a:lnSpc>
-            <a:spcBef>
-              <a:spcPct val="0"/>
-            </a:spcBef>
-            <a:spcAft>
-              <a:spcPct val="35000"/>
-            </a:spcAft>
-          </a:pPr>
-          <a:r>
-            <a:rPr lang="es-AR" sz="1800" kern="1200" dirty="0" smtClean="0"/>
-            <a:t>Sprints comienzan y terminan Sábados</a:t>
-          </a:r>
-          <a:endParaRPr lang="es-ES" sz="1800" kern="1200" dirty="0"/>
-        </a:p>
-      </dsp:txBody>
-      <dsp:txXfrm>
-        <a:off x="442318" y="1480869"/>
-        <a:ext cx="5455866" cy="475750"/>
-      </dsp:txXfrm>
-    </dsp:sp>
-    <dsp:sp modelId="{0C24452A-0CF2-470A-B60A-A8B1139F8753}">
-      <dsp:nvSpPr>
-        <dsp:cNvPr id="0" name=""/>
-        <dsp:cNvSpPr/>
-      </dsp:nvSpPr>
-      <dsp:spPr>
-        <a:xfrm>
-          <a:off x="12692" y="1289118"/>
-          <a:ext cx="859252" cy="859252"/>
-        </a:xfrm>
-        <a:prstGeom prst="ellipse">
-          <a:avLst/>
-        </a:prstGeom>
-        <a:solidFill>
-          <a:schemeClr val="lt1">
-            <a:hueOff val="0"/>
-            <a:satOff val="0"/>
-            <a:lumOff val="0"/>
-            <a:alphaOff val="0"/>
-          </a:schemeClr>
-        </a:solidFill>
-        <a:ln w="15875" cap="rnd" cmpd="sng" algn="ctr">
-          <a:solidFill>
-            <a:schemeClr val="accent3">
-              <a:hueOff val="0"/>
-              <a:satOff val="0"/>
-              <a:lumOff val="0"/>
-              <a:alphaOff val="0"/>
-            </a:schemeClr>
-          </a:solidFill>
-          <a:prstDash val="solid"/>
-        </a:ln>
-        <a:effectLst/>
-      </dsp:spPr>
-      <dsp:style>
-        <a:lnRef idx="2">
-          <a:scrgbClr r="0" g="0" b="0"/>
-        </a:lnRef>
-        <a:fillRef idx="1">
-          <a:scrgbClr r="0" g="0" b="0"/>
-        </a:fillRef>
-        <a:effectRef idx="0">
-          <a:scrgbClr r="0" g="0" b="0"/>
-        </a:effectRef>
-        <a:fontRef idx="minor"/>
-      </dsp:style>
-    </dsp:sp>
   </dsp:spTree>
 </dsp:drawing>
 </file>
@@ -8606,891 +7071,6 @@
       <dsp:cNvGrpSpPr/>
     </dsp:nvGrpSpPr>
     <dsp:grpSpPr/>
-    <dsp:sp modelId="{969B7A61-92F9-49CC-BB98-4FCC80682E86}">
-      <dsp:nvSpPr>
-        <dsp:cNvPr id="0" name=""/>
-        <dsp:cNvSpPr/>
-      </dsp:nvSpPr>
-      <dsp:spPr>
-        <a:xfrm>
-          <a:off x="-5085865" y="-779133"/>
-          <a:ext cx="6056718" cy="6056718"/>
-        </a:xfrm>
-        <a:prstGeom prst="blockArc">
-          <a:avLst>
-            <a:gd name="adj1" fmla="val 18900000"/>
-            <a:gd name="adj2" fmla="val 2700000"/>
-            <a:gd name="adj3" fmla="val 357"/>
-          </a:avLst>
-        </a:prstGeom>
-        <a:noFill/>
-        <a:ln w="15875" cap="rnd" cmpd="sng" algn="ctr">
-          <a:solidFill>
-            <a:schemeClr val="accent1">
-              <a:shade val="60000"/>
-              <a:hueOff val="0"/>
-              <a:satOff val="0"/>
-              <a:lumOff val="0"/>
-              <a:alphaOff val="0"/>
-            </a:schemeClr>
-          </a:solidFill>
-          <a:prstDash val="solid"/>
-        </a:ln>
-        <a:effectLst/>
-      </dsp:spPr>
-      <dsp:style>
-        <a:lnRef idx="2">
-          <a:scrgbClr r="0" g="0" b="0"/>
-        </a:lnRef>
-        <a:fillRef idx="0">
-          <a:scrgbClr r="0" g="0" b="0"/>
-        </a:fillRef>
-        <a:effectRef idx="0">
-          <a:scrgbClr r="0" g="0" b="0"/>
-        </a:effectRef>
-        <a:fontRef idx="minor"/>
-      </dsp:style>
-    </dsp:sp>
-    <dsp:sp modelId="{889CCFCF-85CF-42EE-B1C3-B84E8EE140C2}">
-      <dsp:nvSpPr>
-        <dsp:cNvPr id="0" name=""/>
-        <dsp:cNvSpPr/>
-      </dsp:nvSpPr>
-      <dsp:spPr>
-        <a:xfrm>
-          <a:off x="362155" y="236888"/>
-          <a:ext cx="8990330" cy="473596"/>
-        </a:xfrm>
-        <a:prstGeom prst="rect">
-          <a:avLst/>
-        </a:prstGeom>
-        <a:solidFill>
-          <a:schemeClr val="accent1">
-            <a:hueOff val="0"/>
-            <a:satOff val="0"/>
-            <a:lumOff val="0"/>
-            <a:alphaOff val="0"/>
-          </a:schemeClr>
-        </a:solidFill>
-        <a:ln w="15875" cap="rnd" cmpd="sng" algn="ctr">
-          <a:solidFill>
-            <a:schemeClr val="lt1">
-              <a:hueOff val="0"/>
-              <a:satOff val="0"/>
-              <a:lumOff val="0"/>
-              <a:alphaOff val="0"/>
-            </a:schemeClr>
-          </a:solidFill>
-          <a:prstDash val="solid"/>
-        </a:ln>
-        <a:effectLst/>
-      </dsp:spPr>
-      <dsp:style>
-        <a:lnRef idx="2">
-          <a:scrgbClr r="0" g="0" b="0"/>
-        </a:lnRef>
-        <a:fillRef idx="1">
-          <a:scrgbClr r="0" g="0" b="0"/>
-        </a:fillRef>
-        <a:effectRef idx="0">
-          <a:scrgbClr r="0" g="0" b="0"/>
-        </a:effectRef>
-        <a:fontRef idx="minor">
-          <a:schemeClr val="lt1"/>
-        </a:fontRef>
-      </dsp:style>
-      <dsp:txBody>
-        <a:bodyPr spcFirstLastPara="0" vert="horz" wrap="square" lIns="375918" tIns="60960" rIns="60960" bIns="60960" numCol="1" spcCol="1270" anchor="ctr" anchorCtr="0">
-          <a:noAutofit/>
-        </a:bodyPr>
-        <a:lstStyle/>
-        <a:p>
-          <a:pPr lvl="0" algn="l" defTabSz="1066800">
-            <a:lnSpc>
-              <a:spcPct val="90000"/>
-            </a:lnSpc>
-            <a:spcBef>
-              <a:spcPct val="0"/>
-            </a:spcBef>
-            <a:spcAft>
-              <a:spcPct val="35000"/>
-            </a:spcAft>
-          </a:pPr>
-          <a:r>
-            <a:rPr lang="es-AR" sz="2400" b="0" kern="1200" dirty="0" smtClean="0">
-              <a:effectLst>
-                <a:outerShdw blurRad="38100" dist="38100" dir="2700000" algn="tl">
-                  <a:srgbClr val="000000">
-                    <a:alpha val="43137"/>
-                  </a:srgbClr>
-                </a:outerShdw>
-              </a:effectLst>
-            </a:rPr>
-            <a:t>Capacidad del Equipo</a:t>
-          </a:r>
-          <a:endParaRPr lang="es-ES" sz="2400" b="0" kern="1200" dirty="0">
-            <a:effectLst>
-              <a:outerShdw blurRad="38100" dist="38100" dir="2700000" algn="tl">
-                <a:srgbClr val="000000">
-                  <a:alpha val="43137"/>
-                </a:srgbClr>
-              </a:outerShdw>
-            </a:effectLst>
-          </a:endParaRPr>
-        </a:p>
-      </dsp:txBody>
-      <dsp:txXfrm>
-        <a:off x="362155" y="236888"/>
-        <a:ext cx="8990330" cy="473596"/>
-      </dsp:txXfrm>
-    </dsp:sp>
-    <dsp:sp modelId="{22DC27C4-A8C1-4515-BC47-1B67EE45C266}">
-      <dsp:nvSpPr>
-        <dsp:cNvPr id="0" name=""/>
-        <dsp:cNvSpPr/>
-      </dsp:nvSpPr>
-      <dsp:spPr>
-        <a:xfrm>
-          <a:off x="66157" y="177688"/>
-          <a:ext cx="591996" cy="591996"/>
-        </a:xfrm>
-        <a:prstGeom prst="ellipse">
-          <a:avLst/>
-        </a:prstGeom>
-        <a:solidFill>
-          <a:schemeClr val="lt1">
-            <a:hueOff val="0"/>
-            <a:satOff val="0"/>
-            <a:lumOff val="0"/>
-            <a:alphaOff val="0"/>
-          </a:schemeClr>
-        </a:solidFill>
-        <a:ln w="15875" cap="rnd" cmpd="sng" algn="ctr">
-          <a:solidFill>
-            <a:schemeClr val="accent1">
-              <a:hueOff val="0"/>
-              <a:satOff val="0"/>
-              <a:lumOff val="0"/>
-              <a:alphaOff val="0"/>
-            </a:schemeClr>
-          </a:solidFill>
-          <a:prstDash val="solid"/>
-        </a:ln>
-        <a:effectLst/>
-      </dsp:spPr>
-      <dsp:style>
-        <a:lnRef idx="2">
-          <a:scrgbClr r="0" g="0" b="0"/>
-        </a:lnRef>
-        <a:fillRef idx="1">
-          <a:scrgbClr r="0" g="0" b="0"/>
-        </a:fillRef>
-        <a:effectRef idx="0">
-          <a:scrgbClr r="0" g="0" b="0"/>
-        </a:effectRef>
-        <a:fontRef idx="minor"/>
-      </dsp:style>
-    </dsp:sp>
-    <dsp:sp modelId="{21664CED-339C-476D-85A5-28A63C40B1E3}">
-      <dsp:nvSpPr>
-        <dsp:cNvPr id="0" name=""/>
-        <dsp:cNvSpPr/>
-      </dsp:nvSpPr>
-      <dsp:spPr>
-        <a:xfrm>
-          <a:off x="751721" y="947193"/>
-          <a:ext cx="8600764" cy="473596"/>
-        </a:xfrm>
-        <a:prstGeom prst="rect">
-          <a:avLst/>
-        </a:prstGeom>
-        <a:solidFill>
-          <a:schemeClr val="accent1">
-            <a:hueOff val="0"/>
-            <a:satOff val="0"/>
-            <a:lumOff val="0"/>
-            <a:alphaOff val="0"/>
-          </a:schemeClr>
-        </a:solidFill>
-        <a:ln w="15875" cap="rnd" cmpd="sng" algn="ctr">
-          <a:solidFill>
-            <a:schemeClr val="lt1">
-              <a:hueOff val="0"/>
-              <a:satOff val="0"/>
-              <a:lumOff val="0"/>
-              <a:alphaOff val="0"/>
-            </a:schemeClr>
-          </a:solidFill>
-          <a:prstDash val="solid"/>
-        </a:ln>
-        <a:effectLst/>
-      </dsp:spPr>
-      <dsp:style>
-        <a:lnRef idx="2">
-          <a:scrgbClr r="0" g="0" b="0"/>
-        </a:lnRef>
-        <a:fillRef idx="1">
-          <a:scrgbClr r="0" g="0" b="0"/>
-        </a:fillRef>
-        <a:effectRef idx="0">
-          <a:scrgbClr r="0" g="0" b="0"/>
-        </a:effectRef>
-        <a:fontRef idx="minor">
-          <a:schemeClr val="lt1"/>
-        </a:fontRef>
-      </dsp:style>
-      <dsp:txBody>
-        <a:bodyPr spcFirstLastPara="0" vert="horz" wrap="square" lIns="375918" tIns="60960" rIns="60960" bIns="60960" numCol="1" spcCol="1270" anchor="ctr" anchorCtr="0">
-          <a:noAutofit/>
-        </a:bodyPr>
-        <a:lstStyle/>
-        <a:p>
-          <a:pPr lvl="0" algn="l" defTabSz="1066800">
-            <a:lnSpc>
-              <a:spcPct val="90000"/>
-            </a:lnSpc>
-            <a:spcBef>
-              <a:spcPct val="0"/>
-            </a:spcBef>
-            <a:spcAft>
-              <a:spcPct val="35000"/>
-            </a:spcAft>
-          </a:pPr>
-          <a:r>
-            <a:rPr lang="es-AR" sz="2400" b="0" kern="1200" dirty="0" smtClean="0">
-              <a:effectLst>
-                <a:outerShdw blurRad="38100" dist="38100" dir="2700000" algn="tl">
-                  <a:srgbClr val="000000">
-                    <a:alpha val="43137"/>
-                  </a:srgbClr>
-                </a:outerShdw>
-              </a:effectLst>
-            </a:rPr>
-            <a:t>Velocidad del Equipo</a:t>
-          </a:r>
-          <a:endParaRPr lang="es-ES" sz="2400" b="0" kern="1200" dirty="0">
-            <a:effectLst>
-              <a:outerShdw blurRad="38100" dist="38100" dir="2700000" algn="tl">
-                <a:srgbClr val="000000">
-                  <a:alpha val="43137"/>
-                </a:srgbClr>
-              </a:outerShdw>
-            </a:effectLst>
-          </a:endParaRPr>
-        </a:p>
-      </dsp:txBody>
-      <dsp:txXfrm>
-        <a:off x="751721" y="947193"/>
-        <a:ext cx="8600764" cy="473596"/>
-      </dsp:txXfrm>
-    </dsp:sp>
-    <dsp:sp modelId="{876F9F0B-15C7-4E40-97CF-C02C7289BCAE}">
-      <dsp:nvSpPr>
-        <dsp:cNvPr id="0" name=""/>
-        <dsp:cNvSpPr/>
-      </dsp:nvSpPr>
-      <dsp:spPr>
-        <a:xfrm>
-          <a:off x="455723" y="887994"/>
-          <a:ext cx="591996" cy="591996"/>
-        </a:xfrm>
-        <a:prstGeom prst="ellipse">
-          <a:avLst/>
-        </a:prstGeom>
-        <a:solidFill>
-          <a:schemeClr val="lt1">
-            <a:hueOff val="0"/>
-            <a:satOff val="0"/>
-            <a:lumOff val="0"/>
-            <a:alphaOff val="0"/>
-          </a:schemeClr>
-        </a:solidFill>
-        <a:ln w="15875" cap="rnd" cmpd="sng" algn="ctr">
-          <a:solidFill>
-            <a:schemeClr val="accent1">
-              <a:hueOff val="0"/>
-              <a:satOff val="0"/>
-              <a:lumOff val="0"/>
-              <a:alphaOff val="0"/>
-            </a:schemeClr>
-          </a:solidFill>
-          <a:prstDash val="solid"/>
-        </a:ln>
-        <a:effectLst/>
-      </dsp:spPr>
-      <dsp:style>
-        <a:lnRef idx="2">
-          <a:scrgbClr r="0" g="0" b="0"/>
-        </a:lnRef>
-        <a:fillRef idx="1">
-          <a:scrgbClr r="0" g="0" b="0"/>
-        </a:fillRef>
-        <a:effectRef idx="0">
-          <a:scrgbClr r="0" g="0" b="0"/>
-        </a:effectRef>
-        <a:fontRef idx="minor"/>
-      </dsp:style>
-    </dsp:sp>
-    <dsp:sp modelId="{B1E84231-A085-4FBA-A7F1-0724F2582F6F}">
-      <dsp:nvSpPr>
-        <dsp:cNvPr id="0" name=""/>
-        <dsp:cNvSpPr/>
-      </dsp:nvSpPr>
-      <dsp:spPr>
-        <a:xfrm>
-          <a:off x="929860" y="1657499"/>
-          <a:ext cx="8422625" cy="473596"/>
-        </a:xfrm>
-        <a:prstGeom prst="rect">
-          <a:avLst/>
-        </a:prstGeom>
-        <a:solidFill>
-          <a:schemeClr val="accent1">
-            <a:hueOff val="0"/>
-            <a:satOff val="0"/>
-            <a:lumOff val="0"/>
-            <a:alphaOff val="0"/>
-          </a:schemeClr>
-        </a:solidFill>
-        <a:ln w="15875" cap="rnd" cmpd="sng" algn="ctr">
-          <a:solidFill>
-            <a:schemeClr val="lt1">
-              <a:hueOff val="0"/>
-              <a:satOff val="0"/>
-              <a:lumOff val="0"/>
-              <a:alphaOff val="0"/>
-            </a:schemeClr>
-          </a:solidFill>
-          <a:prstDash val="solid"/>
-        </a:ln>
-        <a:effectLst/>
-      </dsp:spPr>
-      <dsp:style>
-        <a:lnRef idx="2">
-          <a:scrgbClr r="0" g="0" b="0"/>
-        </a:lnRef>
-        <a:fillRef idx="1">
-          <a:scrgbClr r="0" g="0" b="0"/>
-        </a:fillRef>
-        <a:effectRef idx="0">
-          <a:scrgbClr r="0" g="0" b="0"/>
-        </a:effectRef>
-        <a:fontRef idx="minor">
-          <a:schemeClr val="lt1"/>
-        </a:fontRef>
-      </dsp:style>
-      <dsp:txBody>
-        <a:bodyPr spcFirstLastPara="0" vert="horz" wrap="square" lIns="375918" tIns="60960" rIns="60960" bIns="60960" numCol="1" spcCol="1270" anchor="ctr" anchorCtr="0">
-          <a:noAutofit/>
-        </a:bodyPr>
-        <a:lstStyle/>
-        <a:p>
-          <a:pPr lvl="0" algn="l" defTabSz="1066800">
-            <a:lnSpc>
-              <a:spcPct val="90000"/>
-            </a:lnSpc>
-            <a:spcBef>
-              <a:spcPct val="0"/>
-            </a:spcBef>
-            <a:spcAft>
-              <a:spcPct val="35000"/>
-            </a:spcAft>
-          </a:pPr>
-          <a:r>
-            <a:rPr lang="es-AR" sz="2400" b="0" kern="1200" dirty="0" smtClean="0">
-              <a:effectLst>
-                <a:outerShdw blurRad="38100" dist="38100" dir="2700000" algn="tl">
-                  <a:srgbClr val="000000">
-                    <a:alpha val="43137"/>
-                  </a:srgbClr>
-                </a:outerShdw>
-              </a:effectLst>
-            </a:rPr>
-            <a:t>Trabajo Terminado frente a Trabajo Pendiente</a:t>
-          </a:r>
-          <a:endParaRPr lang="es-ES" sz="2400" b="0" kern="1200" dirty="0">
-            <a:effectLst>
-              <a:outerShdw blurRad="38100" dist="38100" dir="2700000" algn="tl">
-                <a:srgbClr val="000000">
-                  <a:alpha val="43137"/>
-                </a:srgbClr>
-              </a:outerShdw>
-            </a:effectLst>
-          </a:endParaRPr>
-        </a:p>
-      </dsp:txBody>
-      <dsp:txXfrm>
-        <a:off x="929860" y="1657499"/>
-        <a:ext cx="8422625" cy="473596"/>
-      </dsp:txXfrm>
-    </dsp:sp>
-    <dsp:sp modelId="{EE92931F-C7E4-4156-83F5-14B75555FB3E}">
-      <dsp:nvSpPr>
-        <dsp:cNvPr id="0" name=""/>
-        <dsp:cNvSpPr/>
-      </dsp:nvSpPr>
-      <dsp:spPr>
-        <a:xfrm>
-          <a:off x="633862" y="1598299"/>
-          <a:ext cx="591996" cy="591996"/>
-        </a:xfrm>
-        <a:prstGeom prst="ellipse">
-          <a:avLst/>
-        </a:prstGeom>
-        <a:solidFill>
-          <a:schemeClr val="lt1">
-            <a:hueOff val="0"/>
-            <a:satOff val="0"/>
-            <a:lumOff val="0"/>
-            <a:alphaOff val="0"/>
-          </a:schemeClr>
-        </a:solidFill>
-        <a:ln w="15875" cap="rnd" cmpd="sng" algn="ctr">
-          <a:solidFill>
-            <a:schemeClr val="accent1">
-              <a:hueOff val="0"/>
-              <a:satOff val="0"/>
-              <a:lumOff val="0"/>
-              <a:alphaOff val="0"/>
-            </a:schemeClr>
-          </a:solidFill>
-          <a:prstDash val="solid"/>
-        </a:ln>
-        <a:effectLst/>
-      </dsp:spPr>
-      <dsp:style>
-        <a:lnRef idx="2">
-          <a:scrgbClr r="0" g="0" b="0"/>
-        </a:lnRef>
-        <a:fillRef idx="1">
-          <a:scrgbClr r="0" g="0" b="0"/>
-        </a:fillRef>
-        <a:effectRef idx="0">
-          <a:scrgbClr r="0" g="0" b="0"/>
-        </a:effectRef>
-        <a:fontRef idx="minor"/>
-      </dsp:style>
-    </dsp:sp>
-    <dsp:sp modelId="{2844CD40-437E-4C4F-A2EE-801021F6711B}">
-      <dsp:nvSpPr>
-        <dsp:cNvPr id="0" name=""/>
-        <dsp:cNvSpPr/>
-      </dsp:nvSpPr>
-      <dsp:spPr>
-        <a:xfrm>
-          <a:off x="929860" y="2367354"/>
-          <a:ext cx="8422625" cy="473596"/>
-        </a:xfrm>
-        <a:prstGeom prst="rect">
-          <a:avLst/>
-        </a:prstGeom>
-        <a:solidFill>
-          <a:schemeClr val="accent1">
-            <a:hueOff val="0"/>
-            <a:satOff val="0"/>
-            <a:lumOff val="0"/>
-            <a:alphaOff val="0"/>
-          </a:schemeClr>
-        </a:solidFill>
-        <a:ln w="15875" cap="rnd" cmpd="sng" algn="ctr">
-          <a:solidFill>
-            <a:schemeClr val="lt1">
-              <a:hueOff val="0"/>
-              <a:satOff val="0"/>
-              <a:lumOff val="0"/>
-              <a:alphaOff val="0"/>
-            </a:schemeClr>
-          </a:solidFill>
-          <a:prstDash val="solid"/>
-        </a:ln>
-        <a:effectLst/>
-      </dsp:spPr>
-      <dsp:style>
-        <a:lnRef idx="2">
-          <a:scrgbClr r="0" g="0" b="0"/>
-        </a:lnRef>
-        <a:fillRef idx="1">
-          <a:scrgbClr r="0" g="0" b="0"/>
-        </a:fillRef>
-        <a:effectRef idx="0">
-          <a:scrgbClr r="0" g="0" b="0"/>
-        </a:effectRef>
-        <a:fontRef idx="minor">
-          <a:schemeClr val="lt1"/>
-        </a:fontRef>
-      </dsp:style>
-      <dsp:txBody>
-        <a:bodyPr spcFirstLastPara="0" vert="horz" wrap="square" lIns="375918" tIns="60960" rIns="60960" bIns="60960" numCol="1" spcCol="1270" anchor="ctr" anchorCtr="0">
-          <a:noAutofit/>
-        </a:bodyPr>
-        <a:lstStyle/>
-        <a:p>
-          <a:pPr lvl="0" algn="l" defTabSz="1066800">
-            <a:lnSpc>
-              <a:spcPct val="90000"/>
-            </a:lnSpc>
-            <a:spcBef>
-              <a:spcPct val="0"/>
-            </a:spcBef>
-            <a:spcAft>
-              <a:spcPct val="35000"/>
-            </a:spcAft>
-          </a:pPr>
-          <a:r>
-            <a:rPr lang="es-ES" sz="2400" b="0" kern="1200" dirty="0" smtClean="0">
-              <a:effectLst>
-                <a:outerShdw blurRad="38100" dist="38100" dir="2700000" algn="tl">
-                  <a:srgbClr val="000000">
-                    <a:alpha val="43137"/>
-                  </a:srgbClr>
-                </a:outerShdw>
-              </a:effectLst>
-            </a:rPr>
-            <a:t>Sprint Burndown Chart</a:t>
-          </a:r>
-          <a:endParaRPr lang="es-ES" sz="2400" b="0" kern="1200" dirty="0">
-            <a:effectLst>
-              <a:outerShdw blurRad="38100" dist="38100" dir="2700000" algn="tl">
-                <a:srgbClr val="000000">
-                  <a:alpha val="43137"/>
-                </a:srgbClr>
-              </a:outerShdw>
-            </a:effectLst>
-          </a:endParaRPr>
-        </a:p>
-      </dsp:txBody>
-      <dsp:txXfrm>
-        <a:off x="929860" y="2367354"/>
-        <a:ext cx="8422625" cy="473596"/>
-      </dsp:txXfrm>
-    </dsp:sp>
-    <dsp:sp modelId="{6B30E3D3-D843-4648-BB87-5E25A0A737E1}">
-      <dsp:nvSpPr>
-        <dsp:cNvPr id="0" name=""/>
-        <dsp:cNvSpPr/>
-      </dsp:nvSpPr>
-      <dsp:spPr>
-        <a:xfrm>
-          <a:off x="633862" y="2308155"/>
-          <a:ext cx="591996" cy="591996"/>
-        </a:xfrm>
-        <a:prstGeom prst="ellipse">
-          <a:avLst/>
-        </a:prstGeom>
-        <a:solidFill>
-          <a:schemeClr val="lt1">
-            <a:hueOff val="0"/>
-            <a:satOff val="0"/>
-            <a:lumOff val="0"/>
-            <a:alphaOff val="0"/>
-          </a:schemeClr>
-        </a:solidFill>
-        <a:ln w="15875" cap="rnd" cmpd="sng" algn="ctr">
-          <a:solidFill>
-            <a:schemeClr val="accent1">
-              <a:hueOff val="0"/>
-              <a:satOff val="0"/>
-              <a:lumOff val="0"/>
-              <a:alphaOff val="0"/>
-            </a:schemeClr>
-          </a:solidFill>
-          <a:prstDash val="solid"/>
-        </a:ln>
-        <a:effectLst/>
-      </dsp:spPr>
-      <dsp:style>
-        <a:lnRef idx="2">
-          <a:scrgbClr r="0" g="0" b="0"/>
-        </a:lnRef>
-        <a:fillRef idx="1">
-          <a:scrgbClr r="0" g="0" b="0"/>
-        </a:fillRef>
-        <a:effectRef idx="0">
-          <a:scrgbClr r="0" g="0" b="0"/>
-        </a:effectRef>
-        <a:fontRef idx="minor"/>
-      </dsp:style>
-    </dsp:sp>
-    <dsp:sp modelId="{E7CE5C3F-775D-45A0-8FC7-59E2443FB5BB}">
-      <dsp:nvSpPr>
-        <dsp:cNvPr id="0" name=""/>
-        <dsp:cNvSpPr/>
-      </dsp:nvSpPr>
-      <dsp:spPr>
-        <a:xfrm>
-          <a:off x="751721" y="3077660"/>
-          <a:ext cx="8600764" cy="473596"/>
-        </a:xfrm>
-        <a:prstGeom prst="rect">
-          <a:avLst/>
-        </a:prstGeom>
-        <a:solidFill>
-          <a:schemeClr val="accent1">
-            <a:hueOff val="0"/>
-            <a:satOff val="0"/>
-            <a:lumOff val="0"/>
-            <a:alphaOff val="0"/>
-          </a:schemeClr>
-        </a:solidFill>
-        <a:ln w="15875" cap="rnd" cmpd="sng" algn="ctr">
-          <a:solidFill>
-            <a:schemeClr val="lt1">
-              <a:hueOff val="0"/>
-              <a:satOff val="0"/>
-              <a:lumOff val="0"/>
-              <a:alphaOff val="0"/>
-            </a:schemeClr>
-          </a:solidFill>
-          <a:prstDash val="solid"/>
-        </a:ln>
-        <a:effectLst/>
-      </dsp:spPr>
-      <dsp:style>
-        <a:lnRef idx="2">
-          <a:scrgbClr r="0" g="0" b="0"/>
-        </a:lnRef>
-        <a:fillRef idx="1">
-          <a:scrgbClr r="0" g="0" b="0"/>
-        </a:fillRef>
-        <a:effectRef idx="0">
-          <a:scrgbClr r="0" g="0" b="0"/>
-        </a:effectRef>
-        <a:fontRef idx="minor">
-          <a:schemeClr val="lt1"/>
-        </a:fontRef>
-      </dsp:style>
-      <dsp:txBody>
-        <a:bodyPr spcFirstLastPara="0" vert="horz" wrap="square" lIns="375918" tIns="60960" rIns="60960" bIns="60960" numCol="1" spcCol="1270" anchor="ctr" anchorCtr="0">
-          <a:noAutofit/>
-        </a:bodyPr>
-        <a:lstStyle/>
-        <a:p>
-          <a:pPr lvl="0" algn="l" defTabSz="1066800">
-            <a:lnSpc>
-              <a:spcPct val="90000"/>
-            </a:lnSpc>
-            <a:spcBef>
-              <a:spcPct val="0"/>
-            </a:spcBef>
-            <a:spcAft>
-              <a:spcPct val="35000"/>
-            </a:spcAft>
-          </a:pPr>
-          <a:r>
-            <a:rPr lang="es-ES" sz="2400" kern="1200" dirty="0" smtClean="0">
-              <a:effectLst>
-                <a:outerShdw blurRad="38100" dist="38100" dir="2700000" algn="tl">
-                  <a:srgbClr val="000000">
-                    <a:alpha val="43137"/>
-                  </a:srgbClr>
-                </a:outerShdw>
-              </a:effectLst>
-            </a:rPr>
-            <a:t>Cantidad de Casos de Prueba Funcionales por Sprint</a:t>
-          </a:r>
-          <a:endParaRPr lang="es-ES" sz="2400" kern="1200" dirty="0">
-            <a:effectLst>
-              <a:outerShdw blurRad="38100" dist="38100" dir="2700000" algn="tl">
-                <a:srgbClr val="000000">
-                  <a:alpha val="43137"/>
-                </a:srgbClr>
-              </a:outerShdw>
-            </a:effectLst>
-          </a:endParaRPr>
-        </a:p>
-      </dsp:txBody>
-      <dsp:txXfrm>
-        <a:off x="751721" y="3077660"/>
-        <a:ext cx="8600764" cy="473596"/>
-      </dsp:txXfrm>
-    </dsp:sp>
-    <dsp:sp modelId="{446A4C80-062F-4940-8BD0-856D40367E6A}">
-      <dsp:nvSpPr>
-        <dsp:cNvPr id="0" name=""/>
-        <dsp:cNvSpPr/>
-      </dsp:nvSpPr>
-      <dsp:spPr>
-        <a:xfrm>
-          <a:off x="455723" y="3018460"/>
-          <a:ext cx="591996" cy="591996"/>
-        </a:xfrm>
-        <a:prstGeom prst="ellipse">
-          <a:avLst/>
-        </a:prstGeom>
-        <a:solidFill>
-          <a:schemeClr val="lt1">
-            <a:hueOff val="0"/>
-            <a:satOff val="0"/>
-            <a:lumOff val="0"/>
-            <a:alphaOff val="0"/>
-          </a:schemeClr>
-        </a:solidFill>
-        <a:ln w="15875" cap="rnd" cmpd="sng" algn="ctr">
-          <a:solidFill>
-            <a:schemeClr val="accent1">
-              <a:hueOff val="0"/>
-              <a:satOff val="0"/>
-              <a:lumOff val="0"/>
-              <a:alphaOff val="0"/>
-            </a:schemeClr>
-          </a:solidFill>
-          <a:prstDash val="solid"/>
-        </a:ln>
-        <a:effectLst/>
-      </dsp:spPr>
-      <dsp:style>
-        <a:lnRef idx="2">
-          <a:scrgbClr r="0" g="0" b="0"/>
-        </a:lnRef>
-        <a:fillRef idx="1">
-          <a:scrgbClr r="0" g="0" b="0"/>
-        </a:fillRef>
-        <a:effectRef idx="0">
-          <a:scrgbClr r="0" g="0" b="0"/>
-        </a:effectRef>
-        <a:fontRef idx="minor"/>
-      </dsp:style>
-    </dsp:sp>
-    <dsp:sp modelId="{A6715B7B-E69E-49A7-BBDE-A964109AD82E}">
-      <dsp:nvSpPr>
-        <dsp:cNvPr id="0" name=""/>
-        <dsp:cNvSpPr/>
-      </dsp:nvSpPr>
-      <dsp:spPr>
-        <a:xfrm>
-          <a:off x="362155" y="3787965"/>
-          <a:ext cx="8990330" cy="473596"/>
-        </a:xfrm>
-        <a:prstGeom prst="rect">
-          <a:avLst/>
-        </a:prstGeom>
-        <a:solidFill>
-          <a:schemeClr val="accent1">
-            <a:hueOff val="0"/>
-            <a:satOff val="0"/>
-            <a:lumOff val="0"/>
-            <a:alphaOff val="0"/>
-          </a:schemeClr>
-        </a:solidFill>
-        <a:ln w="15875" cap="rnd" cmpd="sng" algn="ctr">
-          <a:solidFill>
-            <a:schemeClr val="lt1">
-              <a:hueOff val="0"/>
-              <a:satOff val="0"/>
-              <a:lumOff val="0"/>
-              <a:alphaOff val="0"/>
-            </a:schemeClr>
-          </a:solidFill>
-          <a:prstDash val="solid"/>
-        </a:ln>
-        <a:effectLst/>
-      </dsp:spPr>
-      <dsp:style>
-        <a:lnRef idx="2">
-          <a:scrgbClr r="0" g="0" b="0"/>
-        </a:lnRef>
-        <a:fillRef idx="1">
-          <a:scrgbClr r="0" g="0" b="0"/>
-        </a:fillRef>
-        <a:effectRef idx="0">
-          <a:scrgbClr r="0" g="0" b="0"/>
-        </a:effectRef>
-        <a:fontRef idx="minor">
-          <a:schemeClr val="lt1"/>
-        </a:fontRef>
-      </dsp:style>
-      <dsp:txBody>
-        <a:bodyPr spcFirstLastPara="0" vert="horz" wrap="square" lIns="375918" tIns="60960" rIns="60960" bIns="60960" numCol="1" spcCol="1270" anchor="ctr" anchorCtr="0">
-          <a:noAutofit/>
-        </a:bodyPr>
-        <a:lstStyle/>
-        <a:p>
-          <a:pPr lvl="0" algn="l" defTabSz="1066800">
-            <a:lnSpc>
-              <a:spcPct val="90000"/>
-            </a:lnSpc>
-            <a:spcBef>
-              <a:spcPct val="0"/>
-            </a:spcBef>
-            <a:spcAft>
-              <a:spcPct val="35000"/>
-            </a:spcAft>
-          </a:pPr>
-          <a:r>
-            <a:rPr lang="es-AR" sz="2400" b="0" kern="1200" dirty="0" smtClean="0">
-              <a:effectLst>
-                <a:outerShdw blurRad="38100" dist="38100" dir="2700000" algn="tl">
-                  <a:srgbClr val="000000">
-                    <a:alpha val="43137"/>
-                  </a:srgbClr>
-                </a:outerShdw>
-              </a:effectLst>
-            </a:rPr>
-            <a:t>Bugs Encontrados y Corregidos por Sprint</a:t>
-          </a:r>
-          <a:endParaRPr lang="es-ES" sz="2400" b="0" kern="1200" dirty="0">
-            <a:effectLst>
-              <a:outerShdw blurRad="38100" dist="38100" dir="2700000" algn="tl">
-                <a:srgbClr val="000000">
-                  <a:alpha val="43137"/>
-                </a:srgbClr>
-              </a:outerShdw>
-            </a:effectLst>
-          </a:endParaRPr>
-        </a:p>
-      </dsp:txBody>
-      <dsp:txXfrm>
-        <a:off x="362155" y="3787965"/>
-        <a:ext cx="8990330" cy="473596"/>
-      </dsp:txXfrm>
-    </dsp:sp>
-    <dsp:sp modelId="{8E282AFB-6A8E-47D2-B20A-27C073285195}">
-      <dsp:nvSpPr>
-        <dsp:cNvPr id="0" name=""/>
-        <dsp:cNvSpPr/>
-      </dsp:nvSpPr>
-      <dsp:spPr>
-        <a:xfrm>
-          <a:off x="66157" y="3728766"/>
-          <a:ext cx="591996" cy="591996"/>
-        </a:xfrm>
-        <a:prstGeom prst="ellipse">
-          <a:avLst/>
-        </a:prstGeom>
-        <a:solidFill>
-          <a:schemeClr val="lt1">
-            <a:hueOff val="0"/>
-            <a:satOff val="0"/>
-            <a:lumOff val="0"/>
-            <a:alphaOff val="0"/>
-          </a:schemeClr>
-        </a:solidFill>
-        <a:ln w="15875" cap="rnd" cmpd="sng" algn="ctr">
-          <a:solidFill>
-            <a:schemeClr val="accent1">
-              <a:hueOff val="0"/>
-              <a:satOff val="0"/>
-              <a:lumOff val="0"/>
-              <a:alphaOff val="0"/>
-            </a:schemeClr>
-          </a:solidFill>
-          <a:prstDash val="solid"/>
-        </a:ln>
-        <a:effectLst/>
-      </dsp:spPr>
-      <dsp:style>
-        <a:lnRef idx="2">
-          <a:scrgbClr r="0" g="0" b="0"/>
-        </a:lnRef>
-        <a:fillRef idx="1">
-          <a:scrgbClr r="0" g="0" b="0"/>
-        </a:fillRef>
-        <a:effectRef idx="0">
-          <a:scrgbClr r="0" g="0" b="0"/>
-        </a:effectRef>
-        <a:fontRef idx="minor"/>
-      </dsp:style>
-    </dsp:sp>
   </dsp:spTree>
 </dsp:drawing>
 </file>
@@ -23504,7 +21084,7 @@
           <a:effectLst/>
           <a:extLst>
             <a:ext uri="{91240B29-F687-4f45-9708-019B960494DF}">
-              <a14:hiddenLine xmlns:a14="http://schemas.microsoft.com/office/drawing/2010/main" xmlns="" w="9525">
+              <a14:hiddenLine xmlns="" xmlns:a14="http://schemas.microsoft.com/office/drawing/2010/main" w="9525">
                 <a:solidFill>
                   <a:srgbClr val="000000"/>
                 </a:solidFill>
@@ -25026,7 +22606,7 @@
           <a:ln/>
           <a:extLst>
             <a:ext uri="{91240B29-F687-4f45-9708-019B960494DF}">
-              <a14:hiddenLine xmlns:a14="http://schemas.microsoft.com/office/drawing/2010/main" xmlns="" w="9525">
+              <a14:hiddenLine xmlns="" xmlns:a14="http://schemas.microsoft.com/office/drawing/2010/main" w="9525">
                 <a:solidFill>
                   <a:srgbClr val="000000"/>
                 </a:solidFill>
@@ -25301,7 +22881,7 @@
           <a:ln/>
           <a:extLst>
             <a:ext uri="{91240B29-F687-4f45-9708-019B960494DF}">
-              <a14:hiddenLine xmlns:a14="http://schemas.microsoft.com/office/drawing/2010/main" xmlns="" w="9525">
+              <a14:hiddenLine xmlns="" xmlns:a14="http://schemas.microsoft.com/office/drawing/2010/main" w="9525">
                 <a:solidFill>
                   <a:srgbClr val="000000"/>
                 </a:solidFill>
@@ -25584,7 +23164,7 @@
           <a:ln/>
           <a:extLst>
             <a:ext uri="{91240B29-F687-4f45-9708-019B960494DF}">
-              <a14:hiddenLine xmlns:a14="http://schemas.microsoft.com/office/drawing/2010/main" xmlns="" w="9525">
+              <a14:hiddenLine xmlns="" xmlns:a14="http://schemas.microsoft.com/office/drawing/2010/main" w="9525">
                 <a:solidFill>
                   <a:srgbClr val="000000"/>
                 </a:solidFill>
@@ -26217,7 +23797,7 @@
           <a:ln/>
           <a:extLst>
             <a:ext uri="{91240B29-F687-4f45-9708-019B960494DF}">
-              <a14:hiddenLine xmlns:a14="http://schemas.microsoft.com/office/drawing/2010/main" xmlns="" w="9525">
+              <a14:hiddenLine xmlns="" xmlns:a14="http://schemas.microsoft.com/office/drawing/2010/main" w="9525">
                 <a:solidFill>
                   <a:srgbClr val="000000"/>
                 </a:solidFill>
@@ -26556,7 +24136,7 @@
           <a:ln/>
           <a:extLst>
             <a:ext uri="{91240B29-F687-4f45-9708-019B960494DF}">
-              <a14:hiddenLine xmlns:a14="http://schemas.microsoft.com/office/drawing/2010/main" xmlns="" w="9525">
+              <a14:hiddenLine xmlns="" xmlns:a14="http://schemas.microsoft.com/office/drawing/2010/main" w="9525">
                 <a:solidFill>
                   <a:srgbClr val="000000"/>
                 </a:solidFill>
@@ -27033,7 +24613,7 @@
           <a:ln/>
           <a:extLst>
             <a:ext uri="{91240B29-F687-4f45-9708-019B960494DF}">
-              <a14:hiddenLine xmlns:a14="http://schemas.microsoft.com/office/drawing/2010/main" xmlns="" w="9525">
+              <a14:hiddenLine xmlns="" xmlns:a14="http://schemas.microsoft.com/office/drawing/2010/main" w="9525">
                 <a:solidFill>
                   <a:srgbClr val="000000"/>
                 </a:solidFill>
@@ -27462,7 +25042,7 @@
           <a:ln/>
           <a:extLst>
             <a:ext uri="{91240B29-F687-4f45-9708-019B960494DF}">
-              <a14:hiddenLine xmlns:a14="http://schemas.microsoft.com/office/drawing/2010/main" xmlns="" w="9525">
+              <a14:hiddenLine xmlns="" xmlns:a14="http://schemas.microsoft.com/office/drawing/2010/main" w="9525">
                 <a:solidFill>
                   <a:srgbClr val="000000"/>
                 </a:solidFill>
@@ -28724,11 +26304,7 @@
           <a:p>
             <a:r>
               <a:rPr lang="es-AR" sz="4800" dirty="0" smtClean="0"/>
-              <a:t>Sistema de Gestión de Campeonatos de </a:t>
-            </a:r>
-            <a:r>
-              <a:rPr lang="es-AR" sz="4800" dirty="0" smtClean="0"/>
-              <a:t>Fútbol</a:t>
+              <a:t>Sistema de Gestión de Campeonatos de Fútbol</a:t>
             </a:r>
             <a:endParaRPr lang="es-AR" sz="4800" dirty="0"/>
           </a:p>
@@ -30007,11 +27583,7 @@
           <a:p>
             <a:r>
               <a:rPr lang="es-AR" dirty="0" smtClean="0"/>
-              <a:t>Métricas e Indicadores de </a:t>
-            </a:r>
-            <a:r>
-              <a:rPr lang="es-AR" dirty="0" smtClean="0"/>
-              <a:t>Producto</a:t>
+              <a:t>Métricas e Indicadores de Producto</a:t>
             </a:r>
             <a:endParaRPr lang="es-AR" dirty="0"/>
           </a:p>
@@ -30347,11 +27919,7 @@
           <a:p>
             <a:r>
               <a:rPr lang="es-AR" dirty="0" smtClean="0"/>
-              <a:t>Métricas e Indicadores de </a:t>
-            </a:r>
-            <a:r>
-              <a:rPr lang="es-AR" dirty="0" smtClean="0"/>
-              <a:t>Producto</a:t>
+              <a:t>Métricas e Indicadores de Producto</a:t>
             </a:r>
             <a:endParaRPr lang="es-AR" dirty="0"/>
           </a:p>
@@ -37656,7 +35224,7 @@
           <p:nvPr>
             <p:extLst>
               <p:ext uri="{D42A27DB-BD31-4B8C-83A1-F6EECF244321}">
-                <p14:modId xmlns:p14="http://schemas.microsoft.com/office/powerpoint/2010/main" val="2698174108"/>
+                <p14:modId xmlns:p14="http://schemas.microsoft.com/office/powerpoint/2010/main" val="3672896094"/>
               </p:ext>
             </p:extLst>
           </p:nvPr>
@@ -42370,11 +39938,7 @@
           <a:p>
             <a:r>
               <a:rPr lang="es-AR" sz="3600" dirty="0" smtClean="0"/>
-              <a:t>Documentación e </a:t>
-            </a:r>
-            <a:r>
-              <a:rPr lang="es-AR" sz="3600" dirty="0" smtClean="0"/>
-              <a:t>Investigación</a:t>
+              <a:t>Documentación e Investigación</a:t>
             </a:r>
             <a:endParaRPr lang="es-AR" sz="3600" dirty="0"/>
           </a:p>
@@ -46048,11 +43612,7 @@
           <a:p>
             <a:r>
               <a:rPr lang="es-AR" sz="3500" dirty="0" smtClean="0"/>
-              <a:t>Métricas e Indicadores de </a:t>
-            </a:r>
-            <a:r>
-              <a:rPr lang="es-AR" sz="3500" dirty="0" smtClean="0"/>
-              <a:t>Proyecto y Producto</a:t>
+              <a:t>Métricas e Indicadores de Proyecto y Producto</a:t>
             </a:r>
             <a:endParaRPr lang="es-AR" sz="3500" dirty="0"/>
           </a:p>

</xml_diff>